<commit_message>
Fußzeile hinzugefügt; Namen hinzugefügt; Was ist Git -> verfügbare Clients aufgelistet; git pull und git diff hinzugefügt; Formulierungsänderungen Folien 12, 15, 16;
</commit_message>
<xml_diff>
--- a/git_vortrag.pptx
+++ b/git_vortrag.pptx
@@ -7,10 +7,10 @@
     <p:sldMasterId id="2147483669" r:id="rId3"/>
   </p:sldMasterIdLst>
   <p:notesMasterIdLst>
-    <p:notesMasterId r:id="rId19"/>
+    <p:notesMasterId r:id="rId20"/>
   </p:notesMasterIdLst>
   <p:handoutMasterIdLst>
-    <p:handoutMasterId r:id="rId20"/>
+    <p:handoutMasterId r:id="rId21"/>
   </p:handoutMasterIdLst>
   <p:sldIdLst>
     <p:sldId id="256" r:id="rId4"/>
@@ -23,11 +23,12 @@
     <p:sldId id="259" r:id="rId11"/>
     <p:sldId id="263" r:id="rId12"/>
     <p:sldId id="266" r:id="rId13"/>
-    <p:sldId id="264" r:id="rId14"/>
-    <p:sldId id="265" r:id="rId15"/>
-    <p:sldId id="267" r:id="rId16"/>
-    <p:sldId id="269" r:id="rId17"/>
-    <p:sldId id="270" r:id="rId18"/>
+    <p:sldId id="271" r:id="rId14"/>
+    <p:sldId id="264" r:id="rId15"/>
+    <p:sldId id="265" r:id="rId16"/>
+    <p:sldId id="267" r:id="rId17"/>
+    <p:sldId id="269" r:id="rId18"/>
+    <p:sldId id="270" r:id="rId19"/>
   </p:sldIdLst>
   <p:sldSz cx="9144000" cy="6858000" type="screen4x3"/>
   <p:notesSz cx="6858000" cy="9144000"/>
@@ -241,7 +242,7 @@
           <a:p>
             <a:fld id="{0AE13250-C537-B448-BED9-AF61DCF088B2}" type="datetimeFigureOut">
               <a:rPr lang="de-DE" smtClean="0"/>
-              <a:t>18.03.2016</a:t>
+              <a:t>20.03.2016</a:t>
             </a:fld>
             <a:endParaRPr lang="de-DE"/>
           </a:p>
@@ -407,7 +408,7 @@
           <a:p>
             <a:fld id="{7BF8C751-7494-BF40-8574-213D7890D13D}" type="datetimeFigureOut">
               <a:rPr lang="de-DE" smtClean="0"/>
-              <a:t>18.03.2016</a:t>
+              <a:t>20.03.2016</a:t>
             </a:fld>
             <a:endParaRPr lang="de-DE"/>
           </a:p>
@@ -778,7 +779,11 @@
           <a:p>
             <a:r>
               <a:rPr lang="de-DE" dirty="0" smtClean="0"/>
-              <a:t>Autorenname	</a:t>
+              <a:t>Marco Egner, Dominik </a:t>
+            </a:r>
+            <a:r>
+              <a:rPr lang="de-DE" dirty="0" err="1" smtClean="0"/>
+              <a:t>Thirmeyer</a:t>
             </a:r>
             <a:endParaRPr lang="de-DE" dirty="0"/>
           </a:p>
@@ -7383,7 +7388,7 @@
         <p:spPr>
           <a:xfrm>
             <a:off x="475200" y="6627685"/>
-            <a:ext cx="3332480" cy="246221"/>
+            <a:ext cx="3332480" cy="123111"/>
           </a:xfrm>
           <a:prstGeom prst="rect">
             <a:avLst/>
@@ -7414,13 +7419,9 @@
               <a:defRPr/>
             </a:pPr>
             <a:r>
-              <a:rPr lang="de-DE" sz="800" dirty="0" smtClean="0">
-                <a:latin typeface="Arial"/>
-              </a:rPr>
-              <a:t>Fußzeile auf Masterfolie eingeben</a:t>
-            </a:r>
-          </a:p>
-          <a:p>
+              <a:rPr lang="de-DE" sz="800" dirty="0" smtClean="0"/>
+              <a:t>Git &amp; Spike Solutions – Eine Einführung</a:t>
+            </a:r>
             <a:endParaRPr lang="de-DE" sz="800" dirty="0">
               <a:latin typeface="Arial"/>
             </a:endParaRPr>
@@ -8735,7 +8736,11 @@
           </a:bodyPr>
           <a:lstStyle/>
           <a:p>
-            <a:endParaRPr lang="de-DE"/>
+            <a:r>
+              <a:rPr lang="de-DE" dirty="0" smtClean="0"/>
+              <a:t>Workflow</a:t>
+            </a:r>
+            <a:endParaRPr lang="de-DE" dirty="0"/>
           </a:p>
         </p:txBody>
       </p:sp>
@@ -8809,182 +8814,79 @@
           <a:lstStyle/>
           <a:p>
             <a:r>
+              <a:rPr lang="de-DE" dirty="0" err="1"/>
+              <a:t>g</a:t>
+            </a:r>
+            <a:r>
               <a:rPr lang="de-DE" dirty="0" err="1" smtClean="0"/>
-              <a:t>Branching</a:t>
-            </a:r>
-            <a:r>
-              <a:rPr lang="de-DE" dirty="0" smtClean="0"/>
-              <a:t> hilft dabei Tickets nach einem Ticket-Tracking-System</a:t>
-            </a:r>
-          </a:p>
-          <a:p>
-            <a:pPr indent="361950">
-              <a:buNone/>
-            </a:pPr>
-            <a:r>
-              <a:rPr lang="de-DE" dirty="0" smtClean="0"/>
-              <a:t>Abzuarbeiten</a:t>
-            </a:r>
-          </a:p>
-          <a:p>
-            <a:r>
-              <a:rPr lang="de-DE" dirty="0" smtClean="0"/>
-              <a:t>Mit </a:t>
-            </a:r>
-            <a:r>
-              <a:rPr lang="de-DE" dirty="0" err="1" smtClean="0">
-                <a:solidFill>
-                  <a:srgbClr val="FF0000"/>
-                </a:solidFill>
-              </a:rPr>
-              <a:t>Git</a:t>
-            </a:r>
-            <a:r>
-              <a:rPr lang="de-DE" dirty="0" smtClean="0">
-                <a:solidFill>
-                  <a:srgbClr val="FF0000"/>
-                </a:solidFill>
-              </a:rPr>
+              <a:t>it</a:t>
+            </a:r>
+            <a:r>
+              <a:rPr lang="de-DE" dirty="0" smtClean="0"/>
+              <a:t> pull</a:t>
+            </a:r>
+          </a:p>
+          <a:p>
+            <a:pPr lvl="1"/>
+            <a:r>
+              <a:rPr lang="de-DE" dirty="0" smtClean="0"/>
+              <a:t>Aktualisiert das lokale Repository mit den neuesten Änderungen</a:t>
+            </a:r>
+          </a:p>
+          <a:p>
+            <a:endParaRPr lang="de-DE" dirty="0"/>
+          </a:p>
+          <a:p>
+            <a:pPr lvl="0"/>
+            <a:r>
+              <a:rPr lang="de-DE" altLang="de-DE" dirty="0" err="1"/>
+              <a:t>git</a:t>
+            </a:r>
+            <a:r>
+              <a:rPr lang="de-DE" altLang="de-DE" dirty="0"/>
               <a:t> </a:t>
             </a:r>
             <a:r>
-              <a:rPr lang="de-DE" dirty="0" err="1" smtClean="0">
-                <a:solidFill>
-                  <a:srgbClr val="FF0000"/>
-                </a:solidFill>
-              </a:rPr>
-              <a:t>checkout</a:t>
-            </a:r>
-            <a:r>
-              <a:rPr lang="de-DE" dirty="0" smtClean="0">
-                <a:solidFill>
-                  <a:srgbClr val="FF0000"/>
-                </a:solidFill>
-              </a:rPr>
-              <a:t> –b &lt;</a:t>
-            </a:r>
-            <a:r>
-              <a:rPr lang="de-DE" dirty="0" err="1" smtClean="0">
-                <a:solidFill>
-                  <a:srgbClr val="FF0000"/>
-                </a:solidFill>
-              </a:rPr>
-              <a:t>newBranchName</a:t>
-            </a:r>
-            <a:r>
-              <a:rPr lang="de-DE" dirty="0" smtClean="0">
-                <a:solidFill>
-                  <a:srgbClr val="FF0000"/>
-                </a:solidFill>
-              </a:rPr>
-              <a:t>&gt;</a:t>
-            </a:r>
-            <a:r>
-              <a:rPr lang="de-DE" dirty="0" smtClean="0"/>
-              <a:t> erstellt man eine neue </a:t>
-            </a:r>
-            <a:r>
-              <a:rPr lang="de-DE" dirty="0" err="1" smtClean="0"/>
-              <a:t>Branch</a:t>
-            </a:r>
+              <a:rPr lang="de-DE" altLang="de-DE" dirty="0" err="1"/>
+              <a:t>diff</a:t>
+            </a:r>
+            <a:r>
+              <a:rPr lang="de-DE" altLang="de-DE" dirty="0"/>
+              <a:t> &lt;</a:t>
+            </a:r>
+            <a:r>
+              <a:rPr lang="de-DE" altLang="de-DE" dirty="0" err="1"/>
+              <a:t>quell_branch</a:t>
+            </a:r>
+            <a:r>
+              <a:rPr lang="de-DE" altLang="de-DE" dirty="0"/>
+              <a:t>&gt; &lt;</a:t>
+            </a:r>
+            <a:r>
+              <a:rPr lang="de-DE" altLang="de-DE" dirty="0" err="1"/>
+              <a:t>ziel_branch</a:t>
+            </a:r>
+            <a:r>
+              <a:rPr lang="de-DE" altLang="de-DE" dirty="0"/>
+              <a:t>&gt; </a:t>
+            </a:r>
+            <a:endParaRPr lang="de-DE" altLang="de-DE" dirty="0" smtClean="0"/>
+          </a:p>
+          <a:p>
+            <a:pPr lvl="1"/>
+            <a:r>
+              <a:rPr lang="de-DE" altLang="de-DE" dirty="0" smtClean="0"/>
+              <a:t>Zeigt die Differenzen zweier Branches an</a:t>
+            </a:r>
+            <a:endParaRPr lang="de-DE" altLang="de-DE" dirty="0"/>
+          </a:p>
+          <a:p>
             <a:endParaRPr lang="de-DE" dirty="0" smtClean="0"/>
           </a:p>
           <a:p>
-            <a:pPr indent="361950">
-              <a:buNone/>
-            </a:pPr>
-            <a:r>
-              <a:rPr lang="de-DE" dirty="0" smtClean="0"/>
-              <a:t>und wechselt direkt.</a:t>
-            </a:r>
-          </a:p>
-          <a:p>
-            <a:pPr indent="361950">
-              <a:buNone/>
-            </a:pPr>
-            <a:r>
-              <a:rPr lang="de-DE" dirty="0" smtClean="0"/>
-              <a:t>Nach dem Commit wieder wechseln zum Master (</a:t>
-            </a:r>
-            <a:r>
-              <a:rPr lang="de-DE" dirty="0" err="1" smtClean="0"/>
-              <a:t>git</a:t>
-            </a:r>
-            <a:r>
-              <a:rPr lang="de-DE" dirty="0" smtClean="0"/>
-              <a:t> </a:t>
-            </a:r>
-            <a:r>
-              <a:rPr lang="de-DE" dirty="0" err="1" smtClean="0"/>
-              <a:t>checkout</a:t>
-            </a:r>
-            <a:r>
-              <a:rPr lang="de-DE" dirty="0" smtClean="0"/>
-              <a:t> </a:t>
-            </a:r>
-            <a:r>
-              <a:rPr lang="de-DE" dirty="0" err="1" smtClean="0"/>
-              <a:t>master</a:t>
-            </a:r>
-            <a:r>
-              <a:rPr lang="de-DE" dirty="0" smtClean="0"/>
-              <a:t>)</a:t>
-            </a:r>
-          </a:p>
-          <a:p>
-            <a:pPr indent="361950">
-              <a:buNone/>
-            </a:pPr>
-            <a:r>
-              <a:rPr lang="de-DE" dirty="0" smtClean="0"/>
-              <a:t>Und </a:t>
-            </a:r>
-            <a:r>
-              <a:rPr lang="de-DE" dirty="0" err="1" smtClean="0"/>
-              <a:t>Mergen</a:t>
-            </a:r>
-            <a:r>
-              <a:rPr lang="de-DE" dirty="0" smtClean="0"/>
-              <a:t> mit der eben angelegten Branche</a:t>
-            </a:r>
-          </a:p>
-          <a:p>
-            <a:pPr indent="361950">
-              <a:buNone/>
-            </a:pPr>
-            <a:r>
-              <a:rPr lang="de-DE" dirty="0" smtClean="0"/>
-              <a:t>(</a:t>
-            </a:r>
-            <a:r>
-              <a:rPr lang="de-DE" dirty="0" err="1" smtClean="0"/>
-              <a:t>git</a:t>
-            </a:r>
-            <a:r>
-              <a:rPr lang="de-DE" dirty="0" smtClean="0"/>
-              <a:t> </a:t>
-            </a:r>
-            <a:r>
-              <a:rPr lang="de-DE" dirty="0" err="1" smtClean="0"/>
-              <a:t>merge</a:t>
-            </a:r>
-            <a:r>
-              <a:rPr lang="de-DE" dirty="0" smtClean="0"/>
-              <a:t> &lt;</a:t>
-            </a:r>
-            <a:r>
-              <a:rPr lang="de-DE" dirty="0" err="1" smtClean="0"/>
-              <a:t>newBranchName</a:t>
-            </a:r>
-            <a:r>
-              <a:rPr lang="de-DE" dirty="0" smtClean="0"/>
-              <a:t>&gt;)</a:t>
-            </a:r>
-          </a:p>
-          <a:p>
-            <a:pPr indent="0">
-              <a:buNone/>
-            </a:pPr>
+            <a:endParaRPr lang="de-DE" dirty="0"/>
+          </a:p>
+          <a:p>
             <a:endParaRPr lang="de-DE" dirty="0"/>
           </a:p>
         </p:txBody>
@@ -9007,10 +8909,9 @@
           <a:lstStyle/>
           <a:p>
             <a:r>
-              <a:rPr lang="de-DE" dirty="0" err="1" smtClean="0"/>
-              <a:t>Branches</a:t>
-            </a:r>
-            <a:endParaRPr lang="de-DE" dirty="0"/>
+              <a:rPr lang="de-DE" dirty="0"/>
+              <a:t>Wichtigste Befehle</a:t>
+            </a:r>
           </a:p>
         </p:txBody>
       </p:sp>
@@ -9031,7 +8932,11 @@
           </a:bodyPr>
           <a:lstStyle/>
           <a:p>
-            <a:endParaRPr lang="de-DE"/>
+            <a:r>
+              <a:rPr lang="de-DE" dirty="0" smtClean="0"/>
+              <a:t>Workflow</a:t>
+            </a:r>
+            <a:endParaRPr lang="de-DE" dirty="0"/>
           </a:p>
         </p:txBody>
       </p:sp>
@@ -9054,6 +8959,335 @@
               <a:rPr lang="de-DE" smtClean="0"/>
               <a:pPr/>
               <a:t>11</a:t>
+            </a:fld>
+            <a:endParaRPr lang="de-DE" dirty="0"/>
+          </a:p>
+        </p:txBody>
+      </p:sp>
+    </p:spTree>
+    <p:extLst>
+      <p:ext uri="{BB962C8B-B14F-4D97-AF65-F5344CB8AC3E}">
+        <p14:creationId xmlns:p14="http://schemas.microsoft.com/office/powerpoint/2010/main" val="1191540642"/>
+      </p:ext>
+    </p:extLst>
+  </p:cSld>
+  <p:clrMapOvr>
+    <a:masterClrMapping/>
+  </p:clrMapOvr>
+</p:sld>
+</file>
+
+<file path=ppt/slides/slide12.xml><?xml version="1.0" encoding="utf-8"?>
+<p:sld xmlns:a="http://schemas.openxmlformats.org/drawingml/2006/main" xmlns:r="http://schemas.openxmlformats.org/officeDocument/2006/relationships" xmlns:p="http://schemas.openxmlformats.org/presentationml/2006/main">
+  <p:cSld>
+    <p:spTree>
+      <p:nvGrpSpPr>
+        <p:cNvPr id="1" name=""/>
+        <p:cNvGrpSpPr/>
+        <p:nvPr/>
+      </p:nvGrpSpPr>
+      <p:grpSpPr>
+        <a:xfrm>
+          <a:off x="0" y="0"/>
+          <a:ext cx="0" cy="0"/>
+          <a:chOff x="0" y="0"/>
+          <a:chExt cx="0" cy="0"/>
+        </a:xfrm>
+      </p:grpSpPr>
+      <p:sp>
+        <p:nvSpPr>
+          <p:cNvPr id="2" name="Textplatzhalter 1"/>
+          <p:cNvSpPr>
+            <a:spLocks noGrp="1"/>
+          </p:cNvSpPr>
+          <p:nvPr>
+            <p:ph type="body" sz="quarter" idx="19"/>
+          </p:nvPr>
+        </p:nvSpPr>
+        <p:spPr/>
+        <p:txBody>
+          <a:bodyPr/>
+          <a:lstStyle/>
+          <a:p>
+            <a:r>
+              <a:rPr lang="de-DE" dirty="0" err="1" smtClean="0"/>
+              <a:t>Branching</a:t>
+            </a:r>
+            <a:r>
+              <a:rPr lang="de-DE" dirty="0" smtClean="0"/>
+              <a:t> hilft dabei Tickets nach einem Ticket-Tracking-System</a:t>
+            </a:r>
+          </a:p>
+          <a:p>
+            <a:pPr indent="361950">
+              <a:buNone/>
+            </a:pPr>
+            <a:r>
+              <a:rPr lang="de-DE" dirty="0"/>
+              <a:t>a</a:t>
+            </a:r>
+            <a:r>
+              <a:rPr lang="de-DE" dirty="0" smtClean="0"/>
+              <a:t>bzuarbeiten</a:t>
+            </a:r>
+            <a:endParaRPr lang="de-DE" dirty="0" smtClean="0"/>
+          </a:p>
+          <a:p>
+            <a:r>
+              <a:rPr lang="de-DE" dirty="0" smtClean="0"/>
+              <a:t>Mit </a:t>
+            </a:r>
+            <a:r>
+              <a:rPr lang="de-DE" dirty="0" smtClean="0">
+                <a:solidFill>
+                  <a:srgbClr val="FF0000"/>
+                </a:solidFill>
+              </a:rPr>
+              <a:t>Git </a:t>
+            </a:r>
+            <a:r>
+              <a:rPr lang="de-DE" dirty="0" err="1" smtClean="0">
+                <a:solidFill>
+                  <a:srgbClr val="FF0000"/>
+                </a:solidFill>
+              </a:rPr>
+              <a:t>checkout</a:t>
+            </a:r>
+            <a:r>
+              <a:rPr lang="de-DE" dirty="0" smtClean="0">
+                <a:solidFill>
+                  <a:srgbClr val="FF0000"/>
+                </a:solidFill>
+              </a:rPr>
+              <a:t> –b &lt;</a:t>
+            </a:r>
+            <a:r>
+              <a:rPr lang="de-DE" dirty="0" err="1" smtClean="0">
+                <a:solidFill>
+                  <a:srgbClr val="FF0000"/>
+                </a:solidFill>
+              </a:rPr>
+              <a:t>newBranchName</a:t>
+            </a:r>
+            <a:r>
+              <a:rPr lang="de-DE" dirty="0" smtClean="0">
+                <a:solidFill>
+                  <a:srgbClr val="FF0000"/>
+                </a:solidFill>
+              </a:rPr>
+              <a:t>&gt;</a:t>
+            </a:r>
+            <a:r>
+              <a:rPr lang="de-DE" dirty="0" smtClean="0"/>
+              <a:t> erstellt man </a:t>
+            </a:r>
+            <a:r>
+              <a:rPr lang="de-DE" dirty="0" smtClean="0"/>
+              <a:t>einen neuen </a:t>
+            </a:r>
+            <a:r>
+              <a:rPr lang="de-DE" dirty="0" err="1" smtClean="0"/>
+              <a:t>Branch</a:t>
+            </a:r>
+            <a:endParaRPr lang="de-DE" dirty="0" smtClean="0"/>
+          </a:p>
+          <a:p>
+            <a:pPr indent="361950">
+              <a:buNone/>
+            </a:pPr>
+            <a:r>
+              <a:rPr lang="de-DE" dirty="0" smtClean="0"/>
+              <a:t>und wechselt </a:t>
+            </a:r>
+            <a:r>
+              <a:rPr lang="de-DE" dirty="0" smtClean="0"/>
+              <a:t>direkt vom aktuellen zum neu erstellten </a:t>
+            </a:r>
+            <a:r>
+              <a:rPr lang="de-DE" dirty="0" err="1" smtClean="0"/>
+              <a:t>Branch</a:t>
+            </a:r>
+            <a:r>
+              <a:rPr lang="de-DE" dirty="0" smtClean="0"/>
+              <a:t>.</a:t>
+            </a:r>
+            <a:endParaRPr lang="de-DE" dirty="0" smtClean="0"/>
+          </a:p>
+          <a:p>
+            <a:pPr indent="361950">
+              <a:buNone/>
+              <a:tabLst>
+                <a:tab pos="361950" algn="l"/>
+              </a:tabLst>
+            </a:pPr>
+            <a:r>
+              <a:rPr lang="de-DE" dirty="0" smtClean="0"/>
+              <a:t>Nach dem Commit </a:t>
+            </a:r>
+            <a:r>
+              <a:rPr lang="de-DE" dirty="0"/>
+              <a:t>wechselt man wieder </a:t>
+            </a:r>
+            <a:r>
+              <a:rPr lang="de-DE" dirty="0" smtClean="0"/>
+              <a:t>zum Master (</a:t>
+            </a:r>
+            <a:r>
+              <a:rPr lang="de-DE" dirty="0" err="1" smtClean="0"/>
+              <a:t>git</a:t>
+            </a:r>
+            <a:r>
+              <a:rPr lang="de-DE" dirty="0" smtClean="0"/>
+              <a:t> </a:t>
+            </a:r>
+            <a:r>
+              <a:rPr lang="de-DE" dirty="0" err="1" smtClean="0"/>
+              <a:t>checkout</a:t>
+            </a:r>
+            <a:r>
+              <a:rPr lang="de-DE" dirty="0" smtClean="0"/>
+              <a:t> </a:t>
+            </a:r>
+            <a:r>
+              <a:rPr lang="de-DE" dirty="0"/>
+              <a:t>	</a:t>
+            </a:r>
+            <a:r>
+              <a:rPr lang="de-DE" dirty="0" err="1" smtClean="0"/>
+              <a:t>master</a:t>
+            </a:r>
+            <a:r>
+              <a:rPr lang="de-DE" dirty="0" smtClean="0"/>
+              <a:t>) und </a:t>
+            </a:r>
+            <a:r>
+              <a:rPr lang="de-DE" dirty="0" err="1" smtClean="0"/>
+              <a:t>merged</a:t>
+            </a:r>
+            <a:r>
+              <a:rPr lang="de-DE" dirty="0" smtClean="0"/>
+              <a:t> </a:t>
+            </a:r>
+            <a:r>
+              <a:rPr lang="de-DE" dirty="0" smtClean="0"/>
+              <a:t>mit der eben angelegten </a:t>
+            </a:r>
+            <a:r>
+              <a:rPr lang="de-DE" dirty="0" err="1" smtClean="0"/>
+              <a:t>Branch</a:t>
+            </a:r>
+            <a:r>
+              <a:rPr lang="de-DE" dirty="0" smtClean="0"/>
+              <a:t>.</a:t>
+            </a:r>
+            <a:endParaRPr lang="de-DE" dirty="0" smtClean="0"/>
+          </a:p>
+          <a:p>
+            <a:pPr indent="361950">
+              <a:buNone/>
+            </a:pPr>
+            <a:r>
+              <a:rPr lang="de-DE" dirty="0" smtClean="0"/>
+              <a:t>(</a:t>
+            </a:r>
+            <a:r>
+              <a:rPr lang="de-DE" dirty="0" err="1" smtClean="0"/>
+              <a:t>git</a:t>
+            </a:r>
+            <a:r>
+              <a:rPr lang="de-DE" dirty="0" smtClean="0"/>
+              <a:t> </a:t>
+            </a:r>
+            <a:r>
+              <a:rPr lang="de-DE" dirty="0" err="1" smtClean="0"/>
+              <a:t>merge</a:t>
+            </a:r>
+            <a:r>
+              <a:rPr lang="de-DE" dirty="0" smtClean="0"/>
+              <a:t> &lt;</a:t>
+            </a:r>
+            <a:r>
+              <a:rPr lang="de-DE" dirty="0" err="1" smtClean="0"/>
+              <a:t>newBranchName</a:t>
+            </a:r>
+            <a:r>
+              <a:rPr lang="de-DE" dirty="0" smtClean="0"/>
+              <a:t>&gt;)</a:t>
+            </a:r>
+          </a:p>
+          <a:p>
+            <a:pPr indent="0">
+              <a:buNone/>
+            </a:pPr>
+            <a:endParaRPr lang="de-DE" dirty="0"/>
+          </a:p>
+        </p:txBody>
+      </p:sp>
+      <p:sp>
+        <p:nvSpPr>
+          <p:cNvPr id="3" name="Titel 2"/>
+          <p:cNvSpPr>
+            <a:spLocks noGrp="1"/>
+          </p:cNvSpPr>
+          <p:nvPr>
+            <p:ph type="title"/>
+          </p:nvPr>
+        </p:nvSpPr>
+        <p:spPr/>
+        <p:txBody>
+          <a:bodyPr>
+            <a:normAutofit fontScale="90000"/>
+          </a:bodyPr>
+          <a:lstStyle/>
+          <a:p>
+            <a:r>
+              <a:rPr lang="de-DE" dirty="0" err="1" smtClean="0"/>
+              <a:t>Branches</a:t>
+            </a:r>
+            <a:endParaRPr lang="de-DE" dirty="0"/>
+          </a:p>
+        </p:txBody>
+      </p:sp>
+      <p:sp>
+        <p:nvSpPr>
+          <p:cNvPr id="4" name="Untertitel 3"/>
+          <p:cNvSpPr>
+            <a:spLocks noGrp="1"/>
+          </p:cNvSpPr>
+          <p:nvPr>
+            <p:ph type="subTitle" idx="1"/>
+          </p:nvPr>
+        </p:nvSpPr>
+        <p:spPr/>
+        <p:txBody>
+          <a:bodyPr>
+            <a:normAutofit lnSpcReduction="10000"/>
+          </a:bodyPr>
+          <a:lstStyle/>
+          <a:p>
+            <a:endParaRPr lang="de-DE"/>
+          </a:p>
+        </p:txBody>
+      </p:sp>
+      <p:sp>
+        <p:nvSpPr>
+          <p:cNvPr id="5" name="Foliennummernplatzhalter 4"/>
+          <p:cNvSpPr>
+            <a:spLocks noGrp="1"/>
+          </p:cNvSpPr>
+          <p:nvPr>
+            <p:ph type="sldNum" sz="quarter" idx="4"/>
+          </p:nvPr>
+        </p:nvSpPr>
+        <p:spPr/>
+        <p:txBody>
+          <a:bodyPr/>
+          <a:lstStyle/>
+          <a:p>
+            <a:fld id="{F777D48D-F22C-624F-9C01-7CDA9A361691}" type="slidenum">
+              <a:rPr lang="de-DE" smtClean="0"/>
+              <a:pPr/>
+              <a:t>12</a:t>
             </a:fld>
             <a:endParaRPr lang="de-DE" dirty="0"/>
           </a:p>
@@ -9109,7 +9343,7 @@
 </p:sld>
 </file>
 
-<file path=ppt/slides/slide12.xml><?xml version="1.0" encoding="utf-8"?>
+<file path=ppt/slides/slide13.xml><?xml version="1.0" encoding="utf-8"?>
 <p:sld xmlns:a="http://schemas.openxmlformats.org/drawingml/2006/main" xmlns:r="http://schemas.openxmlformats.org/officeDocument/2006/relationships" xmlns:p="http://schemas.openxmlformats.org/presentationml/2006/main">
   <p:cSld>
     <p:spTree>
@@ -9178,18 +9412,10 @@
             </a:r>
             <a:r>
               <a:rPr lang="de-DE" dirty="0"/>
-              <a:t> </a:t>
-            </a:r>
-            <a:r>
-              <a:rPr lang="de-DE" dirty="0">
-                <a:hlinkClick r:id="rId2"/>
-              </a:rPr>
-              <a:t>https</a:t>
-            </a:r>
-            <a:r>
-              <a:rPr lang="de-DE" dirty="0" smtClean="0">
-                <a:hlinkClick r:id="rId2"/>
-              </a:rPr>
+              <a:t> https</a:t>
+            </a:r>
+            <a:r>
+              <a:rPr lang="de-DE" dirty="0" smtClean="0"/>
               <a:t>://github.com/daHaimi/2dgame-thi-2016.git</a:t>
             </a:r>
             <a:r>
@@ -9346,7 +9572,7 @@
             <a:fld id="{F777D48D-F22C-624F-9C01-7CDA9A361691}" type="slidenum">
               <a:rPr lang="de-DE" smtClean="0"/>
               <a:pPr/>
-              <a:t>12</a:t>
+              <a:t>13</a:t>
             </a:fld>
             <a:endParaRPr lang="de-DE" dirty="0"/>
           </a:p>
@@ -9372,181 +9598,6 @@
 </p:sld>
 </file>
 
-<file path=ppt/slides/slide13.xml><?xml version="1.0" encoding="utf-8"?>
-<p:sld xmlns:a="http://schemas.openxmlformats.org/drawingml/2006/main" xmlns:r="http://schemas.openxmlformats.org/officeDocument/2006/relationships" xmlns:p="http://schemas.openxmlformats.org/presentationml/2006/main">
-  <p:cSld>
-    <p:spTree>
-      <p:nvGrpSpPr>
-        <p:cNvPr id="1" name=""/>
-        <p:cNvGrpSpPr/>
-        <p:nvPr/>
-      </p:nvGrpSpPr>
-      <p:grpSpPr>
-        <a:xfrm>
-          <a:off x="0" y="0"/>
-          <a:ext cx="0" cy="0"/>
-          <a:chOff x="0" y="0"/>
-          <a:chExt cx="0" cy="0"/>
-        </a:xfrm>
-      </p:grpSpPr>
-      <p:sp>
-        <p:nvSpPr>
-          <p:cNvPr id="2" name="Textplatzhalter 1"/>
-          <p:cNvSpPr>
-            <a:spLocks noGrp="1"/>
-          </p:cNvSpPr>
-          <p:nvPr>
-            <p:ph type="body" sz="quarter" idx="19"/>
-          </p:nvPr>
-        </p:nvSpPr>
-        <p:spPr/>
-        <p:txBody>
-          <a:bodyPr/>
-          <a:lstStyle/>
-          <a:p>
-            <a:r>
-              <a:rPr lang="de-DE" dirty="0" smtClean="0"/>
-              <a:t>Code Experiment</a:t>
-            </a:r>
-          </a:p>
-          <a:p>
-            <a:r>
-              <a:rPr lang="de-DE" dirty="0" smtClean="0"/>
-              <a:t>Statt vorsichtiges Layer für Layer erstellen, </a:t>
-            </a:r>
-            <a:r>
-              <a:rPr lang="de-DE" dirty="0" err="1" smtClean="0"/>
-              <a:t>Brutforce</a:t>
-            </a:r>
-            <a:r>
-              <a:rPr lang="de-DE" dirty="0" smtClean="0"/>
-              <a:t> Methode durch alle Schichten</a:t>
-            </a:r>
-          </a:p>
-          <a:p>
-            <a:r>
-              <a:rPr lang="de-DE" dirty="0" smtClean="0"/>
-              <a:t>Quick &amp; </a:t>
-            </a:r>
-            <a:r>
-              <a:rPr lang="de-DE" dirty="0" err="1" smtClean="0"/>
-              <a:t>Dirty</a:t>
-            </a:r>
-            <a:r>
-              <a:rPr lang="de-DE" dirty="0" smtClean="0"/>
-              <a:t> Lösung bei einem neuangefangenen Wegwerfprojekt</a:t>
-            </a:r>
-          </a:p>
-          <a:p>
-            <a:r>
-              <a:rPr lang="de-DE" dirty="0" smtClean="0"/>
-              <a:t>Code wird nur soweit programmiert bis er eine Antwort auf unsere Fragestellung ausspuckt.</a:t>
-            </a:r>
-            <a:endParaRPr lang="de-DE" dirty="0"/>
-          </a:p>
-          <a:p>
-            <a:r>
-              <a:rPr lang="de-DE" dirty="0" smtClean="0"/>
-              <a:t>Herumbasteln und Hacken erwünscht</a:t>
-            </a:r>
-          </a:p>
-          <a:p>
-            <a:r>
-              <a:rPr lang="de-DE" dirty="0" smtClean="0"/>
-              <a:t>Kein Bedarf von Unit Tests</a:t>
-            </a:r>
-          </a:p>
-          <a:p>
-            <a:r>
-              <a:rPr lang="de-DE" dirty="0" smtClean="0"/>
-              <a:t>Nach erfolgreichem Durchlauf mit brauchbaren Ergebnissen, Code wegwerfen</a:t>
-            </a:r>
-          </a:p>
-        </p:txBody>
-      </p:sp>
-      <p:sp>
-        <p:nvSpPr>
-          <p:cNvPr id="3" name="Titel 2"/>
-          <p:cNvSpPr>
-            <a:spLocks noGrp="1"/>
-          </p:cNvSpPr>
-          <p:nvPr>
-            <p:ph type="title"/>
-          </p:nvPr>
-        </p:nvSpPr>
-        <p:spPr/>
-        <p:txBody>
-          <a:bodyPr>
-            <a:normAutofit fontScale="90000"/>
-          </a:bodyPr>
-          <a:lstStyle/>
-          <a:p>
-            <a:r>
-              <a:rPr lang="de-DE" dirty="0" smtClean="0"/>
-              <a:t>Spike Solutions</a:t>
-            </a:r>
-            <a:endParaRPr lang="de-DE" dirty="0"/>
-          </a:p>
-        </p:txBody>
-      </p:sp>
-      <p:sp>
-        <p:nvSpPr>
-          <p:cNvPr id="4" name="Untertitel 3"/>
-          <p:cNvSpPr>
-            <a:spLocks noGrp="1"/>
-          </p:cNvSpPr>
-          <p:nvPr>
-            <p:ph type="subTitle" idx="1"/>
-          </p:nvPr>
-        </p:nvSpPr>
-        <p:spPr/>
-        <p:txBody>
-          <a:bodyPr>
-            <a:normAutofit lnSpcReduction="10000"/>
-          </a:bodyPr>
-          <a:lstStyle/>
-          <a:p>
-            <a:endParaRPr lang="de-DE"/>
-          </a:p>
-        </p:txBody>
-      </p:sp>
-      <p:sp>
-        <p:nvSpPr>
-          <p:cNvPr id="5" name="Foliennummernplatzhalter 4"/>
-          <p:cNvSpPr>
-            <a:spLocks noGrp="1"/>
-          </p:cNvSpPr>
-          <p:nvPr>
-            <p:ph type="sldNum" sz="quarter" idx="4"/>
-          </p:nvPr>
-        </p:nvSpPr>
-        <p:spPr/>
-        <p:txBody>
-          <a:bodyPr/>
-          <a:lstStyle/>
-          <a:p>
-            <a:fld id="{F777D48D-F22C-624F-9C01-7CDA9A361691}" type="slidenum">
-              <a:rPr lang="de-DE" smtClean="0"/>
-              <a:pPr/>
-              <a:t>13</a:t>
-            </a:fld>
-            <a:endParaRPr lang="de-DE" dirty="0"/>
-          </a:p>
-        </p:txBody>
-      </p:sp>
-    </p:spTree>
-    <p:extLst>
-      <p:ext uri="{BB962C8B-B14F-4D97-AF65-F5344CB8AC3E}">
-        <p14:creationId xmlns:p14="http://schemas.microsoft.com/office/powerpoint/2010/main" val="3076125962"/>
-      </p:ext>
-    </p:extLst>
-  </p:cSld>
-  <p:clrMapOvr>
-    <a:masterClrMapping/>
-  </p:clrMapOvr>
-</p:sld>
-</file>
-
 <file path=ppt/slides/slide14.xml><?xml version="1.0" encoding="utf-8"?>
 <p:sld xmlns:a="http://schemas.openxmlformats.org/drawingml/2006/main" xmlns:r="http://schemas.openxmlformats.org/officeDocument/2006/relationships" xmlns:p="http://schemas.openxmlformats.org/presentationml/2006/main">
   <p:cSld>
@@ -9581,92 +9632,97 @@
           <a:p>
             <a:r>
               <a:rPr lang="de-DE" dirty="0" smtClean="0"/>
-              <a:t>Arbeiten in Branchen, aber danach nicht </a:t>
+              <a:t>Code Experiment</a:t>
+            </a:r>
+          </a:p>
+          <a:p>
+            <a:pPr>
+              <a:tabLst>
+                <a:tab pos="361950" algn="l"/>
+              </a:tabLst>
+            </a:pPr>
+            <a:r>
+              <a:rPr lang="de-DE" dirty="0" smtClean="0"/>
+              <a:t>Statt vorsichtiges Layer für Layer erstellen, </a:t>
             </a:r>
             <a:r>
               <a:rPr lang="de-DE" dirty="0" err="1" smtClean="0"/>
-              <a:t>Mergen</a:t>
+              <a:t>Brutforce</a:t>
+            </a:r>
+            <a:r>
+              <a:rPr lang="de-DE" dirty="0" smtClean="0"/>
+              <a:t> Methode durch </a:t>
+            </a:r>
+            <a:r>
+              <a:rPr lang="de-DE" dirty="0" smtClean="0"/>
+              <a:t>	alle </a:t>
+            </a:r>
+            <a:r>
+              <a:rPr lang="de-DE" dirty="0" smtClean="0"/>
+              <a:t>Schichten</a:t>
+            </a:r>
+          </a:p>
+          <a:p>
+            <a:r>
+              <a:rPr lang="de-DE" dirty="0" smtClean="0"/>
+              <a:t>Quick &amp; </a:t>
+            </a:r>
+            <a:r>
+              <a:rPr lang="de-DE" dirty="0" err="1" smtClean="0"/>
+              <a:t>Dirty</a:t>
+            </a:r>
+            <a:r>
+              <a:rPr lang="de-DE" dirty="0" smtClean="0"/>
+              <a:t> Lösung bei einem neuangefangenen Wegwerfprojekt</a:t>
+            </a:r>
+          </a:p>
+          <a:p>
+            <a:pPr>
+              <a:tabLst>
+                <a:tab pos="361950" algn="l"/>
+              </a:tabLst>
+            </a:pPr>
+            <a:r>
+              <a:rPr lang="de-DE" dirty="0" smtClean="0"/>
+              <a:t>Code wird nur soweit programmiert bis er eine Antwort auf unsere </a:t>
+            </a:r>
+            <a:r>
+              <a:rPr lang="de-DE" dirty="0" smtClean="0"/>
+              <a:t>	Fragestellung </a:t>
+            </a:r>
+            <a:r>
+              <a:rPr lang="de-DE" dirty="0" smtClean="0"/>
+              <a:t>ausspuckt.</a:t>
+            </a:r>
+            <a:endParaRPr lang="de-DE" dirty="0"/>
+          </a:p>
+          <a:p>
+            <a:r>
+              <a:rPr lang="de-DE" dirty="0" smtClean="0"/>
+              <a:t>Herumbasteln und Hacken erwünscht</a:t>
+            </a:r>
+          </a:p>
+          <a:p>
+            <a:r>
+              <a:rPr lang="de-DE" dirty="0" smtClean="0"/>
+              <a:t>Kein Bedarf von Unit Tests</a:t>
+            </a:r>
+          </a:p>
+          <a:p>
+            <a:pPr>
+              <a:tabLst>
+                <a:tab pos="361950" algn="l"/>
+              </a:tabLst>
+            </a:pPr>
+            <a:r>
+              <a:rPr lang="de-DE" dirty="0" smtClean="0"/>
+              <a:t>Nach erfolgreichem Durchlauf mit brauchbaren Ergebnissen, Code </a:t>
+            </a:r>
+            <a:r>
+              <a:rPr lang="de-DE" dirty="0" smtClean="0"/>
+              <a:t>	wegwerfen</a:t>
             </a:r>
             <a:endParaRPr lang="de-DE" dirty="0" smtClean="0"/>
-          </a:p>
-          <a:p>
-            <a:pPr lvl="1"/>
-            <a:r>
-              <a:rPr lang="de-DE" dirty="0" smtClean="0"/>
-              <a:t>Wenn die Branche nicht länger braucht, löschen</a:t>
-            </a:r>
-          </a:p>
-          <a:p>
-            <a:r>
-              <a:rPr lang="de-DE" dirty="0" smtClean="0"/>
-              <a:t>Den Spike da anbringen, wo er schnell läuft</a:t>
-            </a:r>
-          </a:p>
-          <a:p>
-            <a:pPr lvl="1"/>
-            <a:r>
-              <a:rPr lang="de-DE" dirty="0" smtClean="0"/>
-              <a:t>Vermeide langes navigieren in deiner laufenden Anwendung</a:t>
-            </a:r>
-          </a:p>
-          <a:p>
-            <a:r>
-              <a:rPr lang="de-DE" dirty="0" smtClean="0"/>
-              <a:t>Arbeite in kleinen Schritten, überprüfen deinen Fortschritt</a:t>
-            </a:r>
-          </a:p>
-          <a:p>
-            <a:pPr lvl="1"/>
-            <a:r>
-              <a:rPr lang="de-DE" dirty="0" smtClean="0"/>
-              <a:t>Wenn du Feedback bekommen kannst, hol es dir</a:t>
-            </a:r>
-          </a:p>
-          <a:p>
-            <a:r>
-              <a:rPr lang="de-DE" dirty="0" err="1" smtClean="0"/>
-              <a:t>Copy</a:t>
-            </a:r>
-            <a:r>
-              <a:rPr lang="de-DE" dirty="0" smtClean="0"/>
-              <a:t> </a:t>
-            </a:r>
-            <a:r>
-              <a:rPr lang="de-DE" dirty="0" err="1" smtClean="0"/>
-              <a:t>and</a:t>
-            </a:r>
-            <a:r>
-              <a:rPr lang="de-DE" dirty="0" smtClean="0"/>
-              <a:t> </a:t>
-            </a:r>
-            <a:r>
-              <a:rPr lang="de-DE" dirty="0" err="1" smtClean="0"/>
-              <a:t>Past</a:t>
-            </a:r>
-            <a:r>
-              <a:rPr lang="de-DE" dirty="0" smtClean="0"/>
-              <a:t> großzügig</a:t>
-            </a:r>
-          </a:p>
-          <a:p>
-            <a:pPr lvl="1"/>
-            <a:r>
-              <a:rPr lang="de-DE" dirty="0" err="1" smtClean="0"/>
-              <a:t>StackOverflow</a:t>
-            </a:r>
-            <a:r>
-              <a:rPr lang="de-DE" dirty="0" smtClean="0"/>
-              <a:t> ist dein Freund, weil wir hier nur Hacken, nicht Test Treiber Programmierung betreiben</a:t>
-            </a:r>
-          </a:p>
-          <a:p>
-            <a:pPr indent="0">
-              <a:buNone/>
-            </a:pPr>
-            <a:endParaRPr lang="de-DE" dirty="0"/>
-          </a:p>
-          <a:p>
-            <a:endParaRPr lang="de-DE" dirty="0"/>
           </a:p>
         </p:txBody>
       </p:sp>
@@ -9689,7 +9745,7 @@
           <a:p>
             <a:r>
               <a:rPr lang="de-DE" dirty="0" smtClean="0"/>
-              <a:t>Techniken für Spike Solution</a:t>
+              <a:t>Spike Solutions</a:t>
             </a:r>
             <a:endParaRPr lang="de-DE" dirty="0"/>
           </a:p>
@@ -9743,7 +9799,7 @@
     </p:spTree>
     <p:extLst>
       <p:ext uri="{BB962C8B-B14F-4D97-AF65-F5344CB8AC3E}">
-        <p14:creationId xmlns:p14="http://schemas.microsoft.com/office/powerpoint/2010/main" val="265235408"/>
+        <p14:creationId xmlns:p14="http://schemas.microsoft.com/office/powerpoint/2010/main" val="3076125962"/>
       </p:ext>
     </p:extLst>
   </p:cSld>
@@ -9787,49 +9843,125 @@
           <a:p>
             <a:r>
               <a:rPr lang="de-DE" dirty="0" smtClean="0"/>
-              <a:t>Nutze Anwendungscode</a:t>
-            </a:r>
+              <a:t>Arbeiten in Branchen, aber danach nicht </a:t>
+            </a:r>
+            <a:r>
+              <a:rPr lang="de-DE" dirty="0" err="1" smtClean="0"/>
+              <a:t>Mergen</a:t>
+            </a:r>
+            <a:endParaRPr lang="de-DE" dirty="0" smtClean="0"/>
           </a:p>
           <a:p>
             <a:pPr lvl="1"/>
             <a:r>
               <a:rPr lang="de-DE" dirty="0" smtClean="0"/>
-              <a:t>Je besser du es lernst, desto weniger musst du schreiben</a:t>
-            </a:r>
-          </a:p>
-          <a:p>
-            <a:r>
-              <a:rPr lang="de-DE" dirty="0" smtClean="0"/>
-              <a:t>Schreib keinen Code den du nicht brauchst</a:t>
+              <a:t>Lösche</a:t>
+            </a:r>
+            <a:r>
+              <a:rPr lang="de-DE" dirty="0" smtClean="0"/>
+              <a:t> </a:t>
+            </a:r>
+            <a:r>
+              <a:rPr lang="de-DE" dirty="0" smtClean="0"/>
+              <a:t>die </a:t>
+            </a:r>
+            <a:r>
+              <a:rPr lang="de-DE" dirty="0" smtClean="0"/>
+              <a:t>Branches, die nicht </a:t>
+            </a:r>
+            <a:r>
+              <a:rPr lang="de-DE" dirty="0" smtClean="0"/>
+              <a:t>länger </a:t>
+            </a:r>
+            <a:r>
+              <a:rPr lang="de-DE" dirty="0" smtClean="0"/>
+              <a:t>benötigt werden</a:t>
+            </a:r>
+            <a:endParaRPr lang="de-DE" dirty="0" smtClean="0"/>
+          </a:p>
+          <a:p>
+            <a:r>
+              <a:rPr lang="de-DE" dirty="0" smtClean="0"/>
+              <a:t>Den Spike da anbringen, wo er schnell läuft</a:t>
             </a:r>
           </a:p>
           <a:p>
             <a:pPr lvl="1"/>
             <a:r>
               <a:rPr lang="de-DE" dirty="0" smtClean="0"/>
-              <a:t>Ziel ist es eine Antwort zu bekommen, keinen sauberen Code</a:t>
-            </a:r>
-          </a:p>
-          <a:p>
-            <a:r>
-              <a:rPr lang="de-DE" dirty="0" smtClean="0"/>
-              <a:t>Setze deine Spike Solution nicht in deinen Produktivcode ein</a:t>
+              <a:t>Vermeide langes navigieren in deiner laufenden Anwendung</a:t>
+            </a:r>
+          </a:p>
+          <a:p>
+            <a:r>
+              <a:rPr lang="de-DE" dirty="0" smtClean="0"/>
+              <a:t>Arbeite in kleinen Schritten, </a:t>
+            </a:r>
+            <a:r>
+              <a:rPr lang="de-DE" dirty="0" smtClean="0"/>
+              <a:t>überprüfe </a:t>
+            </a:r>
+            <a:r>
+              <a:rPr lang="de-DE" dirty="0" smtClean="0"/>
+              <a:t>deinen Fortschritt</a:t>
             </a:r>
           </a:p>
           <a:p>
             <a:pPr lvl="1"/>
             <a:r>
               <a:rPr lang="de-DE" dirty="0" smtClean="0"/>
-              <a:t>Schmeiß sie weg wenn du fertig bist, ist nur quick &amp; </a:t>
-            </a:r>
+              <a:t>Wenn du Feedback bekommen kannst, hol es dir</a:t>
+            </a:r>
+          </a:p>
+          <a:p>
             <a:r>
               <a:rPr lang="de-DE" dirty="0" err="1" smtClean="0"/>
-              <a:t>dirty</a:t>
-            </a:r>
-            <a:r>
-              <a:rPr lang="de-DE" dirty="0" smtClean="0"/>
-              <a:t>!</a:t>
-            </a:r>
+              <a:t>Copy</a:t>
+            </a:r>
+            <a:r>
+              <a:rPr lang="de-DE" dirty="0" smtClean="0"/>
+              <a:t> </a:t>
+            </a:r>
+            <a:r>
+              <a:rPr lang="de-DE" dirty="0" err="1" smtClean="0"/>
+              <a:t>and</a:t>
+            </a:r>
+            <a:r>
+              <a:rPr lang="de-DE" dirty="0" smtClean="0"/>
+              <a:t> </a:t>
+            </a:r>
+            <a:r>
+              <a:rPr lang="de-DE" dirty="0" err="1" smtClean="0"/>
+              <a:t>Past</a:t>
+            </a:r>
+            <a:r>
+              <a:rPr lang="de-DE" dirty="0" smtClean="0"/>
+              <a:t> </a:t>
+            </a:r>
+            <a:r>
+              <a:rPr lang="de-DE" dirty="0" smtClean="0"/>
+              <a:t>großzügig Verwenden</a:t>
+            </a:r>
+            <a:endParaRPr lang="de-DE" dirty="0" smtClean="0"/>
+          </a:p>
+          <a:p>
+            <a:pPr lvl="1"/>
+            <a:r>
+              <a:rPr lang="de-DE" dirty="0" err="1" smtClean="0"/>
+              <a:t>StackOverflow</a:t>
+            </a:r>
+            <a:r>
+              <a:rPr lang="de-DE" dirty="0" smtClean="0"/>
+              <a:t> ist dein Freund, weil wir hier nur Hacken, nicht Test Treiber Programmierung betreiben</a:t>
+            </a:r>
+          </a:p>
+          <a:p>
+            <a:pPr indent="0">
+              <a:buNone/>
+            </a:pPr>
+            <a:endParaRPr lang="de-DE" dirty="0"/>
+          </a:p>
+          <a:p>
             <a:endParaRPr lang="de-DE" dirty="0"/>
           </a:p>
         </p:txBody>
@@ -9899,6 +10031,186 @@
               <a:rPr lang="de-DE" smtClean="0"/>
               <a:pPr/>
               <a:t>15</a:t>
+            </a:fld>
+            <a:endParaRPr lang="de-DE" dirty="0"/>
+          </a:p>
+        </p:txBody>
+      </p:sp>
+    </p:spTree>
+    <p:extLst>
+      <p:ext uri="{BB962C8B-B14F-4D97-AF65-F5344CB8AC3E}">
+        <p14:creationId xmlns:p14="http://schemas.microsoft.com/office/powerpoint/2010/main" val="265235408"/>
+      </p:ext>
+    </p:extLst>
+  </p:cSld>
+  <p:clrMapOvr>
+    <a:masterClrMapping/>
+  </p:clrMapOvr>
+</p:sld>
+</file>
+
+<file path=ppt/slides/slide16.xml><?xml version="1.0" encoding="utf-8"?>
+<p:sld xmlns:a="http://schemas.openxmlformats.org/drawingml/2006/main" xmlns:r="http://schemas.openxmlformats.org/officeDocument/2006/relationships" xmlns:p="http://schemas.openxmlformats.org/presentationml/2006/main">
+  <p:cSld>
+    <p:spTree>
+      <p:nvGrpSpPr>
+        <p:cNvPr id="1" name=""/>
+        <p:cNvGrpSpPr/>
+        <p:nvPr/>
+      </p:nvGrpSpPr>
+      <p:grpSpPr>
+        <a:xfrm>
+          <a:off x="0" y="0"/>
+          <a:ext cx="0" cy="0"/>
+          <a:chOff x="0" y="0"/>
+          <a:chExt cx="0" cy="0"/>
+        </a:xfrm>
+      </p:grpSpPr>
+      <p:sp>
+        <p:nvSpPr>
+          <p:cNvPr id="2" name="Textplatzhalter 1"/>
+          <p:cNvSpPr>
+            <a:spLocks noGrp="1"/>
+          </p:cNvSpPr>
+          <p:nvPr>
+            <p:ph type="body" sz="quarter" idx="19"/>
+          </p:nvPr>
+        </p:nvSpPr>
+        <p:spPr/>
+        <p:txBody>
+          <a:bodyPr/>
+          <a:lstStyle/>
+          <a:p>
+            <a:r>
+              <a:rPr lang="de-DE" dirty="0" smtClean="0"/>
+              <a:t>Nutze Anwendungscode</a:t>
+            </a:r>
+          </a:p>
+          <a:p>
+            <a:pPr lvl="1"/>
+            <a:r>
+              <a:rPr lang="de-DE" dirty="0" smtClean="0"/>
+              <a:t>Je besser du es lernst, desto weniger musst du schreiben</a:t>
+            </a:r>
+          </a:p>
+          <a:p>
+            <a:r>
+              <a:rPr lang="de-DE" dirty="0" smtClean="0"/>
+              <a:t>Schreib keinen Code den du nicht brauchst</a:t>
+            </a:r>
+          </a:p>
+          <a:p>
+            <a:pPr lvl="1"/>
+            <a:r>
+              <a:rPr lang="de-DE" dirty="0" smtClean="0"/>
+              <a:t>Ziel ist es eine Antwort zu bekommen, keinen sauberen Code</a:t>
+            </a:r>
+          </a:p>
+          <a:p>
+            <a:r>
+              <a:rPr lang="de-DE" dirty="0" smtClean="0"/>
+              <a:t>Setze deine Spike Solution nicht in deinen Produktivcode ein</a:t>
+            </a:r>
+          </a:p>
+          <a:p>
+            <a:pPr lvl="1"/>
+            <a:r>
+              <a:rPr lang="de-DE" dirty="0" smtClean="0"/>
+              <a:t>Schmeiß sie </a:t>
+            </a:r>
+            <a:r>
+              <a:rPr lang="de-DE" dirty="0" smtClean="0"/>
+              <a:t>weg, </a:t>
+            </a:r>
+            <a:r>
+              <a:rPr lang="de-DE" dirty="0" smtClean="0"/>
+              <a:t>wenn du fertig </a:t>
+            </a:r>
+            <a:r>
+              <a:rPr lang="de-DE" dirty="0" smtClean="0"/>
+              <a:t>bist	-&gt; nur </a:t>
+            </a:r>
+            <a:r>
+              <a:rPr lang="de-DE" dirty="0" smtClean="0"/>
+              <a:t>quick &amp; </a:t>
+            </a:r>
+            <a:r>
+              <a:rPr lang="de-DE" dirty="0" err="1" smtClean="0"/>
+              <a:t>dirty</a:t>
+            </a:r>
+            <a:r>
+              <a:rPr lang="de-DE" dirty="0" smtClean="0"/>
+              <a:t>!</a:t>
+            </a:r>
+            <a:endParaRPr lang="de-DE" dirty="0"/>
+          </a:p>
+        </p:txBody>
+      </p:sp>
+      <p:sp>
+        <p:nvSpPr>
+          <p:cNvPr id="3" name="Titel 2"/>
+          <p:cNvSpPr>
+            <a:spLocks noGrp="1"/>
+          </p:cNvSpPr>
+          <p:nvPr>
+            <p:ph type="title"/>
+          </p:nvPr>
+        </p:nvSpPr>
+        <p:spPr/>
+        <p:txBody>
+          <a:bodyPr>
+            <a:normAutofit fontScale="90000"/>
+          </a:bodyPr>
+          <a:lstStyle/>
+          <a:p>
+            <a:r>
+              <a:rPr lang="de-DE" dirty="0" smtClean="0"/>
+              <a:t>Techniken für Spike Solution</a:t>
+            </a:r>
+            <a:endParaRPr lang="de-DE" dirty="0"/>
+          </a:p>
+        </p:txBody>
+      </p:sp>
+      <p:sp>
+        <p:nvSpPr>
+          <p:cNvPr id="4" name="Untertitel 3"/>
+          <p:cNvSpPr>
+            <a:spLocks noGrp="1"/>
+          </p:cNvSpPr>
+          <p:nvPr>
+            <p:ph type="subTitle" idx="1"/>
+          </p:nvPr>
+        </p:nvSpPr>
+        <p:spPr/>
+        <p:txBody>
+          <a:bodyPr>
+            <a:normAutofit lnSpcReduction="10000"/>
+          </a:bodyPr>
+          <a:lstStyle/>
+          <a:p>
+            <a:endParaRPr lang="de-DE"/>
+          </a:p>
+        </p:txBody>
+      </p:sp>
+      <p:sp>
+        <p:nvSpPr>
+          <p:cNvPr id="5" name="Foliennummernplatzhalter 4"/>
+          <p:cNvSpPr>
+            <a:spLocks noGrp="1"/>
+          </p:cNvSpPr>
+          <p:nvPr>
+            <p:ph type="sldNum" sz="quarter" idx="4"/>
+          </p:nvPr>
+        </p:nvSpPr>
+        <p:spPr/>
+        <p:txBody>
+          <a:bodyPr/>
+          <a:lstStyle/>
+          <a:p>
+            <a:fld id="{F777D48D-F22C-624F-9C01-7CDA9A361691}" type="slidenum">
+              <a:rPr lang="de-DE" smtClean="0"/>
+              <a:pPr/>
+              <a:t>16</a:t>
             </a:fld>
             <a:endParaRPr lang="de-DE" dirty="0"/>
           </a:p>
@@ -10055,6 +10367,45 @@
               <a:rPr lang="de-DE" dirty="0" smtClean="0"/>
               <a:t>Versionskontrollsystem</a:t>
             </a:r>
+          </a:p>
+          <a:p>
+            <a:r>
+              <a:rPr lang="de-DE" dirty="0"/>
+              <a:t>Git Client ist Verfügbar für</a:t>
+            </a:r>
+          </a:p>
+          <a:p>
+            <a:pPr lvl="1"/>
+            <a:r>
+              <a:rPr lang="de-DE" dirty="0"/>
+              <a:t>Windows </a:t>
+            </a:r>
+          </a:p>
+          <a:p>
+            <a:pPr lvl="1"/>
+            <a:r>
+              <a:rPr lang="de-DE" dirty="0"/>
+              <a:t>Linux</a:t>
+            </a:r>
+          </a:p>
+          <a:p>
+            <a:pPr lvl="1"/>
+            <a:r>
+              <a:rPr lang="de-DE" dirty="0"/>
+              <a:t>Solaris</a:t>
+            </a:r>
+          </a:p>
+          <a:p>
+            <a:pPr lvl="1"/>
+            <a:r>
+              <a:rPr lang="de-DE" dirty="0"/>
+              <a:t>Mac OS </a:t>
+            </a:r>
+            <a:r>
+              <a:rPr lang="de-DE" dirty="0" smtClean="0"/>
+              <a:t>X</a:t>
+            </a:r>
+            <a:endParaRPr lang="de-DE" dirty="0" smtClean="0"/>
           </a:p>
           <a:p>
             <a:r>
@@ -10996,15 +11347,7 @@
           <a:p>
             <a:r>
               <a:rPr lang="de-DE" dirty="0" smtClean="0"/>
-              <a:t>Benutzung der </a:t>
-            </a:r>
-            <a:r>
-              <a:rPr lang="de-DE" dirty="0" err="1" smtClean="0"/>
-              <a:t>Git</a:t>
-            </a:r>
-            <a:r>
-              <a:rPr lang="de-DE" dirty="0" smtClean="0"/>
-              <a:t> </a:t>
+              <a:t>Benutzung der Git </a:t>
             </a:r>
             <a:r>
               <a:rPr lang="de-DE" dirty="0" err="1" smtClean="0"/>
@@ -11020,7 +11363,15 @@
             </a:r>
             <a:r>
               <a:rPr lang="de-DE" dirty="0" smtClean="0"/>
-              <a:t> Editor zur Verfügung, …)</a:t>
+              <a:t> Editor </a:t>
+            </a:r>
+            <a:r>
+              <a:rPr lang="de-DE" dirty="0" smtClean="0"/>
+              <a:t>steht zur </a:t>
+            </a:r>
+            <a:r>
+              <a:rPr lang="de-DE" dirty="0" smtClean="0"/>
+              <a:t>Verfügung, …)</a:t>
             </a:r>
           </a:p>
           <a:p>
@@ -11073,10 +11424,12 @@
               <a:t> </a:t>
             </a:r>
             <a:r>
-              <a:rPr lang="de-DE" dirty="0" smtClean="0">
-                <a:hlinkClick r:id="rId2"/>
-              </a:rPr>
-              <a:t>user@email.com</a:t>
+              <a:rPr lang="de-DE" dirty="0"/>
+              <a:t>&lt;</a:t>
+            </a:r>
+            <a:r>
+              <a:rPr lang="de-DE" dirty="0" smtClean="0"/>
+              <a:t>user@email.com&gt;</a:t>
             </a:r>
             <a:endParaRPr lang="de-DE" dirty="0" smtClean="0"/>
           </a:p>
@@ -11111,11 +11464,15 @@
             </a:r>
             <a:r>
               <a:rPr lang="de-DE" dirty="0" smtClean="0"/>
-              <a:t> &lt;</a:t>
-            </a:r>
-            <a:r>
-              <a:rPr lang="de-DE" altLang="de-DE" dirty="0"/>
-              <a:t> /</a:t>
+              <a:t> </a:t>
+            </a:r>
+            <a:r>
+              <a:rPr lang="de-DE" dirty="0" smtClean="0"/>
+              <a:t>&lt;</a:t>
+            </a:r>
+            <a:r>
+              <a:rPr lang="de-DE" altLang="de-DE" dirty="0" smtClean="0"/>
+              <a:t>/</a:t>
             </a:r>
             <a:r>
               <a:rPr lang="de-DE" altLang="de-DE" dirty="0" err="1" smtClean="0"/>
@@ -11138,7 +11495,15 @@
             <a:pPr lvl="1"/>
             <a:r>
               <a:rPr lang="de-DE" altLang="de-DE" dirty="0" smtClean="0"/>
-              <a:t>Für kürzeren push befehlt (nur noch </a:t>
+              <a:t>Für kürzeren </a:t>
+            </a:r>
+            <a:r>
+              <a:rPr lang="de-DE" altLang="de-DE" dirty="0" smtClean="0"/>
+              <a:t>push-Befehlt </a:t>
+            </a:r>
+            <a:r>
+              <a:rPr lang="de-DE" altLang="de-DE" dirty="0" smtClean="0"/>
+              <a:t>(nur noch </a:t>
             </a:r>
             <a:r>
               <a:rPr lang="de-DE" altLang="de-DE" dirty="0" err="1" smtClean="0"/>

</xml_diff>

<commit_message>
Agenda hinzugefügt; Git Grundkonfiguration mit Getting starded zusammengefasst; Spike Solutions zusammengefasst; Diverse Vormulierungsänderungen;
</commit_message>
<xml_diff>
--- a/git_vortrag.pptx
+++ b/git_vortrag.pptx
@@ -19,13 +19,13 @@
     <p:sldId id="261" r:id="rId7"/>
     <p:sldId id="262" r:id="rId8"/>
     <p:sldId id="260" r:id="rId9"/>
-    <p:sldId id="268" r:id="rId10"/>
-    <p:sldId id="259" r:id="rId11"/>
-    <p:sldId id="263" r:id="rId12"/>
-    <p:sldId id="266" r:id="rId13"/>
-    <p:sldId id="271" r:id="rId14"/>
+    <p:sldId id="259" r:id="rId10"/>
+    <p:sldId id="263" r:id="rId11"/>
+    <p:sldId id="266" r:id="rId12"/>
+    <p:sldId id="271" r:id="rId13"/>
+    <p:sldId id="268" r:id="rId14"/>
     <p:sldId id="264" r:id="rId15"/>
-    <p:sldId id="265" r:id="rId16"/>
+    <p:sldId id="272" r:id="rId16"/>
     <p:sldId id="267" r:id="rId17"/>
     <p:sldId id="269" r:id="rId18"/>
     <p:sldId id="270" r:id="rId19"/>
@@ -8557,138 +8557,84 @@
           <a:p>
             <a:r>
               <a:rPr lang="de-DE" dirty="0" err="1"/>
-              <a:t>git</a:t>
-            </a:r>
-            <a:r>
-              <a:rPr lang="de-DE" dirty="0"/>
-              <a:t> </a:t>
-            </a:r>
-            <a:r>
-              <a:rPr lang="de-DE" dirty="0" err="1"/>
-              <a:t>commit</a:t>
-            </a:r>
-            <a:r>
-              <a:rPr lang="de-DE" dirty="0"/>
-              <a:t> –m </a:t>
-            </a:r>
-            <a:r>
-              <a:rPr lang="de-DE" dirty="0" smtClean="0"/>
-              <a:t>“&lt;Commit Nachricht&gt;“</a:t>
-            </a:r>
+              <a:t>g</a:t>
+            </a:r>
+            <a:r>
+              <a:rPr lang="de-DE" dirty="0" err="1" smtClean="0"/>
+              <a:t>it</a:t>
+            </a:r>
+            <a:r>
+              <a:rPr lang="de-DE" dirty="0" smtClean="0"/>
+              <a:t> pull</a:t>
+            </a:r>
+          </a:p>
+          <a:p>
+            <a:pPr lvl="1"/>
+            <a:r>
+              <a:rPr lang="de-DE" dirty="0" smtClean="0"/>
+              <a:t>Aktualisiert das lokale Repository mit den neuesten Änderungen</a:t>
+            </a:r>
+          </a:p>
+          <a:p>
             <a:endParaRPr lang="de-DE" dirty="0"/>
           </a:p>
           <a:p>
-            <a:pPr lvl="1"/>
-            <a:r>
-              <a:rPr lang="de-DE" dirty="0"/>
-              <a:t>Bestätigen der Änderungen (modifizierte, hinzugefügte und gelöschte Dateien) gegenüber des lokalen </a:t>
-            </a:r>
-            <a:r>
-              <a:rPr lang="de-DE" dirty="0" err="1"/>
-              <a:t>Git</a:t>
-            </a:r>
-            <a:r>
-              <a:rPr lang="de-DE" dirty="0"/>
-              <a:t> </a:t>
-            </a:r>
-            <a:r>
-              <a:rPr lang="de-DE" dirty="0" smtClean="0"/>
-              <a:t>Repository</a:t>
-            </a:r>
-          </a:p>
-          <a:p>
-            <a:pPr lvl="1"/>
-            <a:endParaRPr lang="de-DE" dirty="0"/>
-          </a:p>
-          <a:p>
-            <a:r>
-              <a:rPr lang="de-DE" dirty="0" err="1" smtClean="0"/>
-              <a:t>git</a:t>
-            </a:r>
-            <a:r>
-              <a:rPr lang="de-DE" dirty="0" smtClean="0"/>
-              <a:t> </a:t>
-            </a:r>
-            <a:r>
-              <a:rPr lang="de-DE" dirty="0" err="1" smtClean="0"/>
-              <a:t>status</a:t>
-            </a:r>
-            <a:r>
-              <a:rPr lang="de-DE" dirty="0" smtClean="0"/>
-              <a:t> </a:t>
-            </a:r>
-            <a:endParaRPr lang="de-DE" dirty="0"/>
-          </a:p>
-          <a:p>
-            <a:pPr lvl="1"/>
-            <a:r>
-              <a:rPr lang="de-DE" dirty="0" smtClean="0"/>
-              <a:t>Zeigt die getätigten Änderungen (nicht </a:t>
-            </a:r>
-            <a:r>
-              <a:rPr lang="de-DE" dirty="0" err="1" smtClean="0"/>
-              <a:t>commited</a:t>
-            </a:r>
-            <a:r>
-              <a:rPr lang="de-DE" dirty="0" smtClean="0"/>
-              <a:t>) an</a:t>
-            </a:r>
-          </a:p>
-          <a:p>
-            <a:pPr lvl="1" indent="0">
-              <a:buNone/>
-            </a:pPr>
-            <a:r>
-              <a:rPr lang="de-DE" dirty="0" smtClean="0"/>
-              <a:t> </a:t>
-            </a:r>
-            <a:endParaRPr lang="de-DE" dirty="0"/>
-          </a:p>
-          <a:p>
+            <a:pPr lvl="0"/>
             <a:r>
               <a:rPr lang="de-DE" altLang="de-DE" dirty="0" err="1"/>
               <a:t>git</a:t>
             </a:r>
             <a:r>
               <a:rPr lang="de-DE" altLang="de-DE" dirty="0"/>
-              <a:t> push </a:t>
+              <a:t> </a:t>
             </a:r>
             <a:r>
               <a:rPr lang="de-DE" altLang="de-DE" dirty="0" err="1"/>
-              <a:t>origin</a:t>
+              <a:t>diff</a:t>
             </a:r>
             <a:r>
               <a:rPr lang="de-DE" altLang="de-DE" dirty="0"/>
-              <a:t> </a:t>
+              <a:t> &lt;</a:t>
             </a:r>
             <a:r>
               <a:rPr lang="de-DE" altLang="de-DE" dirty="0" err="1"/>
-              <a:t>master</a:t>
+              <a:t>quell_branch</a:t>
+            </a:r>
+            <a:r>
+              <a:rPr lang="de-DE" altLang="de-DE" dirty="0"/>
+              <a:t>&gt; &lt;</a:t>
+            </a:r>
+            <a:r>
+              <a:rPr lang="de-DE" altLang="de-DE" dirty="0" err="1"/>
+              <a:t>ziel_branch</a:t>
+            </a:r>
+            <a:r>
+              <a:rPr lang="de-DE" altLang="de-DE" dirty="0"/>
+              <a:t>&gt; </a:t>
+            </a:r>
+            <a:endParaRPr lang="de-DE" altLang="de-DE" dirty="0" smtClean="0"/>
+          </a:p>
+          <a:p>
+            <a:pPr lvl="1"/>
+            <a:r>
+              <a:rPr lang="de-DE" altLang="de-DE" dirty="0" smtClean="0"/>
+              <a:t>Zeigt die Differenzen zweier Branches (vergleichbare Syntax bei </a:t>
+            </a:r>
+            <a:r>
+              <a:rPr lang="de-DE" altLang="de-DE" dirty="0" err="1" smtClean="0"/>
+              <a:t>commits</a:t>
+            </a:r>
+            <a:r>
+              <a:rPr lang="de-DE" altLang="de-DE" dirty="0" smtClean="0"/>
+              <a:t>)</a:t>
             </a:r>
             <a:endParaRPr lang="de-DE" altLang="de-DE" dirty="0"/>
           </a:p>
           <a:p>
-            <a:pPr lvl="1"/>
-            <a:r>
-              <a:rPr lang="de-DE" dirty="0"/>
-              <a:t>Übertragen der </a:t>
-            </a:r>
-            <a:r>
-              <a:rPr lang="de-DE" dirty="0" err="1"/>
-              <a:t>Commits</a:t>
-            </a:r>
-            <a:r>
-              <a:rPr lang="de-DE" dirty="0"/>
-              <a:t> an das Master Repository (definiert im </a:t>
-            </a:r>
-            <a:r>
-              <a:rPr lang="de-DE" dirty="0" err="1"/>
-              <a:t>Clone</a:t>
-            </a:r>
-            <a:r>
-              <a:rPr lang="de-DE" dirty="0"/>
-              <a:t>-Befehl)</a:t>
-            </a:r>
+            <a:endParaRPr lang="de-DE" dirty="0" smtClean="0"/>
+          </a:p>
+          <a:p>
+            <a:endParaRPr lang="de-DE" dirty="0"/>
           </a:p>
           <a:p>
             <a:endParaRPr lang="de-DE" dirty="0"/>
@@ -8713,8 +8659,12 @@
           <a:lstStyle/>
           <a:p>
             <a:r>
+              <a:rPr lang="de-DE" dirty="0" smtClean="0"/>
+              <a:t>Wichtigste </a:t>
+            </a:r>
+            <a:r>
               <a:rPr lang="de-DE" dirty="0"/>
-              <a:t>Wichtigste Befehle</a:t>
+              <a:t>Befehle</a:t>
             </a:r>
           </a:p>
         </p:txBody>
@@ -8771,13 +8721,20 @@
     </p:spTree>
     <p:extLst>
       <p:ext uri="{BB962C8B-B14F-4D97-AF65-F5344CB8AC3E}">
-        <p14:creationId xmlns:p14="http://schemas.microsoft.com/office/powerpoint/2010/main" val="4220624184"/>
+        <p14:creationId xmlns:p14="http://schemas.microsoft.com/office/powerpoint/2010/main" val="1191540642"/>
       </p:ext>
     </p:extLst>
   </p:cSld>
   <p:clrMapOvr>
     <a:masterClrMapping/>
   </p:clrMapOvr>
+  <p:timing>
+    <p:tnLst>
+      <p:par>
+        <p:cTn id="1" dur="indefinite" restart="never" nodeType="tmRoot"/>
+      </p:par>
+    </p:tnLst>
+  </p:timing>
 </p:sld>
 </file>
 
@@ -8810,83 +8767,278 @@
         </p:nvSpPr>
         <p:spPr/>
         <p:txBody>
-          <a:bodyPr/>
+          <a:bodyPr>
+            <a:normAutofit fontScale="92500" lnSpcReduction="10000"/>
+          </a:bodyPr>
           <a:lstStyle/>
           <a:p>
             <a:r>
+              <a:rPr lang="de-DE" dirty="0" smtClean="0"/>
+              <a:t>Benutzung der Git </a:t>
+            </a:r>
+            <a:r>
+              <a:rPr lang="de-DE" dirty="0" err="1" smtClean="0"/>
+              <a:t>Bash</a:t>
+            </a:r>
+            <a:r>
+              <a:rPr lang="de-DE" dirty="0" smtClean="0"/>
+              <a:t> „vereinfacht“ viele (Autovervollständigung, </a:t>
+            </a:r>
+            <a:r>
+              <a:rPr lang="de-DE" dirty="0" err="1" smtClean="0"/>
+              <a:t>Vim</a:t>
+            </a:r>
+            <a:r>
+              <a:rPr lang="de-DE" dirty="0" smtClean="0"/>
+              <a:t> Editor steht zur Verfügung, …)</a:t>
+            </a:r>
+          </a:p>
+          <a:p>
+            <a:endParaRPr lang="de-DE" dirty="0"/>
+          </a:p>
+          <a:p>
+            <a:r>
+              <a:rPr lang="de-DE" dirty="0" err="1" smtClean="0"/>
+              <a:t>git</a:t>
+            </a:r>
+            <a:r>
+              <a:rPr lang="de-DE" dirty="0" smtClean="0"/>
+              <a:t> </a:t>
+            </a:r>
+            <a:r>
+              <a:rPr lang="de-DE" dirty="0" err="1" smtClean="0"/>
+              <a:t>config</a:t>
+            </a:r>
+            <a:r>
+              <a:rPr lang="de-DE" dirty="0" smtClean="0"/>
+              <a:t> –global user.name „&lt;Username&gt;“</a:t>
+            </a:r>
+          </a:p>
+          <a:p>
+            <a:r>
+              <a:rPr lang="de-DE" dirty="0" err="1" smtClean="0"/>
+              <a:t>git</a:t>
+            </a:r>
+            <a:r>
+              <a:rPr lang="de-DE" dirty="0" smtClean="0"/>
+              <a:t> </a:t>
+            </a:r>
+            <a:r>
+              <a:rPr lang="de-DE" dirty="0" err="1" smtClean="0"/>
+              <a:t>config</a:t>
+            </a:r>
+            <a:r>
+              <a:rPr lang="de-DE" dirty="0" smtClean="0"/>
+              <a:t> –global </a:t>
+            </a:r>
+            <a:r>
+              <a:rPr lang="de-DE" dirty="0" err="1" smtClean="0"/>
+              <a:t>user.email</a:t>
+            </a:r>
+            <a:r>
+              <a:rPr lang="de-DE" dirty="0" smtClean="0"/>
+              <a:t> </a:t>
+            </a:r>
+            <a:r>
+              <a:rPr lang="de-DE" dirty="0"/>
+              <a:t>&lt;</a:t>
+            </a:r>
+            <a:r>
+              <a:rPr lang="de-DE" dirty="0" smtClean="0"/>
+              <a:t>user@email.com&gt;</a:t>
+            </a:r>
+          </a:p>
+          <a:p>
+            <a:r>
+              <a:rPr lang="de-DE" dirty="0" err="1" smtClean="0"/>
+              <a:t>git</a:t>
+            </a:r>
+            <a:r>
+              <a:rPr lang="de-DE" dirty="0" smtClean="0"/>
+              <a:t> </a:t>
+            </a:r>
+            <a:r>
+              <a:rPr lang="de-DE" dirty="0" err="1" smtClean="0"/>
+              <a:t>config</a:t>
+            </a:r>
+            <a:r>
+              <a:rPr lang="de-DE" dirty="0" smtClean="0"/>
+              <a:t> </a:t>
+            </a:r>
+            <a:r>
+              <a:rPr lang="de-DE" dirty="0" err="1" smtClean="0"/>
+              <a:t>push.default</a:t>
+            </a:r>
+            <a:r>
+              <a:rPr lang="de-DE" dirty="0" smtClean="0"/>
+              <a:t> </a:t>
+            </a:r>
+            <a:r>
+              <a:rPr lang="de-DE" dirty="0" err="1" smtClean="0"/>
+              <a:t>matching</a:t>
+            </a:r>
+            <a:r>
+              <a:rPr lang="de-DE" dirty="0" smtClean="0"/>
+              <a:t> &lt;</a:t>
+            </a:r>
+            <a:r>
+              <a:rPr lang="de-DE" altLang="de-DE" dirty="0" smtClean="0"/>
+              <a:t>/</a:t>
+            </a:r>
+            <a:r>
+              <a:rPr lang="de-DE" altLang="de-DE" dirty="0" err="1" smtClean="0"/>
+              <a:t>pfad</a:t>
+            </a:r>
+            <a:r>
+              <a:rPr lang="de-DE" altLang="de-DE" dirty="0" smtClean="0"/>
+              <a:t>/zum/</a:t>
+            </a:r>
+            <a:r>
+              <a:rPr lang="de-DE" altLang="de-DE" dirty="0" err="1" smtClean="0"/>
+              <a:t>repository</a:t>
+            </a:r>
+            <a:r>
+              <a:rPr lang="de-DE" altLang="de-DE" dirty="0" smtClean="0"/>
+              <a:t>&gt;</a:t>
+            </a:r>
+          </a:p>
+          <a:p>
+            <a:pPr lvl="1"/>
+            <a:r>
+              <a:rPr lang="de-DE" altLang="de-DE" dirty="0" smtClean="0"/>
+              <a:t>Für kürzeren </a:t>
+            </a:r>
+            <a:r>
+              <a:rPr lang="de-DE" altLang="de-DE" dirty="0" smtClean="0"/>
+              <a:t>push-Befehl (nur </a:t>
+            </a:r>
+            <a:r>
+              <a:rPr lang="de-DE" altLang="de-DE" dirty="0" smtClean="0"/>
+              <a:t>noch </a:t>
+            </a:r>
+            <a:r>
+              <a:rPr lang="de-DE" altLang="de-DE" dirty="0" err="1" smtClean="0"/>
+              <a:t>git</a:t>
+            </a:r>
+            <a:r>
+              <a:rPr lang="de-DE" altLang="de-DE" dirty="0" smtClean="0"/>
+              <a:t> push)</a:t>
+            </a:r>
+          </a:p>
+          <a:p>
+            <a:pPr lvl="1" indent="0">
+              <a:buNone/>
+            </a:pPr>
+            <a:endParaRPr lang="de-DE" altLang="de-DE" dirty="0" smtClean="0"/>
+          </a:p>
+          <a:p>
+            <a:r>
+              <a:rPr lang="de-DE" dirty="0"/>
+              <a:t>Kopieren des Projekts incl. Erzeugen des </a:t>
+            </a:r>
+            <a:r>
               <a:rPr lang="de-DE" dirty="0" err="1"/>
-              <a:t>g</a:t>
+              <a:t>working</a:t>
+            </a:r>
+            <a:r>
+              <a:rPr lang="de-DE" dirty="0"/>
+              <a:t> </a:t>
+            </a:r>
+            <a:r>
+              <a:rPr lang="de-DE" dirty="0" err="1"/>
+              <a:t>directory</a:t>
+            </a:r>
+            <a:r>
+              <a:rPr lang="de-DE" dirty="0"/>
+              <a:t>:</a:t>
+            </a:r>
+          </a:p>
+          <a:p>
+            <a:pPr lvl="1"/>
+            <a:r>
+              <a:rPr lang="de-DE" dirty="0" err="1"/>
+              <a:t>git</a:t>
+            </a:r>
+            <a:r>
+              <a:rPr lang="de-DE" dirty="0"/>
+              <a:t> </a:t>
+            </a:r>
+            <a:r>
+              <a:rPr lang="de-DE" dirty="0" err="1"/>
+              <a:t>clone</a:t>
+            </a:r>
+            <a:r>
+              <a:rPr lang="de-DE" dirty="0"/>
+              <a:t> https://github.com/daHaimi/2dgame-thi-2016.git [&lt;Ordnername&gt;]</a:t>
+            </a:r>
+          </a:p>
+          <a:p>
+            <a:endParaRPr lang="de-DE" dirty="0"/>
+          </a:p>
+          <a:p>
+            <a:r>
+              <a:rPr lang="de-DE" dirty="0"/>
+              <a:t>Geänderte Dateien </a:t>
+            </a:r>
+            <a:r>
+              <a:rPr lang="de-DE" dirty="0" smtClean="0"/>
+              <a:t>zur </a:t>
             </a:r>
             <a:r>
               <a:rPr lang="de-DE" dirty="0" err="1" smtClean="0"/>
-              <a:t>it</a:t>
-            </a:r>
-            <a:r>
-              <a:rPr lang="de-DE" dirty="0" smtClean="0"/>
-              <a:t> pull</a:t>
+              <a:t>Staging</a:t>
+            </a:r>
+            <a:r>
+              <a:rPr lang="de-DE" dirty="0" smtClean="0"/>
+              <a:t> </a:t>
+            </a:r>
+            <a:r>
+              <a:rPr lang="de-DE" dirty="0"/>
+              <a:t>Area hinzufügen und </a:t>
+            </a:r>
+            <a:r>
+              <a:rPr lang="de-DE" dirty="0" err="1"/>
+              <a:t>commiten</a:t>
+            </a:r>
+            <a:r>
+              <a:rPr lang="de-DE" dirty="0"/>
+              <a:t>:</a:t>
             </a:r>
           </a:p>
           <a:p>
             <a:pPr lvl="1"/>
             <a:r>
-              <a:rPr lang="de-DE" dirty="0" smtClean="0"/>
-              <a:t>Aktualisiert das lokale Repository mit den neuesten Änderungen</a:t>
-            </a:r>
-          </a:p>
-          <a:p>
-            <a:endParaRPr lang="de-DE" dirty="0"/>
-          </a:p>
-          <a:p>
-            <a:pPr lvl="0"/>
-            <a:r>
-              <a:rPr lang="de-DE" altLang="de-DE" dirty="0" err="1"/>
+              <a:rPr lang="de-DE" altLang="de-DE" dirty="0" err="1">
+                <a:latin typeface="Arial Unicode MS"/>
+              </a:rPr>
               <a:t>git</a:t>
             </a:r>
             <a:r>
-              <a:rPr lang="de-DE" altLang="de-DE" dirty="0"/>
+              <a:rPr lang="de-DE" altLang="de-DE" dirty="0">
+                <a:latin typeface="Arial Unicode MS"/>
+              </a:rPr>
               <a:t> </a:t>
             </a:r>
             <a:r>
-              <a:rPr lang="de-DE" altLang="de-DE" dirty="0" err="1"/>
-              <a:t>diff</a:t>
-            </a:r>
-            <a:r>
-              <a:rPr lang="de-DE" altLang="de-DE" dirty="0"/>
-              <a:t> &lt;</a:t>
-            </a:r>
-            <a:r>
-              <a:rPr lang="de-DE" altLang="de-DE" dirty="0" err="1"/>
-              <a:t>quell_branch</a:t>
-            </a:r>
-            <a:r>
-              <a:rPr lang="de-DE" altLang="de-DE" dirty="0"/>
-              <a:t>&gt; &lt;</a:t>
-            </a:r>
-            <a:r>
-              <a:rPr lang="de-DE" altLang="de-DE" dirty="0" err="1"/>
-              <a:t>ziel_branch</a:t>
-            </a:r>
-            <a:r>
-              <a:rPr lang="de-DE" altLang="de-DE" dirty="0"/>
-              <a:t>&gt; </a:t>
-            </a:r>
-            <a:endParaRPr lang="de-DE" altLang="de-DE" dirty="0" smtClean="0"/>
-          </a:p>
-          <a:p>
-            <a:pPr lvl="1"/>
-            <a:r>
-              <a:rPr lang="de-DE" altLang="de-DE" dirty="0" smtClean="0"/>
-              <a:t>Zeigt die Differenzen zweier Branches an</a:t>
-            </a:r>
-            <a:endParaRPr lang="de-DE" altLang="de-DE" dirty="0"/>
-          </a:p>
-          <a:p>
-            <a:endParaRPr lang="de-DE" dirty="0" smtClean="0"/>
-          </a:p>
-          <a:p>
-            <a:endParaRPr lang="de-DE" dirty="0"/>
-          </a:p>
-          <a:p>
+              <a:rPr lang="de-DE" altLang="de-DE" dirty="0" err="1">
+                <a:latin typeface="Arial Unicode MS"/>
+              </a:rPr>
+              <a:t>commit</a:t>
+            </a:r>
+            <a:r>
+              <a:rPr lang="de-DE" altLang="de-DE" dirty="0">
+                <a:latin typeface="Arial Unicode MS"/>
+              </a:rPr>
+              <a:t> -a -m „&lt;Commit Nachricht&gt;“</a:t>
+            </a:r>
+            <a:endParaRPr lang="de-DE" altLang="de-DE" sz="4000" dirty="0">
+              <a:latin typeface="Arial Unicode MS"/>
+            </a:endParaRPr>
+          </a:p>
+          <a:p>
+            <a:pPr indent="0">
+              <a:buNone/>
+            </a:pPr>
             <a:endParaRPr lang="de-DE" dirty="0"/>
           </a:p>
         </p:txBody>
@@ -8909,9 +9061,14 @@
           <a:lstStyle/>
           <a:p>
             <a:r>
-              <a:rPr lang="de-DE" dirty="0"/>
-              <a:t>Wichtigste Befehle</a:t>
-            </a:r>
+              <a:rPr lang="de-DE" dirty="0" err="1" smtClean="0"/>
+              <a:t>Git</a:t>
+            </a:r>
+            <a:r>
+              <a:rPr lang="de-DE" dirty="0" smtClean="0"/>
+              <a:t> Grundkonfiguration</a:t>
+            </a:r>
+            <a:endParaRPr lang="de-DE" dirty="0"/>
           </a:p>
         </p:txBody>
       </p:sp>
@@ -8934,7 +9091,11 @@
           <a:p>
             <a:r>
               <a:rPr lang="de-DE" dirty="0" smtClean="0"/>
-              <a:t>Workflow</a:t>
+              <a:t>Wichtigste </a:t>
+            </a:r>
+            <a:r>
+              <a:rPr lang="de-DE" dirty="0" smtClean="0"/>
+              <a:t>Konfigurationen nach der Installation</a:t>
             </a:r>
             <a:endParaRPr lang="de-DE" dirty="0"/>
           </a:p>
@@ -8967,13 +9128,20 @@
     </p:spTree>
     <p:extLst>
       <p:ext uri="{BB962C8B-B14F-4D97-AF65-F5344CB8AC3E}">
-        <p14:creationId xmlns:p14="http://schemas.microsoft.com/office/powerpoint/2010/main" val="1191540642"/>
+        <p14:creationId xmlns:p14="http://schemas.microsoft.com/office/powerpoint/2010/main" val="1664792896"/>
       </p:ext>
     </p:extLst>
   </p:cSld>
   <p:clrMapOvr>
     <a:masterClrMapping/>
   </p:clrMapOvr>
+  <p:timing>
+    <p:tnLst>
+      <p:par>
+        <p:cTn id="1" dur="indefinite" restart="never" nodeType="tmRoot"/>
+      </p:par>
+    </p:tnLst>
+  </p:timing>
 </p:sld>
 </file>
 
@@ -9030,7 +9198,6 @@
               <a:rPr lang="de-DE" dirty="0" smtClean="0"/>
               <a:t>bzuarbeiten</a:t>
             </a:r>
-            <a:endParaRPr lang="de-DE" dirty="0" smtClean="0"/>
           </a:p>
           <a:p>
             <a:r>
@@ -9079,11 +9246,7 @@
             </a:r>
             <a:r>
               <a:rPr lang="de-DE" dirty="0" smtClean="0"/>
-              <a:t> erstellt man </a:t>
-            </a:r>
-            <a:r>
-              <a:rPr lang="de-DE" dirty="0" smtClean="0"/>
-              <a:t>einen neuen </a:t>
+              <a:t> erstellt man einen neuen </a:t>
             </a:r>
             <a:r>
               <a:rPr lang="de-DE" dirty="0" err="1" smtClean="0"/>
@@ -9097,11 +9260,7 @@
             </a:pPr>
             <a:r>
               <a:rPr lang="de-DE" dirty="0" smtClean="0"/>
-              <a:t>und wechselt </a:t>
-            </a:r>
-            <a:r>
-              <a:rPr lang="de-DE" dirty="0" smtClean="0"/>
-              <a:t>direkt vom aktuellen zum neu erstellten </a:t>
+              <a:t>und wechselt direkt vom aktuellen zum neu erstellten </a:t>
             </a:r>
             <a:r>
               <a:rPr lang="de-DE" dirty="0" err="1" smtClean="0"/>
@@ -9111,7 +9270,6 @@
               <a:rPr lang="de-DE" dirty="0" smtClean="0"/>
               <a:t>.</a:t>
             </a:r>
-            <a:endParaRPr lang="de-DE" dirty="0" smtClean="0"/>
           </a:p>
           <a:p>
             <a:pPr indent="361950">
@@ -9166,11 +9324,7 @@
             </a:r>
             <a:r>
               <a:rPr lang="de-DE" dirty="0" smtClean="0"/>
-              <a:t> </a:t>
-            </a:r>
-            <a:r>
-              <a:rPr lang="de-DE" dirty="0" smtClean="0"/>
-              <a:t>mit der eben angelegten </a:t>
+              <a:t> mit der eben angelegten </a:t>
             </a:r>
             <a:r>
               <a:rPr lang="de-DE" dirty="0" err="1" smtClean="0"/>
@@ -9180,7 +9334,6 @@
               <a:rPr lang="de-DE" dirty="0" smtClean="0"/>
               <a:t>.</a:t>
             </a:r>
-            <a:endParaRPr lang="de-DE" dirty="0" smtClean="0"/>
           </a:p>
           <a:p>
             <a:pPr indent="361950">
@@ -9372,51 +9525,38 @@
         </p:nvSpPr>
         <p:spPr/>
         <p:txBody>
-          <a:bodyPr/>
+          <a:bodyPr>
+            <a:normAutofit fontScale="85000" lnSpcReduction="20000"/>
+          </a:bodyPr>
           <a:lstStyle/>
           <a:p>
             <a:r>
               <a:rPr lang="de-DE" dirty="0" smtClean="0"/>
-              <a:t>Kopieren des Projekts incl. Erzeugen des </a:t>
+              <a:t>In einfachen Worten: Code Experiment / Try </a:t>
             </a:r>
             <a:r>
               <a:rPr lang="de-DE" dirty="0" err="1" smtClean="0"/>
-              <a:t>working</a:t>
-            </a:r>
-            <a:r>
-              <a:rPr lang="de-DE" dirty="0" smtClean="0"/>
-              <a:t> </a:t>
-            </a:r>
-            <a:r>
-              <a:rPr lang="de-DE" dirty="0" err="1" smtClean="0"/>
-              <a:t>directory</a:t>
-            </a:r>
-            <a:r>
-              <a:rPr lang="de-DE" dirty="0" smtClean="0"/>
-              <a:t>:</a:t>
-            </a:r>
-          </a:p>
-          <a:p>
-            <a:pPr lvl="1"/>
-            <a:r>
-              <a:rPr lang="de-DE" dirty="0" err="1" smtClean="0"/>
-              <a:t>git</a:t>
-            </a:r>
-            <a:r>
-              <a:rPr lang="de-DE" dirty="0" smtClean="0"/>
-              <a:t> </a:t>
+              <a:t>and</a:t>
+            </a:r>
+            <a:r>
+              <a:rPr lang="de-DE" dirty="0" smtClean="0"/>
+              <a:t> Error</a:t>
+            </a:r>
+          </a:p>
+          <a:p>
+            <a:r>
+              <a:rPr lang="de-DE" dirty="0" smtClean="0"/>
+              <a:t>Grundidee: Entwickle nur so viel, wie du für die Beantwortung deiner Frage benötigst</a:t>
+            </a:r>
+          </a:p>
+          <a:p>
+            <a:r>
+              <a:rPr lang="de-DE" dirty="0"/>
+              <a:t>Kapselung der Spikes in eigene Branches, die nicht </a:t>
             </a:r>
             <a:r>
               <a:rPr lang="de-DE" dirty="0" err="1"/>
-              <a:t>clone</a:t>
-            </a:r>
-            <a:r>
-              <a:rPr lang="de-DE" dirty="0"/>
-              <a:t> https</a:t>
-            </a:r>
-            <a:r>
-              <a:rPr lang="de-DE" dirty="0" smtClean="0"/>
-              <a:t>://github.com/daHaimi/2dgame-thi-2016.git</a:t>
+              <a:t>gemerged</a:t>
             </a:r>
             <a:r>
               <a:rPr lang="de-DE" dirty="0"/>
@@ -9424,79 +9564,103 @@
             </a:r>
             <a:r>
               <a:rPr lang="de-DE" dirty="0" smtClean="0"/>
-              <a:t>[&lt;Ordnername&gt;]</a:t>
-            </a:r>
-          </a:p>
-          <a:p>
+              <a:t>werden</a:t>
+            </a:r>
+          </a:p>
+          <a:p>
+            <a:r>
+              <a:rPr lang="de-DE" dirty="0" smtClean="0"/>
+              <a:t>Beinhaltet </a:t>
+            </a:r>
+            <a:r>
+              <a:rPr lang="de-DE" dirty="0" smtClean="0"/>
+              <a:t>Quick &amp; </a:t>
+            </a:r>
+            <a:r>
+              <a:rPr lang="de-DE" dirty="0" err="1" smtClean="0"/>
+              <a:t>Dirty</a:t>
+            </a:r>
+            <a:r>
+              <a:rPr lang="de-DE" dirty="0" smtClean="0"/>
+              <a:t> Code ohne Qualitätsrichtlinien</a:t>
+            </a:r>
+          </a:p>
+          <a:p>
+            <a:pPr indent="0">
+              <a:buNone/>
+            </a:pPr>
             <a:endParaRPr lang="de-DE" dirty="0" smtClean="0"/>
           </a:p>
           <a:p>
             <a:r>
               <a:rPr lang="de-DE" dirty="0" smtClean="0"/>
-              <a:t>Geänderte Dateien in </a:t>
+              <a:t>Anwendungsbeispiele sind:</a:t>
+            </a:r>
+          </a:p>
+          <a:p>
+            <a:pPr lvl="1"/>
+            <a:r>
+              <a:rPr lang="de-DE" dirty="0" smtClean="0"/>
+              <a:t>Test der Reaktion von Aufrufen in unbekannten Frameworks </a:t>
+            </a:r>
+          </a:p>
+          <a:p>
+            <a:pPr lvl="1"/>
+            <a:r>
+              <a:rPr lang="de-DE" dirty="0" smtClean="0"/>
+              <a:t>Test von Kontrollflüssen in unbekannten Frameworks</a:t>
+            </a:r>
+          </a:p>
+          <a:p>
+            <a:pPr lvl="1" indent="0">
+              <a:buNone/>
+            </a:pPr>
+            <a:endParaRPr lang="de-DE" dirty="0"/>
+          </a:p>
+          <a:p>
+            <a:pPr>
+              <a:tabLst>
+                <a:tab pos="361950" algn="l"/>
+              </a:tabLst>
+            </a:pPr>
+            <a:r>
+              <a:rPr lang="de-DE" dirty="0" smtClean="0"/>
+              <a:t>Der produzierte Code wird weggeworfen und dann mit Hilfe der neu gewonnenen 	Erfahrungen richtig implementiert</a:t>
+            </a:r>
+          </a:p>
+          <a:p>
+            <a:pPr indent="0">
+              <a:buNone/>
+            </a:pPr>
+            <a:endParaRPr lang="de-DE" dirty="0" smtClean="0"/>
+          </a:p>
+          <a:p>
+            <a:r>
+              <a:rPr lang="de-DE" dirty="0" smtClean="0"/>
+              <a:t>Vorteile:</a:t>
+            </a:r>
+          </a:p>
+          <a:p>
+            <a:pPr lvl="1"/>
+            <a:r>
+              <a:rPr lang="de-DE" dirty="0" smtClean="0"/>
+              <a:t>Keine Beachtung der Clean-Code-</a:t>
             </a:r>
             <a:r>
               <a:rPr lang="de-DE" dirty="0" err="1" smtClean="0"/>
-              <a:t>Staging</a:t>
-            </a:r>
-            <a:r>
-              <a:rPr lang="de-DE" dirty="0" smtClean="0"/>
-              <a:t> Area hinzufügen und </a:t>
-            </a:r>
-            <a:r>
-              <a:rPr lang="de-DE" dirty="0" err="1" smtClean="0"/>
-              <a:t>commiten</a:t>
-            </a:r>
-            <a:r>
-              <a:rPr lang="de-DE" dirty="0" smtClean="0"/>
-              <a:t>:</a:t>
+              <a:t>Constrains</a:t>
+            </a:r>
+            <a:r>
+              <a:rPr lang="de-DE" dirty="0" smtClean="0"/>
+              <a:t> während des Experiments</a:t>
             </a:r>
           </a:p>
           <a:p>
             <a:pPr lvl="1"/>
             <a:r>
-              <a:rPr lang="de-DE" altLang="de-DE" dirty="0" err="1">
-                <a:latin typeface="Arial Unicode MS"/>
-              </a:rPr>
-              <a:t>git</a:t>
-            </a:r>
-            <a:r>
-              <a:rPr lang="de-DE" altLang="de-DE" dirty="0">
-                <a:latin typeface="Arial Unicode MS"/>
-              </a:rPr>
-              <a:t> </a:t>
-            </a:r>
-            <a:r>
-              <a:rPr lang="de-DE" altLang="de-DE" dirty="0" err="1">
-                <a:latin typeface="Arial Unicode MS"/>
-              </a:rPr>
-              <a:t>commit</a:t>
-            </a:r>
-            <a:r>
-              <a:rPr lang="de-DE" altLang="de-DE" dirty="0">
-                <a:latin typeface="Arial Unicode MS"/>
-              </a:rPr>
-              <a:t> -a -m </a:t>
-            </a:r>
-            <a:r>
-              <a:rPr lang="de-DE" altLang="de-DE" dirty="0" smtClean="0">
-                <a:latin typeface="Arial Unicode MS"/>
-              </a:rPr>
-              <a:t>„&lt;Commit Nachricht&gt;“</a:t>
-            </a:r>
-            <a:endParaRPr lang="de-DE" altLang="de-DE" sz="4000" dirty="0">
-              <a:latin typeface="Arial Unicode MS"/>
-            </a:endParaRPr>
-          </a:p>
-          <a:p>
-            <a:endParaRPr lang="de-DE" altLang="de-DE" dirty="0" smtClean="0">
-              <a:latin typeface="Arial Unicode MS"/>
-            </a:endParaRPr>
-          </a:p>
-          <a:p>
-            <a:endParaRPr lang="de-DE" altLang="de-DE" dirty="0">
-              <a:latin typeface="Arial Unicode MS"/>
-            </a:endParaRPr>
+              <a:rPr lang="de-DE" dirty="0" smtClean="0"/>
+              <a:t>Keine Entwicklung und Beachtung von Unit-Tests </a:t>
+            </a:r>
           </a:p>
         </p:txBody>
       </p:sp>
@@ -9518,16 +9682,8 @@
           <a:lstStyle/>
           <a:p>
             <a:r>
-              <a:rPr lang="de-DE" dirty="0" err="1" smtClean="0"/>
-              <a:t>Getting</a:t>
-            </a:r>
-            <a:r>
-              <a:rPr lang="de-DE" dirty="0" smtClean="0"/>
-              <a:t> </a:t>
-            </a:r>
-            <a:r>
-              <a:rPr lang="de-DE" dirty="0" err="1" smtClean="0"/>
-              <a:t>Started</a:t>
+              <a:rPr lang="de-DE" dirty="0" smtClean="0"/>
+              <a:t>Spike Solutions</a:t>
             </a:r>
             <a:endParaRPr lang="de-DE" dirty="0"/>
           </a:p>
@@ -9581,7 +9737,7 @@
     </p:spTree>
     <p:extLst>
       <p:ext uri="{BB962C8B-B14F-4D97-AF65-F5344CB8AC3E}">
-        <p14:creationId xmlns:p14="http://schemas.microsoft.com/office/powerpoint/2010/main" val="2001925380"/>
+        <p14:creationId xmlns:p14="http://schemas.microsoft.com/office/powerpoint/2010/main" val="478189454"/>
       </p:ext>
     </p:extLst>
   </p:cSld>
@@ -9599,7 +9755,7 @@
 </file>
 
 <file path=ppt/slides/slide14.xml><?xml version="1.0" encoding="utf-8"?>
-<p:sld xmlns:a="http://schemas.openxmlformats.org/drawingml/2006/main" xmlns:r="http://schemas.openxmlformats.org/officeDocument/2006/relationships" xmlns:p="http://schemas.openxmlformats.org/presentationml/2006/main">
+<p:sld xmlns:a="http://schemas.openxmlformats.org/drawingml/2006/main" xmlns:r="http://schemas.openxmlformats.org/officeDocument/2006/relationships" xmlns:p="http://schemas.openxmlformats.org/presentationml/2006/main" show="0">
   <p:cSld>
     <p:spTree>
       <p:nvGrpSpPr>
@@ -9636,6 +9792,20 @@
             </a:r>
           </a:p>
           <a:p>
+            <a:r>
+              <a:rPr lang="de-DE" dirty="0" smtClean="0"/>
+              <a:t>Quick &amp; </a:t>
+            </a:r>
+            <a:r>
+              <a:rPr lang="de-DE" dirty="0" err="1" smtClean="0"/>
+              <a:t>Dirty</a:t>
+            </a:r>
+            <a:r>
+              <a:rPr lang="de-DE" dirty="0" smtClean="0"/>
+              <a:t> Lösung bei einem neuangefangenen Wegwerfprojekt</a:t>
+            </a:r>
+          </a:p>
+          <a:p>
             <a:pPr>
               <a:tabLst>
                 <a:tab pos="361950" algn="l"/>
@@ -9643,37 +9813,20 @@
             </a:pPr>
             <a:r>
               <a:rPr lang="de-DE" dirty="0" smtClean="0"/>
-              <a:t>Statt vorsichtiges Layer für Layer erstellen, </a:t>
-            </a:r>
-            <a:r>
-              <a:rPr lang="de-DE" dirty="0" err="1" smtClean="0"/>
-              <a:t>Brutforce</a:t>
-            </a:r>
-            <a:r>
-              <a:rPr lang="de-DE" dirty="0" smtClean="0"/>
-              <a:t> Methode durch </a:t>
-            </a:r>
-            <a:r>
-              <a:rPr lang="de-DE" dirty="0" smtClean="0"/>
-              <a:t>	alle </a:t>
-            </a:r>
-            <a:r>
-              <a:rPr lang="de-DE" dirty="0" smtClean="0"/>
-              <a:t>Schichten</a:t>
-            </a:r>
-          </a:p>
-          <a:p>
-            <a:r>
-              <a:rPr lang="de-DE" dirty="0" smtClean="0"/>
-              <a:t>Quick &amp; </a:t>
-            </a:r>
-            <a:r>
-              <a:rPr lang="de-DE" dirty="0" err="1" smtClean="0"/>
-              <a:t>Dirty</a:t>
-            </a:r>
-            <a:r>
-              <a:rPr lang="de-DE" dirty="0" smtClean="0"/>
-              <a:t> Lösung bei einem neuangefangenen Wegwerfprojekt</a:t>
+              <a:t>Code wird nur soweit programmiert bis er eine Antwort auf unsere 	Fragestellung ausspuckt.</a:t>
+            </a:r>
+            <a:endParaRPr lang="de-DE" dirty="0"/>
+          </a:p>
+          <a:p>
+            <a:r>
+              <a:rPr lang="de-DE" dirty="0" smtClean="0"/>
+              <a:t>Herumbasteln und Hacken erwünscht</a:t>
+            </a:r>
+          </a:p>
+          <a:p>
+            <a:r>
+              <a:rPr lang="de-DE" dirty="0" smtClean="0"/>
+              <a:t>Kein Bedarf von Unit Tests</a:t>
             </a:r>
           </a:p>
           <a:p>
@@ -9684,45 +9837,8 @@
             </a:pPr>
             <a:r>
               <a:rPr lang="de-DE" dirty="0" smtClean="0"/>
-              <a:t>Code wird nur soweit programmiert bis er eine Antwort auf unsere </a:t>
-            </a:r>
-            <a:r>
-              <a:rPr lang="de-DE" dirty="0" smtClean="0"/>
-              <a:t>	Fragestellung </a:t>
-            </a:r>
-            <a:r>
-              <a:rPr lang="de-DE" dirty="0" smtClean="0"/>
-              <a:t>ausspuckt.</a:t>
-            </a:r>
-            <a:endParaRPr lang="de-DE" dirty="0"/>
-          </a:p>
-          <a:p>
-            <a:r>
-              <a:rPr lang="de-DE" dirty="0" smtClean="0"/>
-              <a:t>Herumbasteln und Hacken erwünscht</a:t>
-            </a:r>
-          </a:p>
-          <a:p>
-            <a:r>
-              <a:rPr lang="de-DE" dirty="0" smtClean="0"/>
-              <a:t>Kein Bedarf von Unit Tests</a:t>
-            </a:r>
-          </a:p>
-          <a:p>
-            <a:pPr>
-              <a:tabLst>
-                <a:tab pos="361950" algn="l"/>
-              </a:tabLst>
-            </a:pPr>
-            <a:r>
-              <a:rPr lang="de-DE" dirty="0" smtClean="0"/>
-              <a:t>Nach erfolgreichem Durchlauf mit brauchbaren Ergebnissen, Code </a:t>
-            </a:r>
-            <a:r>
-              <a:rPr lang="de-DE" dirty="0" smtClean="0"/>
-              <a:t>	wegwerfen</a:t>
-            </a:r>
-            <a:endParaRPr lang="de-DE" dirty="0" smtClean="0"/>
+              <a:t>Nach erfolgreichem Durchlauf mit brauchbaren Ergebnissen, Code 	wegwerfen</a:t>
+            </a:r>
           </a:p>
         </p:txBody>
       </p:sp>
@@ -9806,11 +9922,26 @@
   <p:clrMapOvr>
     <a:masterClrMapping/>
   </p:clrMapOvr>
+  <mc:AlternateContent xmlns:mc="http://schemas.openxmlformats.org/markup-compatibility/2006" xmlns:p14="http://schemas.microsoft.com/office/powerpoint/2010/main">
+    <mc:Choice Requires="p14">
+      <p:transition spd="slow" p14:dur="2000"/>
+    </mc:Choice>
+    <mc:Fallback xmlns="">
+      <p:transition spd="slow"/>
+    </mc:Fallback>
+  </mc:AlternateContent>
+  <p:timing>
+    <p:tnLst>
+      <p:par>
+        <p:cTn id="1" dur="indefinite" restart="never" nodeType="tmRoot"/>
+      </p:par>
+    </p:tnLst>
+  </p:timing>
 </p:sld>
 </file>
 
 <file path=ppt/slides/slide15.xml><?xml version="1.0" encoding="utf-8"?>
-<p:sld xmlns:a="http://schemas.openxmlformats.org/drawingml/2006/main" xmlns:r="http://schemas.openxmlformats.org/officeDocument/2006/relationships" xmlns:p="http://schemas.openxmlformats.org/presentationml/2006/main">
+<p:sld xmlns:a="http://schemas.openxmlformats.org/drawingml/2006/main" xmlns:r="http://schemas.openxmlformats.org/officeDocument/2006/relationships" xmlns:p="http://schemas.openxmlformats.org/presentationml/2006/main" show="0">
   <p:cSld>
     <p:spTree>
       <p:nvGrpSpPr>
@@ -9843,7 +9974,7 @@
           <a:p>
             <a:r>
               <a:rPr lang="de-DE" dirty="0" smtClean="0"/>
-              <a:t>Arbeiten in Branchen, aber danach nicht </a:t>
+              <a:t>Arbeiten in Branches, aber danach nicht </a:t>
             </a:r>
             <a:r>
               <a:rPr lang="de-DE" dirty="0" err="1" smtClean="0"/>
@@ -9855,29 +9986,8 @@
             <a:pPr lvl="1"/>
             <a:r>
               <a:rPr lang="de-DE" dirty="0" smtClean="0"/>
-              <a:t>Lösche</a:t>
-            </a:r>
-            <a:r>
-              <a:rPr lang="de-DE" dirty="0" smtClean="0"/>
-              <a:t> </a:t>
-            </a:r>
-            <a:r>
-              <a:rPr lang="de-DE" dirty="0" smtClean="0"/>
-              <a:t>die </a:t>
-            </a:r>
-            <a:r>
-              <a:rPr lang="de-DE" dirty="0" smtClean="0"/>
-              <a:t>Branches, die nicht </a:t>
-            </a:r>
-            <a:r>
-              <a:rPr lang="de-DE" dirty="0" smtClean="0"/>
-              <a:t>länger </a:t>
-            </a:r>
-            <a:r>
-              <a:rPr lang="de-DE" dirty="0" smtClean="0"/>
-              <a:t>benötigt werden</a:t>
-            </a:r>
-            <a:endParaRPr lang="de-DE" dirty="0" smtClean="0"/>
+              <a:t>Lösche die Branches, die nicht länger benötigt werden</a:t>
+            </a:r>
           </a:p>
           <a:p>
             <a:r>
@@ -9895,15 +10005,7 @@
           <a:p>
             <a:r>
               <a:rPr lang="de-DE" dirty="0" smtClean="0"/>
-              <a:t>Arbeite in kleinen Schritten, </a:t>
-            </a:r>
-            <a:r>
-              <a:rPr lang="de-DE" dirty="0" smtClean="0"/>
-              <a:t>überprüfe </a:t>
-            </a:r>
-            <a:r>
-              <a:rPr lang="de-DE" dirty="0" smtClean="0"/>
-              <a:t>deinen Fortschritt</a:t>
+              <a:t>Arbeite in kleinen Schritten, überprüfe deinen Fortschritt</a:t>
             </a:r>
           </a:p>
           <a:p>
@@ -9936,30 +10038,14 @@
             </a:r>
             <a:r>
               <a:rPr lang="de-DE" dirty="0" smtClean="0"/>
-              <a:t> </a:t>
-            </a:r>
-            <a:r>
-              <a:rPr lang="de-DE" dirty="0" smtClean="0"/>
-              <a:t>großzügig Verwenden</a:t>
-            </a:r>
+              <a:t> großzügig Verwenden</a:t>
+            </a:r>
+          </a:p>
+          <a:p>
+            <a:pPr indent="0">
+              <a:buNone/>
+            </a:pPr>
             <a:endParaRPr lang="de-DE" dirty="0" smtClean="0"/>
-          </a:p>
-          <a:p>
-            <a:pPr lvl="1"/>
-            <a:r>
-              <a:rPr lang="de-DE" dirty="0" err="1" smtClean="0"/>
-              <a:t>StackOverflow</a:t>
-            </a:r>
-            <a:r>
-              <a:rPr lang="de-DE" dirty="0" smtClean="0"/>
-              <a:t> ist dein Freund, weil wir hier nur Hacken, nicht Test Treiber Programmierung betreiben</a:t>
-            </a:r>
-          </a:p>
-          <a:p>
-            <a:pPr indent="0">
-              <a:buNone/>
-            </a:pPr>
-            <a:endParaRPr lang="de-DE" dirty="0"/>
           </a:p>
           <a:p>
             <a:endParaRPr lang="de-DE" dirty="0"/>
@@ -10046,11 +10132,26 @@
   <p:clrMapOvr>
     <a:masterClrMapping/>
   </p:clrMapOvr>
+  <mc:AlternateContent xmlns:mc="http://schemas.openxmlformats.org/markup-compatibility/2006" xmlns:p14="http://schemas.microsoft.com/office/powerpoint/2010/main">
+    <mc:Choice Requires="p14">
+      <p:transition spd="slow" p14:dur="2000"/>
+    </mc:Choice>
+    <mc:Fallback xmlns="">
+      <p:transition spd="slow"/>
+    </mc:Fallback>
+  </mc:AlternateContent>
+  <p:timing>
+    <p:tnLst>
+      <p:par>
+        <p:cTn id="1" dur="indefinite" restart="never" nodeType="tmRoot"/>
+      </p:par>
+    </p:tnLst>
+  </p:timing>
 </p:sld>
 </file>
 
 <file path=ppt/slides/slide16.xml><?xml version="1.0" encoding="utf-8"?>
-<p:sld xmlns:a="http://schemas.openxmlformats.org/drawingml/2006/main" xmlns:r="http://schemas.openxmlformats.org/officeDocument/2006/relationships" xmlns:p="http://schemas.openxmlformats.org/presentationml/2006/main">
+<p:sld xmlns:a="http://schemas.openxmlformats.org/drawingml/2006/main" xmlns:r="http://schemas.openxmlformats.org/officeDocument/2006/relationships" xmlns:p="http://schemas.openxmlformats.org/presentationml/2006/main" show="0">
   <p:cSld>
     <p:spTree>
       <p:nvGrpSpPr>
@@ -10116,23 +10217,7 @@
             <a:pPr lvl="1"/>
             <a:r>
               <a:rPr lang="de-DE" dirty="0" smtClean="0"/>
-              <a:t>Schmeiß sie </a:t>
-            </a:r>
-            <a:r>
-              <a:rPr lang="de-DE" dirty="0" smtClean="0"/>
-              <a:t>weg, </a:t>
-            </a:r>
-            <a:r>
-              <a:rPr lang="de-DE" dirty="0" smtClean="0"/>
-              <a:t>wenn du fertig </a:t>
-            </a:r>
-            <a:r>
-              <a:rPr lang="de-DE" dirty="0" smtClean="0"/>
-              <a:t>bist	-&gt; nur </a:t>
-            </a:r>
-            <a:r>
-              <a:rPr lang="de-DE" dirty="0" smtClean="0"/>
-              <a:t>quick &amp; </a:t>
+              <a:t>Schmeiß sie weg, wenn du fertig bist	-&gt; nur quick &amp; </a:t>
             </a:r>
             <a:r>
               <a:rPr lang="de-DE" dirty="0" err="1" smtClean="0"/>
@@ -10226,6 +10311,21 @@
   <p:clrMapOvr>
     <a:masterClrMapping/>
   </p:clrMapOvr>
+  <mc:AlternateContent xmlns:mc="http://schemas.openxmlformats.org/markup-compatibility/2006" xmlns:p14="http://schemas.microsoft.com/office/powerpoint/2010/main">
+    <mc:Choice Requires="p14">
+      <p:transition spd="slow" p14:dur="2000"/>
+    </mc:Choice>
+    <mc:Fallback xmlns="">
+      <p:transition spd="slow"/>
+    </mc:Fallback>
+  </mc:AlternateContent>
+  <p:timing>
+    <p:tnLst>
+      <p:par>
+        <p:cTn id="1" dur="indefinite" restart="never" nodeType="tmRoot"/>
+      </p:par>
+    </p:tnLst>
+  </p:timing>
 </p:sld>
 </file>
 
@@ -10248,12 +10348,12 @@
       </p:grpSpPr>
       <p:sp>
         <p:nvSpPr>
-          <p:cNvPr id="8" name="Textplatzhalter 7"/>
-          <p:cNvSpPr>
-            <a:spLocks noGrp="1"/>
-          </p:cNvSpPr>
-          <p:nvPr>
-            <p:ph type="body" sz="quarter" idx="15"/>
+          <p:cNvPr id="3" name="Textplatzhalter 2"/>
+          <p:cNvSpPr>
+            <a:spLocks noGrp="1"/>
+          </p:cNvSpPr>
+          <p:nvPr>
+            <p:ph type="body" sz="quarter" idx="19"/>
           </p:nvPr>
         </p:nvSpPr>
         <p:spPr/>
@@ -10261,7 +10361,78 @@
           <a:bodyPr/>
           <a:lstStyle/>
           <a:p>
-            <a:endParaRPr lang="de-DE"/>
+            <a:r>
+              <a:rPr lang="de-DE" dirty="0" smtClean="0"/>
+              <a:t>Was ist Git</a:t>
+            </a:r>
+          </a:p>
+          <a:p>
+            <a:r>
+              <a:rPr lang="de-DE" dirty="0"/>
+              <a:t>Snapshots, nicht </a:t>
+            </a:r>
+            <a:r>
+              <a:rPr lang="de-DE" dirty="0" err="1" smtClean="0"/>
+              <a:t>Diffs</a:t>
+            </a:r>
+            <a:endParaRPr lang="de-DE" dirty="0" smtClean="0"/>
+          </a:p>
+          <a:p>
+            <a:pPr lvl="1"/>
+            <a:r>
+              <a:rPr lang="de-DE" dirty="0" err="1"/>
+              <a:t>Diffs</a:t>
+            </a:r>
+            <a:r>
+              <a:rPr lang="de-DE" dirty="0"/>
+              <a:t>, Standardverhalten von Versionskontrollsystemen</a:t>
+            </a:r>
+          </a:p>
+          <a:p>
+            <a:pPr lvl="1"/>
+            <a:r>
+              <a:rPr lang="de-DE" dirty="0"/>
+              <a:t>Git verwendet Snapshots</a:t>
+            </a:r>
+          </a:p>
+          <a:p>
+            <a:r>
+              <a:rPr lang="de-DE" dirty="0"/>
+              <a:t>Die drei Zustände in </a:t>
+            </a:r>
+            <a:r>
+              <a:rPr lang="de-DE" dirty="0" smtClean="0"/>
+              <a:t>Git</a:t>
+            </a:r>
+          </a:p>
+          <a:p>
+            <a:r>
+              <a:rPr lang="de-DE" dirty="0" smtClean="0"/>
+              <a:t>Wichtigste Befehle</a:t>
+            </a:r>
+          </a:p>
+          <a:p>
+            <a:r>
+              <a:rPr lang="de-DE" dirty="0"/>
+              <a:t>Git </a:t>
+            </a:r>
+            <a:r>
+              <a:rPr lang="de-DE" dirty="0" smtClean="0"/>
+              <a:t>Grundkonfiguration</a:t>
+            </a:r>
+          </a:p>
+          <a:p>
+            <a:r>
+              <a:rPr lang="de-DE" dirty="0" smtClean="0"/>
+              <a:t>Branches</a:t>
+            </a:r>
+            <a:endParaRPr lang="de-DE" dirty="0"/>
+          </a:p>
+          <a:p>
+            <a:r>
+              <a:rPr lang="de-DE" dirty="0"/>
+              <a:t>Spike Solutions</a:t>
+            </a:r>
           </a:p>
         </p:txBody>
       </p:sp>
@@ -10292,7 +10463,7 @@
       </p:sp>
       <p:sp>
         <p:nvSpPr>
-          <p:cNvPr id="7" name="Untertitel 6"/>
+          <p:cNvPr id="2" name="Untertitel 1"/>
           <p:cNvSpPr>
             <a:spLocks noGrp="1"/>
           </p:cNvSpPr>
@@ -10405,22 +10576,26 @@
               <a:rPr lang="de-DE" dirty="0" smtClean="0"/>
               <a:t>X</a:t>
             </a:r>
-            <a:endParaRPr lang="de-DE" dirty="0" smtClean="0"/>
-          </a:p>
-          <a:p>
-            <a:r>
-              <a:rPr lang="de-DE" dirty="0" err="1"/>
-              <a:t>Git</a:t>
-            </a:r>
+          </a:p>
+          <a:p>
             <a:r>
               <a:rPr lang="de-DE" dirty="0"/>
-              <a:t> verwaltet fast ausschließlich </a:t>
+              <a:t>Git verwaltet fast ausschließlich </a:t>
             </a:r>
             <a:r>
               <a:rPr lang="de-DE" dirty="0" smtClean="0"/>
               <a:t>Daten</a:t>
             </a:r>
-            <a:endParaRPr lang="de-DE" dirty="0"/>
+          </a:p>
+          <a:p>
+            <a:r>
+              <a:rPr lang="de-DE" dirty="0" smtClean="0"/>
+              <a:t>Veröffentlicht unter der GNU </a:t>
+            </a:r>
+            <a:r>
+              <a:rPr lang="de-DE" dirty="0"/>
+              <a:t>GPLv2</a:t>
+            </a:r>
           </a:p>
           <a:p>
             <a:r>
@@ -10938,83 +11113,7 @@
   <p:timing>
     <p:tnLst>
       <p:par>
-        <p:cTn id="1" dur="indefinite" restart="never" nodeType="tmRoot">
-          <p:childTnLst>
-            <p:seq concurrent="1" nextAc="seek">
-              <p:cTn id="2" dur="indefinite" nodeType="mainSeq">
-                <p:childTnLst>
-                  <p:par>
-                    <p:cTn id="3" fill="hold">
-                      <p:stCondLst>
-                        <p:cond delay="indefinite"/>
-                      </p:stCondLst>
-                      <p:childTnLst>
-                        <p:par>
-                          <p:cTn id="4" fill="hold">
-                            <p:stCondLst>
-                              <p:cond delay="0"/>
-                            </p:stCondLst>
-                            <p:childTnLst>
-                              <p:par>
-                                <p:cTn id="5" presetID="22" presetClass="entr" presetSubtype="4" fill="hold" nodeType="clickEffect">
-                                  <p:stCondLst>
-                                    <p:cond delay="0"/>
-                                  </p:stCondLst>
-                                  <p:childTnLst>
-                                    <p:set>
-                                      <p:cBhvr>
-                                        <p:cTn id="6" dur="1" fill="hold">
-                                          <p:stCondLst>
-                                            <p:cond delay="0"/>
-                                          </p:stCondLst>
-                                        </p:cTn>
-                                        <p:tgtEl>
-                                          <p:spTgt spid="7"/>
-                                        </p:tgtEl>
-                                        <p:attrNameLst>
-                                          <p:attrName>style.visibility</p:attrName>
-                                        </p:attrNameLst>
-                                      </p:cBhvr>
-                                      <p:to>
-                                        <p:strVal val="visible"/>
-                                      </p:to>
-                                    </p:set>
-                                    <p:animEffect transition="in" filter="wipe(down)">
-                                      <p:cBhvr>
-                                        <p:cTn id="7" dur="500"/>
-                                        <p:tgtEl>
-                                          <p:spTgt spid="7"/>
-                                        </p:tgtEl>
-                                      </p:cBhvr>
-                                    </p:animEffect>
-                                  </p:childTnLst>
-                                </p:cTn>
-                              </p:par>
-                            </p:childTnLst>
-                          </p:cTn>
-                        </p:par>
-                      </p:childTnLst>
-                    </p:cTn>
-                  </p:par>
-                </p:childTnLst>
-              </p:cTn>
-              <p:prevCondLst>
-                <p:cond evt="onPrev" delay="0">
-                  <p:tgtEl>
-                    <p:sldTgt/>
-                  </p:tgtEl>
-                </p:cond>
-              </p:prevCondLst>
-              <p:nextCondLst>
-                <p:cond evt="onNext" delay="0">
-                  <p:tgtEl>
-                    <p:sldTgt/>
-                  </p:tgtEl>
-                </p:cond>
-              </p:nextCondLst>
-            </p:seq>
-          </p:childTnLst>
-        </p:cTn>
+        <p:cTn id="1" dur="indefinite" restart="never" nodeType="tmRoot"/>
       </p:par>
     </p:tnLst>
   </p:timing>
@@ -11346,133 +11445,57 @@
           <a:lstStyle/>
           <a:p>
             <a:r>
-              <a:rPr lang="de-DE" dirty="0" smtClean="0"/>
-              <a:t>Benutzung der Git </a:t>
+              <a:rPr lang="de-DE" dirty="0" err="1"/>
+              <a:t>g</a:t>
             </a:r>
             <a:r>
               <a:rPr lang="de-DE" dirty="0" err="1" smtClean="0"/>
-              <a:t>Bash</a:t>
-            </a:r>
-            <a:r>
-              <a:rPr lang="de-DE" dirty="0" smtClean="0"/>
-              <a:t> „vereinfacht“ viele (Autovervollständigung, </a:t>
+              <a:t>it</a:t>
+            </a:r>
+            <a:r>
+              <a:rPr lang="de-DE" dirty="0" smtClean="0"/>
+              <a:t> </a:t>
             </a:r>
             <a:r>
               <a:rPr lang="de-DE" dirty="0" err="1" smtClean="0"/>
-              <a:t>Vim</a:t>
-            </a:r>
-            <a:r>
-              <a:rPr lang="de-DE" dirty="0" smtClean="0"/>
-              <a:t> Editor </a:t>
-            </a:r>
-            <a:r>
-              <a:rPr lang="de-DE" dirty="0" smtClean="0"/>
-              <a:t>steht zur </a:t>
-            </a:r>
-            <a:r>
-              <a:rPr lang="de-DE" dirty="0" smtClean="0"/>
-              <a:t>Verfügung, …)</a:t>
-            </a:r>
-          </a:p>
-          <a:p>
+              <a:t>init</a:t>
+            </a:r>
             <a:endParaRPr lang="de-DE" dirty="0" smtClean="0"/>
           </a:p>
           <a:p>
+            <a:pPr lvl="1"/>
+            <a:r>
+              <a:rPr lang="de-DE" dirty="0" smtClean="0"/>
+              <a:t>Erstellt ein neues </a:t>
+            </a:r>
+            <a:r>
+              <a:rPr lang="de-DE" dirty="0" err="1" smtClean="0"/>
+              <a:t>Git-Repositry</a:t>
+            </a:r>
+            <a:endParaRPr lang="de-DE" dirty="0" smtClean="0"/>
+          </a:p>
+          <a:p>
+            <a:pPr lvl="1" indent="0">
+              <a:buNone/>
+            </a:pPr>
             <a:endParaRPr lang="de-DE" dirty="0"/>
           </a:p>
           <a:p>
             <a:r>
-              <a:rPr lang="de-DE" dirty="0" err="1" smtClean="0"/>
+              <a:rPr lang="de-DE" altLang="de-DE" dirty="0" err="1"/>
               <a:t>git</a:t>
             </a:r>
             <a:r>
-              <a:rPr lang="de-DE" dirty="0" smtClean="0"/>
+              <a:rPr lang="de-DE" altLang="de-DE" dirty="0"/>
               <a:t> </a:t>
             </a:r>
             <a:r>
-              <a:rPr lang="de-DE" dirty="0" err="1" smtClean="0"/>
-              <a:t>config</a:t>
-            </a:r>
-            <a:r>
-              <a:rPr lang="de-DE" dirty="0" smtClean="0"/>
-              <a:t> –global user.name „&lt;Username&gt;“</a:t>
-            </a:r>
-          </a:p>
-          <a:p>
-            <a:r>
-              <a:rPr lang="de-DE" dirty="0" err="1" smtClean="0"/>
-              <a:t>git</a:t>
-            </a:r>
-            <a:r>
-              <a:rPr lang="de-DE" dirty="0" smtClean="0"/>
-              <a:t> </a:t>
-            </a:r>
-            <a:r>
-              <a:rPr lang="de-DE" dirty="0" err="1" smtClean="0"/>
-              <a:t>config</a:t>
-            </a:r>
-            <a:r>
-              <a:rPr lang="de-DE" dirty="0" smtClean="0"/>
-              <a:t> –global </a:t>
-            </a:r>
-            <a:r>
-              <a:rPr lang="de-DE" dirty="0" err="1" smtClean="0"/>
-              <a:t>user.email</a:t>
-            </a:r>
-            <a:r>
-              <a:rPr lang="de-DE" dirty="0" smtClean="0"/>
-              <a:t> </a:t>
-            </a:r>
-            <a:r>
-              <a:rPr lang="de-DE" dirty="0"/>
-              <a:t>&lt;</a:t>
-            </a:r>
-            <a:r>
-              <a:rPr lang="de-DE" dirty="0" smtClean="0"/>
-              <a:t>user@email.com&gt;</a:t>
-            </a:r>
-            <a:endParaRPr lang="de-DE" dirty="0" smtClean="0"/>
-          </a:p>
-          <a:p>
-            <a:r>
-              <a:rPr lang="de-DE" dirty="0" err="1" smtClean="0"/>
-              <a:t>git</a:t>
-            </a:r>
-            <a:r>
-              <a:rPr lang="de-DE" dirty="0" smtClean="0"/>
-              <a:t> </a:t>
-            </a:r>
-            <a:r>
-              <a:rPr lang="de-DE" dirty="0" err="1" smtClean="0"/>
-              <a:t>config</a:t>
-            </a:r>
-            <a:r>
-              <a:rPr lang="de-DE" dirty="0" smtClean="0"/>
-              <a:t> </a:t>
-            </a:r>
-            <a:r>
-              <a:rPr lang="de-DE" dirty="0" err="1" smtClean="0"/>
-              <a:t>push.default</a:t>
-            </a:r>
-            <a:r>
-              <a:rPr lang="de-DE" dirty="0" smtClean="0"/>
-              <a:t> </a:t>
-            </a:r>
-            <a:r>
-              <a:rPr lang="de-DE" dirty="0" err="1" smtClean="0"/>
-              <a:t>matching</a:t>
-            </a:r>
-            <a:r>
-              <a:rPr lang="de-DE" dirty="0" smtClean="0"/>
-              <a:t> </a:t>
-            </a:r>
-            <a:r>
-              <a:rPr lang="de-DE" dirty="0" smtClean="0"/>
-              <a:t>&lt;</a:t>
-            </a:r>
-            <a:r>
-              <a:rPr lang="de-DE" altLang="de-DE" dirty="0" smtClean="0"/>
-              <a:t>/</a:t>
+              <a:rPr lang="de-DE" altLang="de-DE" dirty="0" err="1"/>
+              <a:t>clone</a:t>
+            </a:r>
+            <a:r>
+              <a:rPr lang="de-DE" altLang="de-DE" dirty="0"/>
+              <a:t> /</a:t>
             </a:r>
             <a:r>
               <a:rPr lang="de-DE" altLang="de-DE" dirty="0" err="1" smtClean="0"/>
@@ -11487,35 +11510,72 @@
               <a:t>repository</a:t>
             </a:r>
             <a:r>
+              <a:rPr lang="de-DE" altLang="de-DE" dirty="0"/>
+              <a:t> </a:t>
+            </a:r>
+            <a:r>
               <a:rPr lang="de-DE" altLang="de-DE" dirty="0" smtClean="0"/>
-              <a:t>&gt;</a:t>
+              <a:t>oder</a:t>
+            </a:r>
+          </a:p>
+          <a:p>
+            <a:pPr indent="0">
+              <a:buNone/>
+            </a:pPr>
+            <a:r>
+              <a:rPr lang="de-DE" altLang="de-DE" dirty="0"/>
+              <a:t>		</a:t>
+            </a:r>
+            <a:r>
+              <a:rPr lang="de-DE" altLang="de-DE" dirty="0" smtClean="0"/>
+              <a:t>	/</a:t>
+            </a:r>
+            <a:r>
+              <a:rPr lang="de-DE" altLang="de-DE" dirty="0" err="1" smtClean="0"/>
+              <a:t>pfad</a:t>
+            </a:r>
+            <a:r>
+              <a:rPr lang="de-DE" altLang="de-DE" dirty="0" smtClean="0"/>
+              <a:t>/zum/</a:t>
+            </a:r>
+            <a:r>
+              <a:rPr lang="de-DE" altLang="de-DE" dirty="0" err="1" smtClean="0"/>
+              <a:t>repository</a:t>
+            </a:r>
+            <a:r>
+              <a:rPr lang="de-DE" altLang="de-DE" dirty="0" smtClean="0"/>
+              <a:t> &lt;Ordnername&gt;</a:t>
             </a:r>
           </a:p>
           <a:p>
             <a:pPr lvl="1"/>
             <a:r>
-              <a:rPr lang="de-DE" altLang="de-DE" dirty="0" smtClean="0"/>
-              <a:t>Für kürzeren </a:t>
-            </a:r>
-            <a:r>
-              <a:rPr lang="de-DE" altLang="de-DE" dirty="0" smtClean="0"/>
-              <a:t>push-Befehlt </a:t>
-            </a:r>
-            <a:r>
-              <a:rPr lang="de-DE" altLang="de-DE" dirty="0" smtClean="0"/>
-              <a:t>(nur noch </a:t>
-            </a:r>
-            <a:r>
-              <a:rPr lang="de-DE" altLang="de-DE" dirty="0" err="1" smtClean="0"/>
-              <a:t>git</a:t>
-            </a:r>
-            <a:r>
-              <a:rPr lang="de-DE" altLang="de-DE" dirty="0" smtClean="0"/>
-              <a:t> push)</a:t>
-            </a:r>
-          </a:p>
-          <a:p>
-            <a:pPr indent="0">
+              <a:rPr lang="de-DE" dirty="0" smtClean="0"/>
+              <a:t>Erstellt </a:t>
+            </a:r>
+            <a:r>
+              <a:rPr lang="de-DE" dirty="0"/>
+              <a:t>eine </a:t>
+            </a:r>
+            <a:r>
+              <a:rPr lang="de-DE" dirty="0" smtClean="0"/>
+              <a:t>Arbeitskopie des </a:t>
+            </a:r>
+            <a:r>
+              <a:rPr lang="de-DE" dirty="0" err="1" smtClean="0"/>
+              <a:t>Git</a:t>
+            </a:r>
+            <a:r>
+              <a:rPr lang="de-DE" dirty="0" smtClean="0"/>
+              <a:t> Repository, gegebenenfalls in extra angegebenen Ordner</a:t>
+            </a:r>
+            <a:endParaRPr lang="de-DE" altLang="de-DE" dirty="0"/>
+          </a:p>
+          <a:p>
+            <a:endParaRPr lang="de-DE" dirty="0" smtClean="0"/>
+          </a:p>
+          <a:p>
+            <a:pPr lvl="1" indent="0">
               <a:buNone/>
             </a:pPr>
             <a:endParaRPr lang="de-DE" dirty="0"/>
@@ -11540,12 +11600,12 @@
           <a:lstStyle/>
           <a:p>
             <a:r>
-              <a:rPr lang="de-DE" dirty="0" err="1" smtClean="0"/>
-              <a:t>Git</a:t>
-            </a:r>
-            <a:r>
-              <a:rPr lang="de-DE" dirty="0" smtClean="0"/>
-              <a:t> Grundkonfiguration</a:t>
+              <a:rPr lang="de-DE" dirty="0" smtClean="0"/>
+              <a:t>Wichtigste </a:t>
+            </a:r>
+            <a:r>
+              <a:rPr lang="de-DE" dirty="0" smtClean="0"/>
+              <a:t>Befehle</a:t>
             </a:r>
             <a:endParaRPr lang="de-DE" dirty="0"/>
           </a:p>
@@ -11570,7 +11630,7 @@
           <a:p>
             <a:r>
               <a:rPr lang="de-DE" dirty="0" smtClean="0"/>
-              <a:t>Wichtigsten Konfigurationen nach der Installation</a:t>
+              <a:t>Repository initialisieren</a:t>
             </a:r>
             <a:endParaRPr lang="de-DE" dirty="0"/>
           </a:p>
@@ -11603,13 +11663,20 @@
     </p:spTree>
     <p:extLst>
       <p:ext uri="{BB962C8B-B14F-4D97-AF65-F5344CB8AC3E}">
-        <p14:creationId xmlns:p14="http://schemas.microsoft.com/office/powerpoint/2010/main" val="1664792896"/>
+        <p14:creationId xmlns:p14="http://schemas.microsoft.com/office/powerpoint/2010/main" val="3709030433"/>
       </p:ext>
     </p:extLst>
   </p:cSld>
   <p:clrMapOvr>
     <a:masterClrMapping/>
   </p:clrMapOvr>
+  <p:timing>
+    <p:tnLst>
+      <p:par>
+        <p:cTn id="1" dur="indefinite" restart="never" nodeType="tmRoot"/>
+      </p:par>
+    </p:tnLst>
+  </p:timing>
 </p:sld>
 </file>
 
@@ -11646,12 +11713,8 @@
           <a:lstStyle/>
           <a:p>
             <a:r>
-              <a:rPr lang="de-DE" dirty="0" err="1"/>
-              <a:t>g</a:t>
-            </a:r>
-            <a:r>
               <a:rPr lang="de-DE" dirty="0" err="1" smtClean="0"/>
-              <a:t>it</a:t>
+              <a:t>git</a:t>
             </a:r>
             <a:r>
               <a:rPr lang="de-DE" dirty="0" smtClean="0"/>
@@ -11659,126 +11722,90 @@
             </a:r>
             <a:r>
               <a:rPr lang="de-DE" dirty="0" err="1" smtClean="0"/>
-              <a:t>init</a:t>
-            </a:r>
-            <a:endParaRPr lang="de-DE" dirty="0" smtClean="0"/>
+              <a:t>add</a:t>
+            </a:r>
+            <a:r>
+              <a:rPr lang="de-DE" dirty="0" smtClean="0"/>
+              <a:t> &lt;</a:t>
+            </a:r>
+            <a:r>
+              <a:rPr lang="de-DE" dirty="0" err="1" smtClean="0"/>
+              <a:t>dateiname</a:t>
+            </a:r>
+            <a:r>
+              <a:rPr lang="de-DE" dirty="0" smtClean="0"/>
+              <a:t>&gt; oder </a:t>
+            </a:r>
+            <a:r>
+              <a:rPr lang="de-DE" dirty="0" err="1" smtClean="0"/>
+              <a:t>git</a:t>
+            </a:r>
+            <a:r>
+              <a:rPr lang="de-DE" dirty="0" smtClean="0"/>
+              <a:t> </a:t>
+            </a:r>
+            <a:r>
+              <a:rPr lang="de-DE" dirty="0" err="1" smtClean="0"/>
+              <a:t>add</a:t>
+            </a:r>
+            <a:r>
+              <a:rPr lang="de-DE" dirty="0" smtClean="0"/>
+              <a:t> *</a:t>
+            </a:r>
           </a:p>
           <a:p>
             <a:pPr lvl="1"/>
             <a:r>
               <a:rPr lang="de-DE" dirty="0" smtClean="0"/>
-              <a:t>Erstellt ein neues </a:t>
-            </a:r>
+              <a:t>Fügt eine, mehrere oder alle noch nicht aufgeführten Dateien zum Repository hinzu oder merkt bereits vorhandene und modifizierte Dateien für den nächsten Commit vor</a:t>
+            </a:r>
+          </a:p>
+          <a:p>
+            <a:pPr lvl="1"/>
+            <a:endParaRPr lang="de-DE" dirty="0"/>
+          </a:p>
+          <a:p>
             <a:r>
               <a:rPr lang="de-DE" dirty="0" err="1" smtClean="0"/>
-              <a:t>Git-Repositry</a:t>
-            </a:r>
-            <a:endParaRPr lang="de-DE" dirty="0" smtClean="0"/>
-          </a:p>
-          <a:p>
-            <a:pPr lvl="1" indent="0">
-              <a:buNone/>
-            </a:pPr>
+              <a:t>git</a:t>
+            </a:r>
+            <a:r>
+              <a:rPr lang="de-DE" dirty="0" smtClean="0"/>
+              <a:t> </a:t>
+            </a:r>
+            <a:r>
+              <a:rPr lang="de-DE" dirty="0" err="1" smtClean="0"/>
+              <a:t>rm</a:t>
+            </a:r>
+            <a:r>
+              <a:rPr lang="de-DE" dirty="0" smtClean="0"/>
+              <a:t> &lt;</a:t>
+            </a:r>
+            <a:r>
+              <a:rPr lang="de-DE" dirty="0" err="1" smtClean="0"/>
+              <a:t>dateiname</a:t>
+            </a:r>
+            <a:r>
+              <a:rPr lang="de-DE" dirty="0" smtClean="0"/>
+              <a:t>&gt; </a:t>
+            </a:r>
+          </a:p>
+          <a:p>
+            <a:pPr lvl="1"/>
+            <a:r>
+              <a:rPr lang="de-DE" dirty="0" smtClean="0"/>
+              <a:t>Löscht die Angegebene Datei aus dem Repository (bei ganzen Verzeichnissen wird der Parameter –r benötigt)</a:t>
+            </a:r>
+          </a:p>
+          <a:p>
+            <a:pPr lvl="1"/>
             <a:endParaRPr lang="de-DE" dirty="0"/>
           </a:p>
           <a:p>
-            <a:r>
-              <a:rPr lang="de-DE" altLang="de-DE" dirty="0" err="1"/>
-              <a:t>git</a:t>
-            </a:r>
-            <a:r>
-              <a:rPr lang="de-DE" altLang="de-DE" dirty="0"/>
-              <a:t> </a:t>
-            </a:r>
-            <a:r>
-              <a:rPr lang="de-DE" altLang="de-DE" dirty="0" err="1"/>
-              <a:t>clone</a:t>
-            </a:r>
-            <a:r>
-              <a:rPr lang="de-DE" altLang="de-DE" dirty="0"/>
-              <a:t> /</a:t>
-            </a:r>
-            <a:r>
-              <a:rPr lang="de-DE" altLang="de-DE" dirty="0" err="1" smtClean="0"/>
-              <a:t>pfad</a:t>
-            </a:r>
-            <a:r>
-              <a:rPr lang="de-DE" altLang="de-DE" dirty="0" smtClean="0"/>
-              <a:t>/zum/</a:t>
-            </a:r>
-            <a:r>
-              <a:rPr lang="de-DE" altLang="de-DE" dirty="0" err="1" smtClean="0"/>
-              <a:t>repository</a:t>
-            </a:r>
-            <a:r>
-              <a:rPr lang="de-DE" altLang="de-DE" dirty="0"/>
-              <a:t> </a:t>
-            </a:r>
-            <a:r>
-              <a:rPr lang="de-DE" altLang="de-DE" dirty="0" smtClean="0"/>
-              <a:t>oder</a:t>
-            </a:r>
-          </a:p>
-          <a:p>
-            <a:pPr indent="0">
-              <a:buNone/>
-            </a:pPr>
-            <a:r>
-              <a:rPr lang="de-DE" altLang="de-DE" dirty="0"/>
-              <a:t>		</a:t>
-            </a:r>
-            <a:r>
-              <a:rPr lang="de-DE" altLang="de-DE" dirty="0" smtClean="0"/>
-              <a:t>	/</a:t>
-            </a:r>
-            <a:r>
-              <a:rPr lang="de-DE" altLang="de-DE" dirty="0" err="1" smtClean="0"/>
-              <a:t>pfad</a:t>
-            </a:r>
-            <a:r>
-              <a:rPr lang="de-DE" altLang="de-DE" dirty="0" smtClean="0"/>
-              <a:t>/zum/</a:t>
-            </a:r>
-            <a:r>
-              <a:rPr lang="de-DE" altLang="de-DE" dirty="0" err="1" smtClean="0"/>
-              <a:t>repository</a:t>
-            </a:r>
-            <a:r>
-              <a:rPr lang="de-DE" altLang="de-DE" dirty="0" smtClean="0"/>
-              <a:t> &lt;Ordnername&gt;</a:t>
-            </a:r>
-          </a:p>
-          <a:p>
             <a:pPr lvl="1"/>
-            <a:r>
-              <a:rPr lang="de-DE" dirty="0" smtClean="0"/>
-              <a:t>Erstellt </a:t>
-            </a:r>
-            <a:r>
-              <a:rPr lang="de-DE" dirty="0"/>
-              <a:t>eine </a:t>
-            </a:r>
-            <a:r>
-              <a:rPr lang="de-DE" dirty="0" smtClean="0"/>
-              <a:t>Arbeitskopie des </a:t>
-            </a:r>
-            <a:r>
-              <a:rPr lang="de-DE" dirty="0" err="1" smtClean="0"/>
-              <a:t>Git</a:t>
-            </a:r>
-            <a:r>
-              <a:rPr lang="de-DE" dirty="0" smtClean="0"/>
-              <a:t> Repository, gegebenenfalls in extra angegebenen Ordner</a:t>
-            </a:r>
-            <a:endParaRPr lang="de-DE" altLang="de-DE" dirty="0"/>
-          </a:p>
-          <a:p>
-            <a:endParaRPr lang="de-DE" dirty="0" smtClean="0"/>
-          </a:p>
-          <a:p>
-            <a:pPr lvl="1" indent="0">
-              <a:buNone/>
-            </a:pPr>
+            <a:endParaRPr lang="de-DE" dirty="0"/>
+          </a:p>
+          <a:p>
             <a:endParaRPr lang="de-DE" dirty="0"/>
           </a:p>
         </p:txBody>
@@ -11802,9 +11829,12 @@
           <a:p>
             <a:r>
               <a:rPr lang="de-DE" dirty="0" smtClean="0"/>
-              <a:t>Wichtigste Befehle</a:t>
-            </a:r>
-            <a:endParaRPr lang="de-DE" dirty="0"/>
+              <a:t>Wichtigste </a:t>
+            </a:r>
+            <a:r>
+              <a:rPr lang="de-DE" dirty="0"/>
+              <a:t>Befehle</a:t>
+            </a:r>
           </a:p>
         </p:txBody>
       </p:sp>
@@ -11827,7 +11857,7 @@
           <a:p>
             <a:r>
               <a:rPr lang="de-DE" dirty="0" smtClean="0"/>
-              <a:t>Repository initialisieren</a:t>
+              <a:t>Workflow</a:t>
             </a:r>
             <a:endParaRPr lang="de-DE" dirty="0"/>
           </a:p>
@@ -11860,7 +11890,7 @@
     </p:spTree>
     <p:extLst>
       <p:ext uri="{BB962C8B-B14F-4D97-AF65-F5344CB8AC3E}">
-        <p14:creationId xmlns:p14="http://schemas.microsoft.com/office/powerpoint/2010/main" val="3709030433"/>
+        <p14:creationId xmlns:p14="http://schemas.microsoft.com/office/powerpoint/2010/main" val="3096008763"/>
       </p:ext>
     </p:extLst>
   </p:cSld>
@@ -11910,6 +11940,48 @@
           <a:lstStyle/>
           <a:p>
             <a:r>
+              <a:rPr lang="de-DE" dirty="0" err="1"/>
+              <a:t>git</a:t>
+            </a:r>
+            <a:r>
+              <a:rPr lang="de-DE" dirty="0"/>
+              <a:t> </a:t>
+            </a:r>
+            <a:r>
+              <a:rPr lang="de-DE" dirty="0" err="1"/>
+              <a:t>commit</a:t>
+            </a:r>
+            <a:r>
+              <a:rPr lang="de-DE" dirty="0"/>
+              <a:t> –m </a:t>
+            </a:r>
+            <a:r>
+              <a:rPr lang="de-DE" dirty="0" smtClean="0"/>
+              <a:t>“&lt;Commit Nachricht&gt;“</a:t>
+            </a:r>
+            <a:endParaRPr lang="de-DE" dirty="0"/>
+          </a:p>
+          <a:p>
+            <a:pPr lvl="1"/>
+            <a:r>
+              <a:rPr lang="de-DE" dirty="0" smtClean="0"/>
+              <a:t>Bestätigen der </a:t>
+            </a:r>
+            <a:r>
+              <a:rPr lang="de-DE" dirty="0"/>
+              <a:t>Änderungen (modifizierte, hinzugefügte und gelöschte Dateien) gegenüber des lokalen Git </a:t>
+            </a:r>
+            <a:r>
+              <a:rPr lang="de-DE" dirty="0" smtClean="0"/>
+              <a:t>Repository</a:t>
+            </a:r>
+          </a:p>
+          <a:p>
+            <a:pPr lvl="1"/>
+            <a:endParaRPr lang="de-DE" dirty="0"/>
+          </a:p>
+          <a:p>
+            <a:r>
               <a:rPr lang="de-DE" dirty="0" err="1" smtClean="0"/>
               <a:t>git</a:t>
             </a:r>
@@ -11919,87 +11991,76 @@
             </a:r>
             <a:r>
               <a:rPr lang="de-DE" dirty="0" err="1" smtClean="0"/>
-              <a:t>add</a:t>
-            </a:r>
-            <a:r>
-              <a:rPr lang="de-DE" dirty="0" smtClean="0"/>
-              <a:t> &lt;</a:t>
+              <a:t>status</a:t>
+            </a:r>
+            <a:r>
+              <a:rPr lang="de-DE" dirty="0" smtClean="0"/>
+              <a:t> </a:t>
+            </a:r>
+            <a:endParaRPr lang="de-DE" dirty="0"/>
+          </a:p>
+          <a:p>
+            <a:pPr lvl="1"/>
+            <a:r>
+              <a:rPr lang="de-DE" dirty="0" smtClean="0"/>
+              <a:t>Zeigt die getätigten Änderungen (nicht </a:t>
             </a:r>
             <a:r>
               <a:rPr lang="de-DE" dirty="0" err="1" smtClean="0"/>
-              <a:t>dateiname</a:t>
-            </a:r>
-            <a:r>
-              <a:rPr lang="de-DE" dirty="0" smtClean="0"/>
-              <a:t>&gt; oder </a:t>
+              <a:t>commited</a:t>
+            </a:r>
+            <a:r>
+              <a:rPr lang="de-DE" dirty="0" smtClean="0"/>
+              <a:t>) an</a:t>
+            </a:r>
+          </a:p>
+          <a:p>
+            <a:pPr lvl="1" indent="0">
+              <a:buNone/>
+            </a:pPr>
+            <a:r>
+              <a:rPr lang="de-DE" dirty="0" smtClean="0"/>
+              <a:t> </a:t>
+            </a:r>
+            <a:endParaRPr lang="de-DE" dirty="0"/>
+          </a:p>
+          <a:p>
+            <a:r>
+              <a:rPr lang="de-DE" altLang="de-DE" dirty="0" err="1"/>
+              <a:t>git</a:t>
+            </a:r>
+            <a:r>
+              <a:rPr lang="de-DE" altLang="de-DE" dirty="0"/>
+              <a:t> </a:t>
+            </a:r>
+            <a:r>
+              <a:rPr lang="de-DE" altLang="de-DE" dirty="0" smtClean="0"/>
+              <a:t>push</a:t>
+            </a:r>
+            <a:endParaRPr lang="de-DE" altLang="de-DE" dirty="0"/>
+          </a:p>
+          <a:p>
+            <a:pPr lvl="1"/>
+            <a:r>
+              <a:rPr lang="de-DE" dirty="0"/>
+              <a:t>Übertragen der </a:t>
+            </a:r>
+            <a:r>
+              <a:rPr lang="de-DE" dirty="0" err="1"/>
+              <a:t>Commits</a:t>
+            </a:r>
+            <a:r>
+              <a:rPr lang="de-DE" dirty="0"/>
+              <a:t> an das Master Repository </a:t>
+            </a:r>
+            <a:r>
+              <a:rPr lang="de-DE" dirty="0" smtClean="0"/>
+              <a:t>im aktuellen </a:t>
             </a:r>
             <a:r>
               <a:rPr lang="de-DE" dirty="0" err="1" smtClean="0"/>
-              <a:t>git</a:t>
-            </a:r>
-            <a:r>
-              <a:rPr lang="de-DE" dirty="0" smtClean="0"/>
-              <a:t> </a:t>
-            </a:r>
-            <a:r>
-              <a:rPr lang="de-DE" dirty="0" err="1" smtClean="0"/>
-              <a:t>add</a:t>
-            </a:r>
-            <a:r>
-              <a:rPr lang="de-DE" dirty="0" smtClean="0"/>
-              <a:t> *</a:t>
-            </a:r>
-          </a:p>
-          <a:p>
-            <a:pPr lvl="1"/>
-            <a:r>
-              <a:rPr lang="de-DE" dirty="0" smtClean="0"/>
-              <a:t>Fügt eine, mehrere oder alle noch nicht aufgeführten Dateien zum Repository hinzu</a:t>
-            </a:r>
-          </a:p>
-          <a:p>
-            <a:pPr lvl="1"/>
-            <a:endParaRPr lang="de-DE" dirty="0"/>
-          </a:p>
-          <a:p>
-            <a:r>
-              <a:rPr lang="de-DE" dirty="0" err="1" smtClean="0"/>
-              <a:t>git</a:t>
-            </a:r>
-            <a:r>
-              <a:rPr lang="de-DE" dirty="0" smtClean="0"/>
-              <a:t> </a:t>
-            </a:r>
-            <a:r>
-              <a:rPr lang="de-DE" dirty="0" err="1" smtClean="0"/>
-              <a:t>rm</a:t>
-            </a:r>
-            <a:r>
-              <a:rPr lang="de-DE" dirty="0" smtClean="0"/>
-              <a:t> &lt;</a:t>
-            </a:r>
-            <a:r>
-              <a:rPr lang="de-DE" dirty="0" err="1" smtClean="0"/>
-              <a:t>dateiname</a:t>
-            </a:r>
-            <a:r>
-              <a:rPr lang="de-DE" dirty="0" smtClean="0"/>
-              <a:t>&gt; </a:t>
-            </a:r>
-          </a:p>
-          <a:p>
-            <a:pPr lvl="1"/>
-            <a:r>
-              <a:rPr lang="de-DE" dirty="0" smtClean="0"/>
-              <a:t>Löscht die Angegebene Datei aus dem Repository (bei ganzen Verzeichnissen wird der Parameter –r benötigt)</a:t>
-            </a:r>
-          </a:p>
-          <a:p>
-            <a:pPr lvl="1"/>
-            <a:endParaRPr lang="de-DE" dirty="0"/>
-          </a:p>
-          <a:p>
-            <a:pPr lvl="1"/>
+              <a:t>Branch</a:t>
+            </a:r>
             <a:endParaRPr lang="de-DE" dirty="0"/>
           </a:p>
           <a:p>
@@ -12025,8 +12086,12 @@
           <a:lstStyle/>
           <a:p>
             <a:r>
+              <a:rPr lang="de-DE" dirty="0" smtClean="0"/>
+              <a:t>Wichtigste </a:t>
+            </a:r>
+            <a:r>
               <a:rPr lang="de-DE" dirty="0"/>
-              <a:t>Wichtigste Befehle</a:t>
+              <a:t>Befehle</a:t>
             </a:r>
           </a:p>
         </p:txBody>
@@ -12083,7 +12148,7 @@
     </p:spTree>
     <p:extLst>
       <p:ext uri="{BB962C8B-B14F-4D97-AF65-F5344CB8AC3E}">
-        <p14:creationId xmlns:p14="http://schemas.microsoft.com/office/powerpoint/2010/main" val="3096008763"/>
+        <p14:creationId xmlns:p14="http://schemas.microsoft.com/office/powerpoint/2010/main" val="4220624184"/>
       </p:ext>
     </p:extLst>
   </p:cSld>

</xml_diff>

<commit_message>
Lediglich die Reihenfolge geändert
</commit_message>
<xml_diff>
--- a/git_vortrag.pptx
+++ b/git_vortrag.pptx
@@ -19,11 +19,11 @@
     <p:sldId id="261" r:id="rId7"/>
     <p:sldId id="262" r:id="rId8"/>
     <p:sldId id="260" r:id="rId9"/>
-    <p:sldId id="259" r:id="rId10"/>
-    <p:sldId id="263" r:id="rId11"/>
-    <p:sldId id="266" r:id="rId12"/>
-    <p:sldId id="271" r:id="rId13"/>
-    <p:sldId id="268" r:id="rId14"/>
+    <p:sldId id="268" r:id="rId10"/>
+    <p:sldId id="259" r:id="rId11"/>
+    <p:sldId id="263" r:id="rId12"/>
+    <p:sldId id="266" r:id="rId13"/>
+    <p:sldId id="271" r:id="rId14"/>
     <p:sldId id="264" r:id="rId15"/>
     <p:sldId id="272" r:id="rId16"/>
     <p:sldId id="267" r:id="rId17"/>
@@ -8557,29 +8557,90 @@
           <a:p>
             <a:r>
               <a:rPr lang="de-DE" dirty="0" err="1"/>
-              <a:t>g</a:t>
-            </a:r>
+              <a:t>git</a:t>
+            </a:r>
+            <a:r>
+              <a:rPr lang="de-DE" dirty="0"/>
+              <a:t> </a:t>
+            </a:r>
+            <a:r>
+              <a:rPr lang="de-DE" dirty="0" err="1"/>
+              <a:t>commit</a:t>
+            </a:r>
+            <a:r>
+              <a:rPr lang="de-DE" dirty="0"/>
+              <a:t> –m </a:t>
+            </a:r>
+            <a:r>
+              <a:rPr lang="de-DE" dirty="0" smtClean="0"/>
+              <a:t>“&lt;Commit Nachricht&gt;“</a:t>
+            </a:r>
+            <a:endParaRPr lang="de-DE" dirty="0"/>
+          </a:p>
+          <a:p>
+            <a:pPr lvl="1"/>
+            <a:r>
+              <a:rPr lang="de-DE" dirty="0" smtClean="0"/>
+              <a:t>Bestätigen der </a:t>
+            </a:r>
+            <a:r>
+              <a:rPr lang="de-DE" dirty="0"/>
+              <a:t>Änderungen (modifizierte, hinzugefügte und gelöschte Dateien) gegenüber des lokalen Git </a:t>
+            </a:r>
+            <a:r>
+              <a:rPr lang="de-DE" dirty="0" smtClean="0"/>
+              <a:t>Repository</a:t>
+            </a:r>
+          </a:p>
+          <a:p>
+            <a:pPr lvl="1"/>
+            <a:endParaRPr lang="de-DE" dirty="0"/>
+          </a:p>
+          <a:p>
             <a:r>
               <a:rPr lang="de-DE" dirty="0" err="1" smtClean="0"/>
-              <a:t>it</a:t>
-            </a:r>
-            <a:r>
-              <a:rPr lang="de-DE" dirty="0" smtClean="0"/>
-              <a:t> pull</a:t>
-            </a:r>
+              <a:t>git</a:t>
+            </a:r>
+            <a:r>
+              <a:rPr lang="de-DE" dirty="0" smtClean="0"/>
+              <a:t> </a:t>
+            </a:r>
+            <a:r>
+              <a:rPr lang="de-DE" dirty="0" err="1" smtClean="0"/>
+              <a:t>status</a:t>
+            </a:r>
+            <a:r>
+              <a:rPr lang="de-DE" dirty="0" smtClean="0"/>
+              <a:t> </a:t>
+            </a:r>
+            <a:endParaRPr lang="de-DE" dirty="0"/>
           </a:p>
           <a:p>
             <a:pPr lvl="1"/>
             <a:r>
               <a:rPr lang="de-DE" dirty="0" smtClean="0"/>
-              <a:t>Aktualisiert das lokale Repository mit den neuesten Änderungen</a:t>
-            </a:r>
-          </a:p>
-          <a:p>
+              <a:t>Zeigt die getätigten Änderungen (nicht </a:t>
+            </a:r>
+            <a:r>
+              <a:rPr lang="de-DE" dirty="0" err="1" smtClean="0"/>
+              <a:t>commited</a:t>
+            </a:r>
+            <a:r>
+              <a:rPr lang="de-DE" dirty="0" smtClean="0"/>
+              <a:t>) an</a:t>
+            </a:r>
+          </a:p>
+          <a:p>
+            <a:pPr lvl="1" indent="0">
+              <a:buNone/>
+            </a:pPr>
+            <a:r>
+              <a:rPr lang="de-DE" dirty="0" smtClean="0"/>
+              <a:t> </a:t>
+            </a:r>
             <a:endParaRPr lang="de-DE" dirty="0"/>
           </a:p>
           <a:p>
-            <a:pPr lvl="0"/>
             <a:r>
               <a:rPr lang="de-DE" altLang="de-DE" dirty="0" err="1"/>
               <a:t>git</a:t>
@@ -8589,51 +8650,33 @@
               <a:t> </a:t>
             </a:r>
             <a:r>
-              <a:rPr lang="de-DE" altLang="de-DE" dirty="0" err="1"/>
-              <a:t>diff</a:t>
-            </a:r>
-            <a:r>
-              <a:rPr lang="de-DE" altLang="de-DE" dirty="0"/>
-              <a:t> &lt;</a:t>
-            </a:r>
-            <a:r>
-              <a:rPr lang="de-DE" altLang="de-DE" dirty="0" err="1"/>
-              <a:t>quell_branch</a:t>
-            </a:r>
-            <a:r>
-              <a:rPr lang="de-DE" altLang="de-DE" dirty="0"/>
-              <a:t>&gt; &lt;</a:t>
-            </a:r>
-            <a:r>
-              <a:rPr lang="de-DE" altLang="de-DE" dirty="0" err="1"/>
-              <a:t>ziel_branch</a:t>
-            </a:r>
-            <a:r>
-              <a:rPr lang="de-DE" altLang="de-DE" dirty="0"/>
-              <a:t>&gt; </a:t>
-            </a:r>
-            <a:endParaRPr lang="de-DE" altLang="de-DE" dirty="0" smtClean="0"/>
+              <a:rPr lang="de-DE" altLang="de-DE" dirty="0" smtClean="0"/>
+              <a:t>push</a:t>
+            </a:r>
+            <a:endParaRPr lang="de-DE" altLang="de-DE" dirty="0"/>
           </a:p>
           <a:p>
             <a:pPr lvl="1"/>
             <a:r>
-              <a:rPr lang="de-DE" altLang="de-DE" dirty="0" smtClean="0"/>
-              <a:t>Zeigt die Differenzen zweier Branches (vergleichbare Syntax bei </a:t>
-            </a:r>
-            <a:r>
-              <a:rPr lang="de-DE" altLang="de-DE" dirty="0" err="1" smtClean="0"/>
-              <a:t>commits</a:t>
-            </a:r>
-            <a:r>
-              <a:rPr lang="de-DE" altLang="de-DE" dirty="0" smtClean="0"/>
-              <a:t>)</a:t>
-            </a:r>
-            <a:endParaRPr lang="de-DE" altLang="de-DE" dirty="0"/>
-          </a:p>
-          <a:p>
-            <a:endParaRPr lang="de-DE" dirty="0" smtClean="0"/>
-          </a:p>
-          <a:p>
+              <a:rPr lang="de-DE" dirty="0"/>
+              <a:t>Übertragen der </a:t>
+            </a:r>
+            <a:r>
+              <a:rPr lang="de-DE" dirty="0" err="1"/>
+              <a:t>Commits</a:t>
+            </a:r>
+            <a:r>
+              <a:rPr lang="de-DE" dirty="0"/>
+              <a:t> an das Master Repository </a:t>
+            </a:r>
+            <a:r>
+              <a:rPr lang="de-DE" dirty="0" smtClean="0"/>
+              <a:t>im aktuellen </a:t>
+            </a:r>
+            <a:r>
+              <a:rPr lang="de-DE" dirty="0" err="1" smtClean="0"/>
+              <a:t>Branch</a:t>
+            </a:r>
             <a:endParaRPr lang="de-DE" dirty="0"/>
           </a:p>
           <a:p>
@@ -8721,7 +8764,7 @@
     </p:spTree>
     <p:extLst>
       <p:ext uri="{BB962C8B-B14F-4D97-AF65-F5344CB8AC3E}">
-        <p14:creationId xmlns:p14="http://schemas.microsoft.com/office/powerpoint/2010/main" val="1191540642"/>
+        <p14:creationId xmlns:p14="http://schemas.microsoft.com/office/powerpoint/2010/main" val="4220624184"/>
       </p:ext>
     </p:extLst>
   </p:cSld>
@@ -8767,278 +8810,91 @@
         </p:nvSpPr>
         <p:spPr/>
         <p:txBody>
-          <a:bodyPr>
-            <a:normAutofit fontScale="92500" lnSpcReduction="10000"/>
-          </a:bodyPr>
+          <a:bodyPr/>
           <a:lstStyle/>
           <a:p>
             <a:r>
-              <a:rPr lang="de-DE" dirty="0" smtClean="0"/>
-              <a:t>Benutzung der Git </a:t>
+              <a:rPr lang="de-DE" dirty="0" err="1"/>
+              <a:t>g</a:t>
             </a:r>
             <a:r>
               <a:rPr lang="de-DE" dirty="0" err="1" smtClean="0"/>
-              <a:t>Bash</a:t>
-            </a:r>
-            <a:r>
-              <a:rPr lang="de-DE" dirty="0" smtClean="0"/>
-              <a:t> „vereinfacht“ viele (Autovervollständigung, </a:t>
-            </a:r>
-            <a:r>
-              <a:rPr lang="de-DE" dirty="0" err="1" smtClean="0"/>
-              <a:t>Vim</a:t>
-            </a:r>
-            <a:r>
-              <a:rPr lang="de-DE" dirty="0" smtClean="0"/>
-              <a:t> Editor steht zur Verfügung, …)</a:t>
+              <a:t>it</a:t>
+            </a:r>
+            <a:r>
+              <a:rPr lang="de-DE" dirty="0" smtClean="0"/>
+              <a:t> pull</a:t>
+            </a:r>
+          </a:p>
+          <a:p>
+            <a:pPr lvl="1"/>
+            <a:r>
+              <a:rPr lang="de-DE" dirty="0" smtClean="0"/>
+              <a:t>Aktualisiert das lokale Repository mit den neuesten Änderungen</a:t>
             </a:r>
           </a:p>
           <a:p>
             <a:endParaRPr lang="de-DE" dirty="0"/>
           </a:p>
           <a:p>
-            <a:r>
-              <a:rPr lang="de-DE" dirty="0" err="1" smtClean="0"/>
+            <a:pPr lvl="0"/>
+            <a:r>
+              <a:rPr lang="de-DE" altLang="de-DE" dirty="0" err="1"/>
               <a:t>git</a:t>
             </a:r>
             <a:r>
-              <a:rPr lang="de-DE" dirty="0" smtClean="0"/>
+              <a:rPr lang="de-DE" altLang="de-DE" dirty="0"/>
               <a:t> </a:t>
             </a:r>
             <a:r>
-              <a:rPr lang="de-DE" dirty="0" err="1" smtClean="0"/>
-              <a:t>config</a:t>
-            </a:r>
-            <a:r>
-              <a:rPr lang="de-DE" dirty="0" smtClean="0"/>
-              <a:t> –global user.name „&lt;Username&gt;“</a:t>
-            </a:r>
-          </a:p>
-          <a:p>
-            <a:r>
-              <a:rPr lang="de-DE" dirty="0" err="1" smtClean="0"/>
-              <a:t>git</a:t>
-            </a:r>
-            <a:r>
-              <a:rPr lang="de-DE" dirty="0" smtClean="0"/>
-              <a:t> </a:t>
-            </a:r>
-            <a:r>
-              <a:rPr lang="de-DE" dirty="0" err="1" smtClean="0"/>
-              <a:t>config</a:t>
-            </a:r>
-            <a:r>
-              <a:rPr lang="de-DE" dirty="0" smtClean="0"/>
-              <a:t> –global </a:t>
-            </a:r>
-            <a:r>
-              <a:rPr lang="de-DE" dirty="0" err="1" smtClean="0"/>
-              <a:t>user.email</a:t>
-            </a:r>
-            <a:r>
-              <a:rPr lang="de-DE" dirty="0" smtClean="0"/>
-              <a:t> </a:t>
-            </a:r>
-            <a:r>
-              <a:rPr lang="de-DE" dirty="0"/>
-              <a:t>&lt;</a:t>
-            </a:r>
-            <a:r>
-              <a:rPr lang="de-DE" dirty="0" smtClean="0"/>
-              <a:t>user@email.com&gt;</a:t>
-            </a:r>
-          </a:p>
-          <a:p>
-            <a:r>
-              <a:rPr lang="de-DE" dirty="0" err="1" smtClean="0"/>
-              <a:t>git</a:t>
-            </a:r>
-            <a:r>
-              <a:rPr lang="de-DE" dirty="0" smtClean="0"/>
-              <a:t> </a:t>
-            </a:r>
-            <a:r>
-              <a:rPr lang="de-DE" dirty="0" err="1" smtClean="0"/>
-              <a:t>config</a:t>
-            </a:r>
-            <a:r>
-              <a:rPr lang="de-DE" dirty="0" smtClean="0"/>
-              <a:t> </a:t>
-            </a:r>
-            <a:r>
-              <a:rPr lang="de-DE" dirty="0" err="1" smtClean="0"/>
-              <a:t>push.default</a:t>
-            </a:r>
-            <a:r>
-              <a:rPr lang="de-DE" dirty="0" smtClean="0"/>
-              <a:t> </a:t>
-            </a:r>
-            <a:r>
-              <a:rPr lang="de-DE" dirty="0" err="1" smtClean="0"/>
-              <a:t>matching</a:t>
-            </a:r>
-            <a:r>
-              <a:rPr lang="de-DE" dirty="0" smtClean="0"/>
+              <a:rPr lang="de-DE" altLang="de-DE" dirty="0" err="1"/>
+              <a:t>diff</a:t>
+            </a:r>
+            <a:r>
+              <a:rPr lang="de-DE" altLang="de-DE" dirty="0"/>
               <a:t> &lt;</a:t>
             </a:r>
             <a:r>
+              <a:rPr lang="de-DE" altLang="de-DE" dirty="0" err="1"/>
+              <a:t>quell_branch</a:t>
+            </a:r>
+            <a:r>
+              <a:rPr lang="de-DE" altLang="de-DE" dirty="0"/>
+              <a:t>&gt; &lt;</a:t>
+            </a:r>
+            <a:r>
+              <a:rPr lang="de-DE" altLang="de-DE" dirty="0" err="1"/>
+              <a:t>ziel_branch</a:t>
+            </a:r>
+            <a:r>
+              <a:rPr lang="de-DE" altLang="de-DE" dirty="0"/>
+              <a:t>&gt; </a:t>
+            </a:r>
+            <a:endParaRPr lang="de-DE" altLang="de-DE" dirty="0" smtClean="0"/>
+          </a:p>
+          <a:p>
+            <a:pPr lvl="1"/>
+            <a:r>
               <a:rPr lang="de-DE" altLang="de-DE" dirty="0" smtClean="0"/>
-              <a:t>/</a:t>
+              <a:t>Zeigt die Differenzen zweier Branches (vergleichbare Syntax bei </a:t>
             </a:r>
             <a:r>
               <a:rPr lang="de-DE" altLang="de-DE" dirty="0" err="1" smtClean="0"/>
-              <a:t>pfad</a:t>
+              <a:t>commits</a:t>
             </a:r>
             <a:r>
               <a:rPr lang="de-DE" altLang="de-DE" dirty="0" smtClean="0"/>
-              <a:t>/zum/</a:t>
-            </a:r>
-            <a:r>
-              <a:rPr lang="de-DE" altLang="de-DE" dirty="0" err="1" smtClean="0"/>
-              <a:t>repository</a:t>
-            </a:r>
-            <a:r>
-              <a:rPr lang="de-DE" altLang="de-DE" dirty="0" smtClean="0"/>
-              <a:t>&gt;</a:t>
-            </a:r>
-          </a:p>
-          <a:p>
-            <a:pPr lvl="1"/>
-            <a:r>
-              <a:rPr lang="de-DE" altLang="de-DE" dirty="0" smtClean="0"/>
-              <a:t>Für kürzeren </a:t>
-            </a:r>
-            <a:r>
-              <a:rPr lang="de-DE" altLang="de-DE" dirty="0" smtClean="0"/>
-              <a:t>push-Befehl (nur </a:t>
-            </a:r>
-            <a:r>
-              <a:rPr lang="de-DE" altLang="de-DE" dirty="0" smtClean="0"/>
-              <a:t>noch </a:t>
-            </a:r>
-            <a:r>
-              <a:rPr lang="de-DE" altLang="de-DE" dirty="0" err="1" smtClean="0"/>
-              <a:t>git</a:t>
-            </a:r>
-            <a:r>
-              <a:rPr lang="de-DE" altLang="de-DE" dirty="0" smtClean="0"/>
-              <a:t> push)</a:t>
-            </a:r>
-          </a:p>
-          <a:p>
-            <a:pPr lvl="1" indent="0">
-              <a:buNone/>
-            </a:pPr>
-            <a:endParaRPr lang="de-DE" altLang="de-DE" dirty="0" smtClean="0"/>
-          </a:p>
-          <a:p>
-            <a:r>
-              <a:rPr lang="de-DE" dirty="0"/>
-              <a:t>Kopieren des Projekts incl. Erzeugen des </a:t>
-            </a:r>
-            <a:r>
-              <a:rPr lang="de-DE" dirty="0" err="1"/>
-              <a:t>working</a:t>
-            </a:r>
-            <a:r>
-              <a:rPr lang="de-DE" dirty="0"/>
-              <a:t> </a:t>
-            </a:r>
-            <a:r>
-              <a:rPr lang="de-DE" dirty="0" err="1"/>
-              <a:t>directory</a:t>
-            </a:r>
-            <a:r>
-              <a:rPr lang="de-DE" dirty="0"/>
-              <a:t>:</a:t>
-            </a:r>
-          </a:p>
-          <a:p>
-            <a:pPr lvl="1"/>
-            <a:r>
-              <a:rPr lang="de-DE" dirty="0" err="1"/>
-              <a:t>git</a:t>
-            </a:r>
-            <a:r>
-              <a:rPr lang="de-DE" dirty="0"/>
-              <a:t> </a:t>
-            </a:r>
-            <a:r>
-              <a:rPr lang="de-DE" dirty="0" err="1"/>
-              <a:t>clone</a:t>
-            </a:r>
-            <a:r>
-              <a:rPr lang="de-DE" dirty="0"/>
-              <a:t> https://github.com/daHaimi/2dgame-thi-2016.git [&lt;Ordnername&gt;]</a:t>
-            </a:r>
+              <a:t>)</a:t>
+            </a:r>
+            <a:endParaRPr lang="de-DE" altLang="de-DE" dirty="0"/>
+          </a:p>
+          <a:p>
+            <a:endParaRPr lang="de-DE" dirty="0" smtClean="0"/>
           </a:p>
           <a:p>
             <a:endParaRPr lang="de-DE" dirty="0"/>
           </a:p>
           <a:p>
-            <a:r>
-              <a:rPr lang="de-DE" dirty="0"/>
-              <a:t>Geänderte Dateien </a:t>
-            </a:r>
-            <a:r>
-              <a:rPr lang="de-DE" dirty="0" smtClean="0"/>
-              <a:t>zur </a:t>
-            </a:r>
-            <a:r>
-              <a:rPr lang="de-DE" dirty="0" err="1" smtClean="0"/>
-              <a:t>Staging</a:t>
-            </a:r>
-            <a:r>
-              <a:rPr lang="de-DE" dirty="0" smtClean="0"/>
-              <a:t> </a:t>
-            </a:r>
-            <a:r>
-              <a:rPr lang="de-DE" dirty="0"/>
-              <a:t>Area hinzufügen und </a:t>
-            </a:r>
-            <a:r>
-              <a:rPr lang="de-DE" dirty="0" err="1"/>
-              <a:t>commiten</a:t>
-            </a:r>
-            <a:r>
-              <a:rPr lang="de-DE" dirty="0"/>
-              <a:t>:</a:t>
-            </a:r>
-          </a:p>
-          <a:p>
-            <a:pPr lvl="1"/>
-            <a:r>
-              <a:rPr lang="de-DE" altLang="de-DE" dirty="0" err="1">
-                <a:latin typeface="Arial Unicode MS"/>
-              </a:rPr>
-              <a:t>git</a:t>
-            </a:r>
-            <a:r>
-              <a:rPr lang="de-DE" altLang="de-DE" dirty="0">
-                <a:latin typeface="Arial Unicode MS"/>
-              </a:rPr>
-              <a:t> </a:t>
-            </a:r>
-            <a:r>
-              <a:rPr lang="de-DE" altLang="de-DE" dirty="0" err="1">
-                <a:latin typeface="Arial Unicode MS"/>
-              </a:rPr>
-              <a:t>commit</a:t>
-            </a:r>
-            <a:r>
-              <a:rPr lang="de-DE" altLang="de-DE" dirty="0">
-                <a:latin typeface="Arial Unicode MS"/>
-              </a:rPr>
-              <a:t> -a -m „&lt;Commit Nachricht&gt;“</a:t>
-            </a:r>
-            <a:endParaRPr lang="de-DE" altLang="de-DE" sz="4000" dirty="0">
-              <a:latin typeface="Arial Unicode MS"/>
-            </a:endParaRPr>
-          </a:p>
-          <a:p>
-            <a:pPr indent="0">
-              <a:buNone/>
-            </a:pPr>
             <a:endParaRPr lang="de-DE" dirty="0"/>
           </a:p>
         </p:txBody>
@@ -9061,14 +8917,13 @@
           <a:lstStyle/>
           <a:p>
             <a:r>
-              <a:rPr lang="de-DE" dirty="0" err="1" smtClean="0"/>
-              <a:t>Git</a:t>
-            </a:r>
-            <a:r>
-              <a:rPr lang="de-DE" dirty="0" smtClean="0"/>
-              <a:t> Grundkonfiguration</a:t>
-            </a:r>
-            <a:endParaRPr lang="de-DE" dirty="0"/>
+              <a:rPr lang="de-DE" dirty="0" smtClean="0"/>
+              <a:t>Wichtigste </a:t>
+            </a:r>
+            <a:r>
+              <a:rPr lang="de-DE" dirty="0"/>
+              <a:t>Befehle</a:t>
+            </a:r>
           </a:p>
         </p:txBody>
       </p:sp>
@@ -9091,11 +8946,7 @@
           <a:p>
             <a:r>
               <a:rPr lang="de-DE" dirty="0" smtClean="0"/>
-              <a:t>Wichtigste </a:t>
-            </a:r>
-            <a:r>
-              <a:rPr lang="de-DE" dirty="0" smtClean="0"/>
-              <a:t>Konfigurationen nach der Installation</a:t>
+              <a:t>Workflow</a:t>
             </a:r>
             <a:endParaRPr lang="de-DE" dirty="0"/>
           </a:p>
@@ -9128,7 +8979,7 @@
     </p:spTree>
     <p:extLst>
       <p:ext uri="{BB962C8B-B14F-4D97-AF65-F5344CB8AC3E}">
-        <p14:creationId xmlns:p14="http://schemas.microsoft.com/office/powerpoint/2010/main" val="1664792896"/>
+        <p14:creationId xmlns:p14="http://schemas.microsoft.com/office/powerpoint/2010/main" val="1191540642"/>
       </p:ext>
     </p:extLst>
   </p:cSld>
@@ -9570,11 +9421,7 @@
           <a:p>
             <a:r>
               <a:rPr lang="de-DE" dirty="0" smtClean="0"/>
-              <a:t>Beinhaltet </a:t>
-            </a:r>
-            <a:r>
-              <a:rPr lang="de-DE" dirty="0" smtClean="0"/>
-              <a:t>Quick &amp; </a:t>
+              <a:t>Beinhaltet Quick &amp; </a:t>
             </a:r>
             <a:r>
               <a:rPr lang="de-DE" dirty="0" err="1" smtClean="0"/>
@@ -11441,16 +11288,39 @@
         </p:nvSpPr>
         <p:spPr/>
         <p:txBody>
-          <a:bodyPr/>
+          <a:bodyPr>
+            <a:normAutofit fontScale="92500" lnSpcReduction="10000"/>
+          </a:bodyPr>
           <a:lstStyle/>
           <a:p>
             <a:r>
-              <a:rPr lang="de-DE" dirty="0" err="1"/>
-              <a:t>g</a:t>
+              <a:rPr lang="de-DE" dirty="0" smtClean="0"/>
+              <a:t>Benutzung der Git </a:t>
             </a:r>
             <a:r>
               <a:rPr lang="de-DE" dirty="0" err="1" smtClean="0"/>
-              <a:t>it</a:t>
+              <a:t>Bash</a:t>
+            </a:r>
+            <a:r>
+              <a:rPr lang="de-DE" dirty="0" smtClean="0"/>
+              <a:t> „vereinfacht“ viele (Autovervollständigung, </a:t>
+            </a:r>
+            <a:r>
+              <a:rPr lang="de-DE" dirty="0" err="1" smtClean="0"/>
+              <a:t>Vim</a:t>
+            </a:r>
+            <a:r>
+              <a:rPr lang="de-DE" dirty="0" smtClean="0"/>
+              <a:t> Editor steht zur Verfügung, …)</a:t>
+            </a:r>
+          </a:p>
+          <a:p>
+            <a:endParaRPr lang="de-DE" dirty="0"/>
+          </a:p>
+          <a:p>
+            <a:r>
+              <a:rPr lang="de-DE" dirty="0" err="1" smtClean="0"/>
+              <a:t>git</a:t>
             </a:r>
             <a:r>
               <a:rPr lang="de-DE" dirty="0" smtClean="0"/>
@@ -11458,44 +11328,83 @@
             </a:r>
             <a:r>
               <a:rPr lang="de-DE" dirty="0" err="1" smtClean="0"/>
-              <a:t>init</a:t>
-            </a:r>
-            <a:endParaRPr lang="de-DE" dirty="0" smtClean="0"/>
-          </a:p>
-          <a:p>
-            <a:pPr lvl="1"/>
-            <a:r>
-              <a:rPr lang="de-DE" dirty="0" smtClean="0"/>
-              <a:t>Erstellt ein neues </a:t>
-            </a:r>
+              <a:t>config</a:t>
+            </a:r>
+            <a:r>
+              <a:rPr lang="de-DE" dirty="0" smtClean="0"/>
+              <a:t> –global user.name „&lt;Username&gt;“</a:t>
+            </a:r>
+          </a:p>
+          <a:p>
             <a:r>
               <a:rPr lang="de-DE" dirty="0" err="1" smtClean="0"/>
-              <a:t>Git-Repositry</a:t>
-            </a:r>
-            <a:endParaRPr lang="de-DE" dirty="0" smtClean="0"/>
-          </a:p>
-          <a:p>
-            <a:pPr lvl="1" indent="0">
-              <a:buNone/>
-            </a:pPr>
-            <a:endParaRPr lang="de-DE" dirty="0"/>
-          </a:p>
-          <a:p>
-            <a:r>
-              <a:rPr lang="de-DE" altLang="de-DE" dirty="0" err="1"/>
               <a:t>git</a:t>
             </a:r>
             <a:r>
-              <a:rPr lang="de-DE" altLang="de-DE" dirty="0"/>
+              <a:rPr lang="de-DE" dirty="0" smtClean="0"/>
               <a:t> </a:t>
             </a:r>
             <a:r>
-              <a:rPr lang="de-DE" altLang="de-DE" dirty="0" err="1"/>
-              <a:t>clone</a:t>
-            </a:r>
-            <a:r>
-              <a:rPr lang="de-DE" altLang="de-DE" dirty="0"/>
-              <a:t> /</a:t>
+              <a:rPr lang="de-DE" dirty="0" err="1" smtClean="0"/>
+              <a:t>config</a:t>
+            </a:r>
+            <a:r>
+              <a:rPr lang="de-DE" dirty="0" smtClean="0"/>
+              <a:t> –global </a:t>
+            </a:r>
+            <a:r>
+              <a:rPr lang="de-DE" dirty="0" err="1" smtClean="0"/>
+              <a:t>user.email</a:t>
+            </a:r>
+            <a:r>
+              <a:rPr lang="de-DE" dirty="0" smtClean="0"/>
+              <a:t> </a:t>
+            </a:r>
+            <a:r>
+              <a:rPr lang="de-DE" dirty="0"/>
+              <a:t>&lt;</a:t>
+            </a:r>
+            <a:r>
+              <a:rPr lang="de-DE" dirty="0" smtClean="0"/>
+              <a:t>user@email.com&gt;</a:t>
+            </a:r>
+          </a:p>
+          <a:p>
+            <a:r>
+              <a:rPr lang="de-DE" dirty="0" err="1" smtClean="0"/>
+              <a:t>git</a:t>
+            </a:r>
+            <a:r>
+              <a:rPr lang="de-DE" dirty="0" smtClean="0"/>
+              <a:t> </a:t>
+            </a:r>
+            <a:r>
+              <a:rPr lang="de-DE" dirty="0" err="1" smtClean="0"/>
+              <a:t>config</a:t>
+            </a:r>
+            <a:r>
+              <a:rPr lang="de-DE" dirty="0" smtClean="0"/>
+              <a:t> </a:t>
+            </a:r>
+            <a:r>
+              <a:rPr lang="de-DE" dirty="0" err="1" smtClean="0"/>
+              <a:t>push.default</a:t>
+            </a:r>
+            <a:r>
+              <a:rPr lang="de-DE" dirty="0" smtClean="0"/>
+              <a:t> </a:t>
+            </a:r>
+            <a:r>
+              <a:rPr lang="de-DE" dirty="0" err="1" smtClean="0"/>
+              <a:t>matching</a:t>
+            </a:r>
+            <a:r>
+              <a:rPr lang="de-DE" dirty="0" smtClean="0"/>
+              <a:t> &lt;</a:t>
+            </a:r>
+            <a:r>
+              <a:rPr lang="de-DE" altLang="de-DE" dirty="0" smtClean="0"/>
+              <a:t>/</a:t>
             </a:r>
             <a:r>
               <a:rPr lang="de-DE" altLang="de-DE" dirty="0" err="1" smtClean="0"/>
@@ -11510,72 +11419,137 @@
               <a:t>repository</a:t>
             </a:r>
             <a:r>
-              <a:rPr lang="de-DE" altLang="de-DE" dirty="0"/>
+              <a:rPr lang="de-DE" altLang="de-DE" dirty="0" smtClean="0"/>
+              <a:t>&gt;</a:t>
+            </a:r>
+          </a:p>
+          <a:p>
+            <a:pPr lvl="1"/>
+            <a:r>
+              <a:rPr lang="de-DE" altLang="de-DE" dirty="0" smtClean="0"/>
+              <a:t>Für kürzeren push-Befehl (nur noch </a:t>
+            </a:r>
+            <a:r>
+              <a:rPr lang="de-DE" altLang="de-DE" dirty="0" err="1" smtClean="0"/>
+              <a:t>git</a:t>
+            </a:r>
+            <a:r>
+              <a:rPr lang="de-DE" altLang="de-DE" dirty="0" smtClean="0"/>
+              <a:t> push)</a:t>
+            </a:r>
+          </a:p>
+          <a:p>
+            <a:pPr lvl="1" indent="0">
+              <a:buNone/>
+            </a:pPr>
+            <a:endParaRPr lang="de-DE" altLang="de-DE" dirty="0" smtClean="0"/>
+          </a:p>
+          <a:p>
+            <a:r>
+              <a:rPr lang="de-DE" dirty="0"/>
+              <a:t>Kopieren des Projekts incl. Erzeugen des </a:t>
+            </a:r>
+            <a:r>
+              <a:rPr lang="de-DE" dirty="0" err="1"/>
+              <a:t>working</a:t>
+            </a:r>
+            <a:r>
+              <a:rPr lang="de-DE" dirty="0"/>
               <a:t> </a:t>
             </a:r>
             <a:r>
-              <a:rPr lang="de-DE" altLang="de-DE" dirty="0" smtClean="0"/>
-              <a:t>oder</a:t>
-            </a:r>
+              <a:rPr lang="de-DE" dirty="0" err="1"/>
+              <a:t>directory</a:t>
+            </a:r>
+            <a:r>
+              <a:rPr lang="de-DE" dirty="0"/>
+              <a:t>:</a:t>
+            </a:r>
+          </a:p>
+          <a:p>
+            <a:pPr lvl="1"/>
+            <a:r>
+              <a:rPr lang="de-DE" dirty="0" err="1"/>
+              <a:t>git</a:t>
+            </a:r>
+            <a:r>
+              <a:rPr lang="de-DE" dirty="0"/>
+              <a:t> </a:t>
+            </a:r>
+            <a:r>
+              <a:rPr lang="de-DE" dirty="0" err="1"/>
+              <a:t>clone</a:t>
+            </a:r>
+            <a:r>
+              <a:rPr lang="de-DE" dirty="0"/>
+              <a:t> https://github.com/daHaimi/2dgame-thi-2016.git [&lt;Ordnername&gt;]</a:t>
+            </a:r>
+          </a:p>
+          <a:p>
+            <a:endParaRPr lang="de-DE" dirty="0"/>
+          </a:p>
+          <a:p>
+            <a:r>
+              <a:rPr lang="de-DE" dirty="0"/>
+              <a:t>Geänderte Dateien </a:t>
+            </a:r>
+            <a:r>
+              <a:rPr lang="de-DE" dirty="0" smtClean="0"/>
+              <a:t>zur </a:t>
+            </a:r>
+            <a:r>
+              <a:rPr lang="de-DE" dirty="0" err="1" smtClean="0"/>
+              <a:t>Staging</a:t>
+            </a:r>
+            <a:r>
+              <a:rPr lang="de-DE" dirty="0" smtClean="0"/>
+              <a:t> </a:t>
+            </a:r>
+            <a:r>
+              <a:rPr lang="de-DE" dirty="0"/>
+              <a:t>Area hinzufügen und </a:t>
+            </a:r>
+            <a:r>
+              <a:rPr lang="de-DE" dirty="0" err="1"/>
+              <a:t>commiten</a:t>
+            </a:r>
+            <a:r>
+              <a:rPr lang="de-DE" dirty="0"/>
+              <a:t>:</a:t>
+            </a:r>
+          </a:p>
+          <a:p>
+            <a:pPr lvl="1"/>
+            <a:r>
+              <a:rPr lang="de-DE" altLang="de-DE" dirty="0" err="1">
+                <a:latin typeface="Arial Unicode MS"/>
+              </a:rPr>
+              <a:t>git</a:t>
+            </a:r>
+            <a:r>
+              <a:rPr lang="de-DE" altLang="de-DE" dirty="0">
+                <a:latin typeface="Arial Unicode MS"/>
+              </a:rPr>
+              <a:t> </a:t>
+            </a:r>
+            <a:r>
+              <a:rPr lang="de-DE" altLang="de-DE" dirty="0" err="1">
+                <a:latin typeface="Arial Unicode MS"/>
+              </a:rPr>
+              <a:t>commit</a:t>
+            </a:r>
+            <a:r>
+              <a:rPr lang="de-DE" altLang="de-DE" dirty="0">
+                <a:latin typeface="Arial Unicode MS"/>
+              </a:rPr>
+              <a:t> -a -m „&lt;Commit Nachricht&gt;“</a:t>
+            </a:r>
+            <a:endParaRPr lang="de-DE" altLang="de-DE" sz="4000" dirty="0">
+              <a:latin typeface="Arial Unicode MS"/>
+            </a:endParaRPr>
           </a:p>
           <a:p>
             <a:pPr indent="0">
-              <a:buNone/>
-            </a:pPr>
-            <a:r>
-              <a:rPr lang="de-DE" altLang="de-DE" dirty="0"/>
-              <a:t>		</a:t>
-            </a:r>
-            <a:r>
-              <a:rPr lang="de-DE" altLang="de-DE" dirty="0" smtClean="0"/>
-              <a:t>	/</a:t>
-            </a:r>
-            <a:r>
-              <a:rPr lang="de-DE" altLang="de-DE" dirty="0" err="1" smtClean="0"/>
-              <a:t>pfad</a:t>
-            </a:r>
-            <a:r>
-              <a:rPr lang="de-DE" altLang="de-DE" dirty="0" smtClean="0"/>
-              <a:t>/zum/</a:t>
-            </a:r>
-            <a:r>
-              <a:rPr lang="de-DE" altLang="de-DE" dirty="0" err="1" smtClean="0"/>
-              <a:t>repository</a:t>
-            </a:r>
-            <a:r>
-              <a:rPr lang="de-DE" altLang="de-DE" dirty="0" smtClean="0"/>
-              <a:t> &lt;Ordnername&gt;</a:t>
-            </a:r>
-          </a:p>
-          <a:p>
-            <a:pPr lvl="1"/>
-            <a:r>
-              <a:rPr lang="de-DE" dirty="0" smtClean="0"/>
-              <a:t>Erstellt </a:t>
-            </a:r>
-            <a:r>
-              <a:rPr lang="de-DE" dirty="0"/>
-              <a:t>eine </a:t>
-            </a:r>
-            <a:r>
-              <a:rPr lang="de-DE" dirty="0" smtClean="0"/>
-              <a:t>Arbeitskopie des </a:t>
-            </a:r>
-            <a:r>
-              <a:rPr lang="de-DE" dirty="0" err="1" smtClean="0"/>
-              <a:t>Git</a:t>
-            </a:r>
-            <a:r>
-              <a:rPr lang="de-DE" dirty="0" smtClean="0"/>
-              <a:t> Repository, gegebenenfalls in extra angegebenen Ordner</a:t>
-            </a:r>
-            <a:endParaRPr lang="de-DE" altLang="de-DE" dirty="0"/>
-          </a:p>
-          <a:p>
-            <a:endParaRPr lang="de-DE" dirty="0" smtClean="0"/>
-          </a:p>
-          <a:p>
-            <a:pPr lvl="1" indent="0">
               <a:buNone/>
             </a:pPr>
             <a:endParaRPr lang="de-DE" dirty="0"/>
@@ -11600,12 +11574,12 @@
           <a:lstStyle/>
           <a:p>
             <a:r>
-              <a:rPr lang="de-DE" dirty="0" smtClean="0"/>
-              <a:t>Wichtigste </a:t>
-            </a:r>
-            <a:r>
-              <a:rPr lang="de-DE" dirty="0" smtClean="0"/>
-              <a:t>Befehle</a:t>
+              <a:rPr lang="de-DE" dirty="0" err="1" smtClean="0"/>
+              <a:t>Git</a:t>
+            </a:r>
+            <a:r>
+              <a:rPr lang="de-DE" dirty="0" smtClean="0"/>
+              <a:t> Grundkonfiguration</a:t>
             </a:r>
             <a:endParaRPr lang="de-DE" dirty="0"/>
           </a:p>
@@ -11630,7 +11604,7 @@
           <a:p>
             <a:r>
               <a:rPr lang="de-DE" dirty="0" smtClean="0"/>
-              <a:t>Repository initialisieren</a:t>
+              <a:t>Wichtigste Konfigurationen nach der Installation</a:t>
             </a:r>
             <a:endParaRPr lang="de-DE" dirty="0"/>
           </a:p>
@@ -11663,7 +11637,7 @@
     </p:spTree>
     <p:extLst>
       <p:ext uri="{BB962C8B-B14F-4D97-AF65-F5344CB8AC3E}">
-        <p14:creationId xmlns:p14="http://schemas.microsoft.com/office/powerpoint/2010/main" val="3709030433"/>
+        <p14:creationId xmlns:p14="http://schemas.microsoft.com/office/powerpoint/2010/main" val="1664792896"/>
       </p:ext>
     </p:extLst>
   </p:cSld>
@@ -11713,99 +11687,139 @@
           <a:lstStyle/>
           <a:p>
             <a:r>
+              <a:rPr lang="de-DE" dirty="0" err="1"/>
+              <a:t>g</a:t>
+            </a:r>
+            <a:r>
               <a:rPr lang="de-DE" dirty="0" err="1" smtClean="0"/>
+              <a:t>it</a:t>
+            </a:r>
+            <a:r>
+              <a:rPr lang="de-DE" dirty="0" smtClean="0"/>
+              <a:t> </a:t>
+            </a:r>
+            <a:r>
+              <a:rPr lang="de-DE" dirty="0" err="1" smtClean="0"/>
+              <a:t>init</a:t>
+            </a:r>
+            <a:endParaRPr lang="de-DE" dirty="0" smtClean="0"/>
+          </a:p>
+          <a:p>
+            <a:pPr lvl="1"/>
+            <a:r>
+              <a:rPr lang="de-DE" dirty="0" smtClean="0"/>
+              <a:t>Erstellt ein neues </a:t>
+            </a:r>
+            <a:r>
+              <a:rPr lang="de-DE" dirty="0" err="1" smtClean="0"/>
+              <a:t>Git-Repositry</a:t>
+            </a:r>
+            <a:endParaRPr lang="de-DE" dirty="0" smtClean="0"/>
+          </a:p>
+          <a:p>
+            <a:pPr lvl="1" indent="0">
+              <a:buNone/>
+            </a:pPr>
+            <a:endParaRPr lang="de-DE" dirty="0"/>
+          </a:p>
+          <a:p>
+            <a:r>
+              <a:rPr lang="de-DE" altLang="de-DE" dirty="0" err="1"/>
               <a:t>git</a:t>
             </a:r>
             <a:r>
-              <a:rPr lang="de-DE" dirty="0" smtClean="0"/>
+              <a:rPr lang="de-DE" altLang="de-DE" dirty="0"/>
               <a:t> </a:t>
             </a:r>
             <a:r>
+              <a:rPr lang="de-DE" altLang="de-DE" dirty="0" err="1"/>
+              <a:t>clone</a:t>
+            </a:r>
+            <a:r>
+              <a:rPr lang="de-DE" altLang="de-DE" dirty="0"/>
+              <a:t> /</a:t>
+            </a:r>
+            <a:r>
+              <a:rPr lang="de-DE" altLang="de-DE" dirty="0" err="1" smtClean="0"/>
+              <a:t>pfad</a:t>
+            </a:r>
+            <a:r>
+              <a:rPr lang="de-DE" altLang="de-DE" dirty="0" smtClean="0"/>
+              <a:t>/zum/</a:t>
+            </a:r>
+            <a:r>
+              <a:rPr lang="de-DE" altLang="de-DE" dirty="0" err="1" smtClean="0"/>
+              <a:t>repository</a:t>
+            </a:r>
+            <a:r>
+              <a:rPr lang="de-DE" altLang="de-DE" dirty="0"/>
+              <a:t> </a:t>
+            </a:r>
+            <a:r>
+              <a:rPr lang="de-DE" altLang="de-DE" dirty="0" smtClean="0"/>
+              <a:t>oder</a:t>
+            </a:r>
+          </a:p>
+          <a:p>
+            <a:pPr indent="0">
+              <a:buNone/>
+            </a:pPr>
+            <a:r>
+              <a:rPr lang="de-DE" altLang="de-DE" dirty="0"/>
+              <a:t>		</a:t>
+            </a:r>
+            <a:r>
+              <a:rPr lang="de-DE" altLang="de-DE" dirty="0" smtClean="0"/>
+              <a:t>	/</a:t>
+            </a:r>
+            <a:r>
+              <a:rPr lang="de-DE" altLang="de-DE" dirty="0" err="1" smtClean="0"/>
+              <a:t>pfad</a:t>
+            </a:r>
+            <a:r>
+              <a:rPr lang="de-DE" altLang="de-DE" dirty="0" smtClean="0"/>
+              <a:t>/zum/</a:t>
+            </a:r>
+            <a:r>
+              <a:rPr lang="de-DE" altLang="de-DE" dirty="0" err="1" smtClean="0"/>
+              <a:t>repository</a:t>
+            </a:r>
+            <a:r>
+              <a:rPr lang="de-DE" altLang="de-DE" dirty="0" smtClean="0"/>
+              <a:t> &lt;Ordnername&gt;</a:t>
+            </a:r>
+          </a:p>
+          <a:p>
+            <a:pPr lvl="1"/>
+            <a:r>
+              <a:rPr lang="de-DE" dirty="0" smtClean="0"/>
+              <a:t>Erstellt </a:t>
+            </a:r>
+            <a:r>
+              <a:rPr lang="de-DE" dirty="0"/>
+              <a:t>eine </a:t>
+            </a:r>
+            <a:r>
+              <a:rPr lang="de-DE" dirty="0" smtClean="0"/>
+              <a:t>Arbeitskopie des </a:t>
+            </a:r>
+            <a:r>
               <a:rPr lang="de-DE" dirty="0" err="1" smtClean="0"/>
-              <a:t>add</a:t>
-            </a:r>
-            <a:r>
-              <a:rPr lang="de-DE" dirty="0" smtClean="0"/>
-              <a:t> &lt;</a:t>
-            </a:r>
-            <a:r>
-              <a:rPr lang="de-DE" dirty="0" err="1" smtClean="0"/>
-              <a:t>dateiname</a:t>
-            </a:r>
-            <a:r>
-              <a:rPr lang="de-DE" dirty="0" smtClean="0"/>
-              <a:t>&gt; oder </a:t>
-            </a:r>
-            <a:r>
-              <a:rPr lang="de-DE" dirty="0" err="1" smtClean="0"/>
-              <a:t>git</a:t>
-            </a:r>
-            <a:r>
-              <a:rPr lang="de-DE" dirty="0" smtClean="0"/>
-              <a:t> </a:t>
-            </a:r>
-            <a:r>
-              <a:rPr lang="de-DE" dirty="0" err="1" smtClean="0"/>
-              <a:t>add</a:t>
-            </a:r>
-            <a:r>
-              <a:rPr lang="de-DE" dirty="0" smtClean="0"/>
-              <a:t> *</a:t>
-            </a:r>
-          </a:p>
-          <a:p>
-            <a:pPr lvl="1"/>
-            <a:r>
-              <a:rPr lang="de-DE" dirty="0" smtClean="0"/>
-              <a:t>Fügt eine, mehrere oder alle noch nicht aufgeführten Dateien zum Repository hinzu oder merkt bereits vorhandene und modifizierte Dateien für den nächsten Commit vor</a:t>
-            </a:r>
-          </a:p>
-          <a:p>
-            <a:pPr lvl="1"/>
-            <a:endParaRPr lang="de-DE" dirty="0"/>
-          </a:p>
-          <a:p>
-            <a:r>
-              <a:rPr lang="de-DE" dirty="0" err="1" smtClean="0"/>
-              <a:t>git</a:t>
-            </a:r>
-            <a:r>
-              <a:rPr lang="de-DE" dirty="0" smtClean="0"/>
-              <a:t> </a:t>
-            </a:r>
-            <a:r>
-              <a:rPr lang="de-DE" dirty="0" err="1" smtClean="0"/>
-              <a:t>rm</a:t>
-            </a:r>
-            <a:r>
-              <a:rPr lang="de-DE" dirty="0" smtClean="0"/>
-              <a:t> &lt;</a:t>
-            </a:r>
-            <a:r>
-              <a:rPr lang="de-DE" dirty="0" err="1" smtClean="0"/>
-              <a:t>dateiname</a:t>
-            </a:r>
-            <a:r>
-              <a:rPr lang="de-DE" dirty="0" smtClean="0"/>
-              <a:t>&gt; </a:t>
-            </a:r>
-          </a:p>
-          <a:p>
-            <a:pPr lvl="1"/>
-            <a:r>
-              <a:rPr lang="de-DE" dirty="0" smtClean="0"/>
-              <a:t>Löscht die Angegebene Datei aus dem Repository (bei ganzen Verzeichnissen wird der Parameter –r benötigt)</a:t>
-            </a:r>
-          </a:p>
-          <a:p>
-            <a:pPr lvl="1"/>
-            <a:endParaRPr lang="de-DE" dirty="0"/>
-          </a:p>
-          <a:p>
-            <a:pPr lvl="1"/>
-            <a:endParaRPr lang="de-DE" dirty="0"/>
-          </a:p>
-          <a:p>
+              <a:t>Git</a:t>
+            </a:r>
+            <a:r>
+              <a:rPr lang="de-DE" dirty="0" smtClean="0"/>
+              <a:t> Repository, gegebenenfalls in extra angegebenen Ordner</a:t>
+            </a:r>
+            <a:endParaRPr lang="de-DE" altLang="de-DE" dirty="0"/>
+          </a:p>
+          <a:p>
+            <a:endParaRPr lang="de-DE" dirty="0" smtClean="0"/>
+          </a:p>
+          <a:p>
+            <a:pPr lvl="1" indent="0">
+              <a:buNone/>
+            </a:pPr>
             <a:endParaRPr lang="de-DE" dirty="0"/>
           </a:p>
         </p:txBody>
@@ -11829,12 +11843,9 @@
           <a:p>
             <a:r>
               <a:rPr lang="de-DE" dirty="0" smtClean="0"/>
-              <a:t>Wichtigste </a:t>
-            </a:r>
-            <a:r>
-              <a:rPr lang="de-DE" dirty="0"/>
-              <a:t>Befehle</a:t>
-            </a:r>
+              <a:t>Wichtigste Befehle</a:t>
+            </a:r>
+            <a:endParaRPr lang="de-DE" dirty="0"/>
           </a:p>
         </p:txBody>
       </p:sp>
@@ -11857,7 +11868,7 @@
           <a:p>
             <a:r>
               <a:rPr lang="de-DE" dirty="0" smtClean="0"/>
-              <a:t>Workflow</a:t>
+              <a:t>Repository initialisieren</a:t>
             </a:r>
             <a:endParaRPr lang="de-DE" dirty="0"/>
           </a:p>
@@ -11890,7 +11901,7 @@
     </p:spTree>
     <p:extLst>
       <p:ext uri="{BB962C8B-B14F-4D97-AF65-F5344CB8AC3E}">
-        <p14:creationId xmlns:p14="http://schemas.microsoft.com/office/powerpoint/2010/main" val="3096008763"/>
+        <p14:creationId xmlns:p14="http://schemas.microsoft.com/office/powerpoint/2010/main" val="3709030433"/>
       </p:ext>
     </p:extLst>
   </p:cSld>
@@ -11940,40 +11951,51 @@
           <a:lstStyle/>
           <a:p>
             <a:r>
-              <a:rPr lang="de-DE" dirty="0" err="1"/>
+              <a:rPr lang="de-DE" dirty="0" err="1" smtClean="0"/>
               <a:t>git</a:t>
             </a:r>
             <a:r>
-              <a:rPr lang="de-DE" dirty="0"/>
+              <a:rPr lang="de-DE" dirty="0" smtClean="0"/>
               <a:t> </a:t>
             </a:r>
             <a:r>
-              <a:rPr lang="de-DE" dirty="0" err="1"/>
-              <a:t>commit</a:t>
-            </a:r>
-            <a:r>
-              <a:rPr lang="de-DE" dirty="0"/>
-              <a:t> –m </a:t>
-            </a:r>
-            <a:r>
-              <a:rPr lang="de-DE" dirty="0" smtClean="0"/>
-              <a:t>“&lt;Commit Nachricht&gt;“</a:t>
-            </a:r>
-            <a:endParaRPr lang="de-DE" dirty="0"/>
+              <a:rPr lang="de-DE" dirty="0" err="1" smtClean="0"/>
+              <a:t>add</a:t>
+            </a:r>
+            <a:r>
+              <a:rPr lang="de-DE" dirty="0" smtClean="0"/>
+              <a:t> &lt;</a:t>
+            </a:r>
+            <a:r>
+              <a:rPr lang="de-DE" dirty="0" err="1" smtClean="0"/>
+              <a:t>dateiname</a:t>
+            </a:r>
+            <a:r>
+              <a:rPr lang="de-DE" dirty="0" smtClean="0"/>
+              <a:t>&gt; oder </a:t>
+            </a:r>
+            <a:r>
+              <a:rPr lang="de-DE" dirty="0" err="1" smtClean="0"/>
+              <a:t>git</a:t>
+            </a:r>
+            <a:r>
+              <a:rPr lang="de-DE" dirty="0" smtClean="0"/>
+              <a:t> </a:t>
+            </a:r>
+            <a:r>
+              <a:rPr lang="de-DE" dirty="0" err="1" smtClean="0"/>
+              <a:t>add</a:t>
+            </a:r>
+            <a:r>
+              <a:rPr lang="de-DE" dirty="0" smtClean="0"/>
+              <a:t> *</a:t>
+            </a:r>
           </a:p>
           <a:p>
             <a:pPr lvl="1"/>
             <a:r>
               <a:rPr lang="de-DE" dirty="0" smtClean="0"/>
-              <a:t>Bestätigen der </a:t>
-            </a:r>
-            <a:r>
-              <a:rPr lang="de-DE" dirty="0"/>
-              <a:t>Änderungen (modifizierte, hinzugefügte und gelöschte Dateien) gegenüber des lokalen Git </a:t>
-            </a:r>
-            <a:r>
-              <a:rPr lang="de-DE" dirty="0" smtClean="0"/>
-              <a:t>Repository</a:t>
+              <a:t>Fügt eine, mehrere oder alle noch nicht aufgeführten Dateien zum Repository hinzu oder merkt bereits vorhandene und modifizierte Dateien für den nächsten Commit vor</a:t>
             </a:r>
           </a:p>
           <a:p>
@@ -11991,76 +12013,34 @@
             </a:r>
             <a:r>
               <a:rPr lang="de-DE" dirty="0" err="1" smtClean="0"/>
-              <a:t>status</a:t>
-            </a:r>
-            <a:r>
-              <a:rPr lang="de-DE" dirty="0" smtClean="0"/>
-              <a:t> </a:t>
-            </a:r>
+              <a:t>rm</a:t>
+            </a:r>
+            <a:r>
+              <a:rPr lang="de-DE" dirty="0" smtClean="0"/>
+              <a:t> &lt;</a:t>
+            </a:r>
+            <a:r>
+              <a:rPr lang="de-DE" dirty="0" err="1" smtClean="0"/>
+              <a:t>dateiname</a:t>
+            </a:r>
+            <a:r>
+              <a:rPr lang="de-DE" dirty="0" smtClean="0"/>
+              <a:t>&gt; </a:t>
+            </a:r>
+          </a:p>
+          <a:p>
+            <a:pPr lvl="1"/>
+            <a:r>
+              <a:rPr lang="de-DE" dirty="0" smtClean="0"/>
+              <a:t>Löscht die Angegebene Datei aus dem Repository (bei ganzen Verzeichnissen wird der Parameter –r benötigt)</a:t>
+            </a:r>
+          </a:p>
+          <a:p>
+            <a:pPr lvl="1"/>
             <a:endParaRPr lang="de-DE" dirty="0"/>
           </a:p>
           <a:p>
             <a:pPr lvl="1"/>
-            <a:r>
-              <a:rPr lang="de-DE" dirty="0" smtClean="0"/>
-              <a:t>Zeigt die getätigten Änderungen (nicht </a:t>
-            </a:r>
-            <a:r>
-              <a:rPr lang="de-DE" dirty="0" err="1" smtClean="0"/>
-              <a:t>commited</a:t>
-            </a:r>
-            <a:r>
-              <a:rPr lang="de-DE" dirty="0" smtClean="0"/>
-              <a:t>) an</a:t>
-            </a:r>
-          </a:p>
-          <a:p>
-            <a:pPr lvl="1" indent="0">
-              <a:buNone/>
-            </a:pPr>
-            <a:r>
-              <a:rPr lang="de-DE" dirty="0" smtClean="0"/>
-              <a:t> </a:t>
-            </a:r>
-            <a:endParaRPr lang="de-DE" dirty="0"/>
-          </a:p>
-          <a:p>
-            <a:r>
-              <a:rPr lang="de-DE" altLang="de-DE" dirty="0" err="1"/>
-              <a:t>git</a:t>
-            </a:r>
-            <a:r>
-              <a:rPr lang="de-DE" altLang="de-DE" dirty="0"/>
-              <a:t> </a:t>
-            </a:r>
-            <a:r>
-              <a:rPr lang="de-DE" altLang="de-DE" dirty="0" smtClean="0"/>
-              <a:t>push</a:t>
-            </a:r>
-            <a:endParaRPr lang="de-DE" altLang="de-DE" dirty="0"/>
-          </a:p>
-          <a:p>
-            <a:pPr lvl="1"/>
-            <a:r>
-              <a:rPr lang="de-DE" dirty="0"/>
-              <a:t>Übertragen der </a:t>
-            </a:r>
-            <a:r>
-              <a:rPr lang="de-DE" dirty="0" err="1"/>
-              <a:t>Commits</a:t>
-            </a:r>
-            <a:r>
-              <a:rPr lang="de-DE" dirty="0"/>
-              <a:t> an das Master Repository </a:t>
-            </a:r>
-            <a:r>
-              <a:rPr lang="de-DE" dirty="0" smtClean="0"/>
-              <a:t>im aktuellen </a:t>
-            </a:r>
-            <a:r>
-              <a:rPr lang="de-DE" dirty="0" err="1" smtClean="0"/>
-              <a:t>Branch</a:t>
-            </a:r>
             <a:endParaRPr lang="de-DE" dirty="0"/>
           </a:p>
           <a:p>
@@ -12148,7 +12128,7 @@
     </p:spTree>
     <p:extLst>
       <p:ext uri="{BB962C8B-B14F-4D97-AF65-F5344CB8AC3E}">
-        <p14:creationId xmlns:p14="http://schemas.microsoft.com/office/powerpoint/2010/main" val="4220624184"/>
+        <p14:creationId xmlns:p14="http://schemas.microsoft.com/office/powerpoint/2010/main" val="3096008763"/>
       </p:ext>
     </p:extLst>
   </p:cSld>

</xml_diff>

<commit_message>
Tabs eingefühgt; git --set-upstream origin <> eingefügt;
</commit_message>
<xml_diff>
--- a/git_vortrag.pptx
+++ b/git_vortrag.pptx
@@ -241,7 +241,7 @@
           <a:p>
             <a:fld id="{0AE13250-C537-B448-BED9-AF61DCF088B2}" type="datetimeFigureOut">
               <a:rPr lang="de-DE" smtClean="0"/>
-              <a:t>21.03.2016</a:t>
+              <a:t>22.03.2016</a:t>
             </a:fld>
             <a:endParaRPr lang="de-DE"/>
           </a:p>
@@ -407,7 +407,7 @@
           <a:p>
             <a:fld id="{7BF8C751-7494-BF40-8574-213D7890D13D}" type="datetimeFigureOut">
               <a:rPr lang="de-DE" smtClean="0"/>
-              <a:t>21.03.2016</a:t>
+              <a:t>22.03.2016</a:t>
             </a:fld>
             <a:endParaRPr lang="de-DE"/>
           </a:p>
@@ -674,6 +674,263 @@
     </a:lvl9pPr>
   </p:notesStyle>
 </p:notesMaster>
+</file>
+
+<file path=ppt/notesSlides/notesSlide1.xml><?xml version="1.0" encoding="utf-8"?>
+<p:notes xmlns:a="http://schemas.openxmlformats.org/drawingml/2006/main" xmlns:r="http://schemas.openxmlformats.org/officeDocument/2006/relationships" xmlns:p="http://schemas.openxmlformats.org/presentationml/2006/main">
+  <p:cSld>
+    <p:spTree>
+      <p:nvGrpSpPr>
+        <p:cNvPr id="1" name=""/>
+        <p:cNvGrpSpPr/>
+        <p:nvPr/>
+      </p:nvGrpSpPr>
+      <p:grpSpPr>
+        <a:xfrm>
+          <a:off x="0" y="0"/>
+          <a:ext cx="0" cy="0"/>
+          <a:chOff x="0" y="0"/>
+          <a:chExt cx="0" cy="0"/>
+        </a:xfrm>
+      </p:grpSpPr>
+      <p:sp>
+        <p:nvSpPr>
+          <p:cNvPr id="2" name="Folienbildplatzhalter 1"/>
+          <p:cNvSpPr>
+            <a:spLocks noGrp="1" noRot="1" noChangeAspect="1"/>
+          </p:cNvSpPr>
+          <p:nvPr>
+            <p:ph type="sldImg"/>
+          </p:nvPr>
+        </p:nvSpPr>
+        <p:spPr/>
+      </p:sp>
+      <p:sp>
+        <p:nvSpPr>
+          <p:cNvPr id="3" name="Notizenplatzhalter 2"/>
+          <p:cNvSpPr>
+            <a:spLocks noGrp="1"/>
+          </p:cNvSpPr>
+          <p:nvPr>
+            <p:ph type="body" idx="1"/>
+          </p:nvPr>
+        </p:nvSpPr>
+        <p:spPr/>
+        <p:txBody>
+          <a:bodyPr/>
+          <a:lstStyle/>
+          <a:p>
+            <a:r>
+              <a:rPr lang="en-US" dirty="0" err="1" smtClean="0"/>
+              <a:t>push.default</a:t>
+            </a:r>
+            <a:r>
+              <a:rPr lang="en-US" dirty="0" smtClean="0"/>
+              <a:t> Defines the action </a:t>
+            </a:r>
+            <a:r>
+              <a:rPr lang="en-US" dirty="0" err="1" smtClean="0"/>
+              <a:t>git</a:t>
+            </a:r>
+            <a:r>
+              <a:rPr lang="en-US" dirty="0" smtClean="0"/>
+              <a:t> push should take if no </a:t>
+            </a:r>
+            <a:r>
+              <a:rPr lang="en-US" dirty="0" err="1" smtClean="0"/>
+              <a:t>refspec</a:t>
+            </a:r>
+            <a:r>
+              <a:rPr lang="en-US" dirty="0" smtClean="0"/>
+              <a:t> is explicitly given. Different values are well-suited for specific workflows; for instance, in a purely central workflow (i.e. the fetch source is equal to the push destination), upstream is probably what you want. Possible values are:</a:t>
+            </a:r>
+          </a:p>
+          <a:p>
+            <a:endParaRPr lang="en-US" dirty="0" smtClean="0"/>
+          </a:p>
+          <a:p>
+            <a:r>
+              <a:rPr lang="en-US" dirty="0" smtClean="0"/>
+              <a:t>nothing - do not push anything (error out) unless a </a:t>
+            </a:r>
+            <a:r>
+              <a:rPr lang="en-US" dirty="0" err="1" smtClean="0"/>
+              <a:t>refspec</a:t>
+            </a:r>
+            <a:r>
+              <a:rPr lang="en-US" dirty="0" smtClean="0"/>
+              <a:t> is explicitly given. This is primarily meant for people who want to avoid mistakes by always being explicit.</a:t>
+            </a:r>
+          </a:p>
+          <a:p>
+            <a:endParaRPr lang="en-US" dirty="0" smtClean="0"/>
+          </a:p>
+          <a:p>
+            <a:r>
+              <a:rPr lang="en-US" dirty="0" smtClean="0"/>
+              <a:t>current - push the current branch to update a branch with the same name on the receiving end. Works in both central and non-central workflows.</a:t>
+            </a:r>
+          </a:p>
+          <a:p>
+            <a:endParaRPr lang="en-US" dirty="0" smtClean="0"/>
+          </a:p>
+          <a:p>
+            <a:r>
+              <a:rPr lang="en-US" dirty="0" smtClean="0"/>
+              <a:t>upstream - push the current branch back to the branch whose changes are usually integrated into the current branch (which is called @{upstream}). This mode only makes sense if you are pushing to the same repository you would normally pull from (i.e. central workflow).</a:t>
+            </a:r>
+          </a:p>
+          <a:p>
+            <a:endParaRPr lang="en-US" dirty="0" smtClean="0"/>
+          </a:p>
+          <a:p>
+            <a:r>
+              <a:rPr lang="en-US" dirty="0" smtClean="0"/>
+              <a:t>simple - in centralized workflow, work like upstream with an added safety to refuse to push if the upstream branch’s name is different from the local one.</a:t>
+            </a:r>
+          </a:p>
+          <a:p>
+            <a:r>
+              <a:rPr lang="en-US" dirty="0" smtClean="0"/>
+              <a:t>When pushing to a remote that is different from the remote you normally pull from, work as current. This is the safest option and is suited for beginners.</a:t>
+            </a:r>
+          </a:p>
+          <a:p>
+            <a:r>
+              <a:rPr lang="en-US" dirty="0" smtClean="0"/>
+              <a:t>This mode has become the default in Git 2.0.</a:t>
+            </a:r>
+          </a:p>
+          <a:p>
+            <a:endParaRPr lang="en-US" dirty="0" smtClean="0"/>
+          </a:p>
+          <a:p>
+            <a:r>
+              <a:rPr lang="en-US" dirty="0" smtClean="0"/>
+              <a:t>matching - push all branches having the same name on both ends. This makes the repository you are pushing to remember the set of branches that will be pushed out (e.g. if you always push </a:t>
+            </a:r>
+            <a:r>
+              <a:rPr lang="en-US" i="1" dirty="0" err="1" smtClean="0"/>
+              <a:t>maint</a:t>
+            </a:r>
+            <a:r>
+              <a:rPr lang="en-US" dirty="0" smtClean="0"/>
+              <a:t> and </a:t>
+            </a:r>
+            <a:r>
+              <a:rPr lang="en-US" i="1" dirty="0" smtClean="0"/>
+              <a:t>master</a:t>
+            </a:r>
+            <a:r>
+              <a:rPr lang="en-US" dirty="0" smtClean="0"/>
+              <a:t> there and no other branches, the repository you push to will have these two branches, and your local </a:t>
+            </a:r>
+            <a:r>
+              <a:rPr lang="en-US" i="1" dirty="0" err="1" smtClean="0"/>
+              <a:t>maint</a:t>
+            </a:r>
+            <a:r>
+              <a:rPr lang="en-US" dirty="0" smtClean="0"/>
+              <a:t> and </a:t>
+            </a:r>
+            <a:r>
+              <a:rPr lang="en-US" i="1" dirty="0" smtClean="0"/>
+              <a:t>master</a:t>
+            </a:r>
+            <a:r>
+              <a:rPr lang="en-US" dirty="0" smtClean="0"/>
+              <a:t> will be pushed there).</a:t>
+            </a:r>
+          </a:p>
+          <a:p>
+            <a:endParaRPr lang="en-US" dirty="0" smtClean="0"/>
+          </a:p>
+          <a:p>
+            <a:r>
+              <a:rPr lang="en-US" dirty="0" smtClean="0"/>
+              <a:t>To use this mode effectively, you have to make sure </a:t>
+            </a:r>
+            <a:r>
+              <a:rPr lang="en-US" i="1" dirty="0" smtClean="0"/>
+              <a:t>all</a:t>
+            </a:r>
+            <a:r>
+              <a:rPr lang="en-US" dirty="0" smtClean="0"/>
+              <a:t> the branches you would push out are ready to be pushed out before running </a:t>
+            </a:r>
+            <a:r>
+              <a:rPr lang="en-US" i="1" dirty="0" err="1" smtClean="0"/>
+              <a:t>git</a:t>
+            </a:r>
+            <a:r>
+              <a:rPr lang="en-US" i="1" dirty="0" smtClean="0"/>
+              <a:t> push</a:t>
+            </a:r>
+            <a:r>
+              <a:rPr lang="en-US" dirty="0" smtClean="0"/>
+              <a:t>, as the whole point of this mode is to allow you to push all of the branches in one go. If you usually finish work on only one branch and push out the result, while other branches are unfinished, this mode is not for you. Also this mode is not suitable for pushing into a shared central repository, as other people may add new branches there, or update the tip of existing branches outside your control.</a:t>
+            </a:r>
+          </a:p>
+          <a:p>
+            <a:endParaRPr lang="en-US" dirty="0" smtClean="0"/>
+          </a:p>
+          <a:p>
+            <a:r>
+              <a:rPr lang="en-US" dirty="0" smtClean="0"/>
+              <a:t>This used to be the default, but not since Git 2.0 (simple is the new default).</a:t>
+            </a:r>
+          </a:p>
+          <a:p>
+            <a:endParaRPr lang="de-DE" dirty="0" smtClean="0"/>
+          </a:p>
+          <a:p>
+            <a:r>
+              <a:rPr lang="de-DE" dirty="0" smtClean="0"/>
+              <a:t>https://git-scm.com/docs/git-config</a:t>
+            </a:r>
+          </a:p>
+          <a:p>
+            <a:endParaRPr lang="de-DE" dirty="0" smtClean="0"/>
+          </a:p>
+          <a:p>
+            <a:endParaRPr lang="de-DE" dirty="0"/>
+          </a:p>
+        </p:txBody>
+      </p:sp>
+      <p:sp>
+        <p:nvSpPr>
+          <p:cNvPr id="4" name="Foliennummernplatzhalter 3"/>
+          <p:cNvSpPr>
+            <a:spLocks noGrp="1"/>
+          </p:cNvSpPr>
+          <p:nvPr>
+            <p:ph type="sldNum" sz="quarter" idx="10"/>
+          </p:nvPr>
+        </p:nvSpPr>
+        <p:spPr/>
+        <p:txBody>
+          <a:bodyPr/>
+          <a:lstStyle/>
+          <a:p>
+            <a:fld id="{A6A48DAB-2417-E040-ADE8-0DE3F02E62F1}" type="slidenum">
+              <a:rPr lang="de-DE" smtClean="0"/>
+              <a:t>7</a:t>
+            </a:fld>
+            <a:endParaRPr lang="de-DE"/>
+          </a:p>
+        </p:txBody>
+      </p:sp>
+    </p:spTree>
+    <p:extLst>
+      <p:ext uri="{BB962C8B-B14F-4D97-AF65-F5344CB8AC3E}">
+        <p14:creationId xmlns:p14="http://schemas.microsoft.com/office/powerpoint/2010/main" val="3862258116"/>
+      </p:ext>
+    </p:extLst>
+  </p:cSld>
+  <p:clrMapOvr>
+    <a:masterClrMapping/>
+  </p:clrMapOvr>
+</p:notes>
 </file>
 
 <file path=ppt/slideLayouts/slideLayout1.xml><?xml version="1.0" encoding="utf-8"?>
@@ -13004,13 +13261,22 @@
           <a:bodyPr/>
           <a:lstStyle/>
           <a:p>
+            <a:pPr>
+              <a:tabLst>
+                <a:tab pos="357188" algn="l"/>
+              </a:tabLst>
+            </a:pPr>
             <a:r>
               <a:rPr lang="de-DE" dirty="0" smtClean="0"/>
               <a:t>Speichern von </a:t>
             </a:r>
             <a:r>
               <a:rPr lang="de-DE" dirty="0"/>
-              <a:t>Information als eine fortlaufende Liste von Änderungen an </a:t>
+              <a:t>Information als eine fortlaufende Liste von Änderungen </a:t>
+            </a:r>
+            <a:r>
+              <a:rPr lang="de-DE" dirty="0" smtClean="0"/>
+              <a:t>	an </a:t>
             </a:r>
             <a:r>
               <a:rPr lang="de-DE" dirty="0" smtClean="0"/>
@@ -13026,6 +13292,11 @@
             </a:r>
           </a:p>
           <a:p>
+            <a:pPr>
+              <a:tabLst>
+                <a:tab pos="357188" algn="l"/>
+              </a:tabLst>
+            </a:pPr>
             <a:r>
               <a:rPr lang="de-DE" dirty="0" smtClean="0"/>
               <a:t>Betrachtet </a:t>
@@ -13040,7 +13311,23 @@
             </a:r>
             <a:r>
               <a:rPr lang="de-DE" dirty="0"/>
-              <a:t>eine Menge von Dateien und die Änderungen, die über die Zeit hinweg an einzelnen Dateien vorgenommen werden</a:t>
+              <a:t>eine Menge von Dateien und die </a:t>
+            </a:r>
+            <a:r>
+              <a:rPr lang="de-DE" dirty="0" smtClean="0"/>
+              <a:t>	Änderungen</a:t>
+            </a:r>
+            <a:r>
+              <a:rPr lang="de-DE" dirty="0"/>
+              <a:t>, die über die Zeit hinweg an einzelnen Dateien </a:t>
+            </a:r>
+            <a:r>
+              <a:rPr lang="de-DE" dirty="0" smtClean="0"/>
+              <a:t>	vorgenommen </a:t>
+            </a:r>
+            <a:r>
+              <a:rPr lang="de-DE" dirty="0"/>
+              <a:t>werden</a:t>
             </a:r>
           </a:p>
         </p:txBody>
@@ -13579,13 +13866,14 @@
           <a:bodyPr/>
           <a:lstStyle/>
           <a:p>
-            <a:r>
-              <a:rPr lang="de-DE" dirty="0" err="1"/>
-              <a:t>Git</a:t>
-            </a:r>
+            <a:pPr>
+              <a:tabLst>
+                <a:tab pos="357188" algn="l"/>
+              </a:tabLst>
+            </a:pPr>
             <a:r>
               <a:rPr lang="de-DE" dirty="0"/>
-              <a:t> </a:t>
+              <a:t>Git </a:t>
             </a:r>
             <a:r>
               <a:rPr lang="de-DE" dirty="0" smtClean="0"/>
@@ -13593,7 +13881,15 @@
             </a:r>
             <a:r>
               <a:rPr lang="de-DE" dirty="0"/>
-              <a:t>Zustand sämtlicher Dateien in diesem Moment („Snapshot“) und speichert eine Referenz auf diesen Snapshot</a:t>
+              <a:t>Zustand sämtlicher Dateien in diesem Moment </a:t>
+            </a:r>
+            <a:r>
+              <a:rPr lang="de-DE" dirty="0" smtClean="0"/>
+              <a:t>	(„</a:t>
+            </a:r>
+            <a:r>
+              <a:rPr lang="de-DE" dirty="0"/>
+              <a:t>Snapshot“) und speichert eine Referenz auf diesen Snapshot</a:t>
             </a:r>
           </a:p>
           <a:p>
@@ -14781,10 +15077,15 @@
         <p:spPr/>
         <p:txBody>
           <a:bodyPr>
-            <a:normAutofit fontScale="92500" lnSpcReduction="10000"/>
+            <a:normAutofit fontScale="92500" lnSpcReduction="20000"/>
           </a:bodyPr>
           <a:lstStyle/>
           <a:p>
+            <a:pPr>
+              <a:tabLst>
+                <a:tab pos="357188" algn="l"/>
+              </a:tabLst>
+            </a:pPr>
             <a:r>
               <a:rPr lang="de-DE" dirty="0" smtClean="0"/>
               <a:t>Benutzung der Git </a:t>
@@ -14803,7 +15104,15 @@
             </a:r>
             <a:r>
               <a:rPr lang="de-DE" dirty="0" smtClean="0"/>
-              <a:t> Editor steht zur Verfügung, …)</a:t>
+              <a:t> </a:t>
+            </a:r>
+            <a:r>
+              <a:rPr lang="de-DE" dirty="0" smtClean="0"/>
+              <a:t>	Editor </a:t>
+            </a:r>
+            <a:r>
+              <a:rPr lang="de-DE" dirty="0" smtClean="0"/>
+              <a:t>steht zur Verfügung, …)</a:t>
             </a:r>
           </a:p>
           <a:p>
@@ -14883,16 +15192,8 @@
               <a:t>push.default</a:t>
             </a:r>
             <a:r>
-              <a:rPr lang="de-DE" smtClean="0"/>
-              <a:t> </a:t>
-            </a:r>
-            <a:r>
-              <a:rPr lang="de-DE" smtClean="0"/>
-              <a:t>simple </a:t>
-            </a:r>
-            <a:r>
-              <a:rPr lang="de-DE" dirty="0" smtClean="0"/>
-              <a:t>&lt;</a:t>
+              <a:rPr lang="de-DE" dirty="0" smtClean="0"/>
+              <a:t> simple &lt;</a:t>
             </a:r>
             <a:r>
               <a:rPr lang="de-DE" altLang="de-DE" dirty="0" smtClean="0"/>
@@ -14919,7 +15220,11 @@
             <a:pPr lvl="1"/>
             <a:r>
               <a:rPr lang="de-DE" altLang="de-DE" dirty="0" smtClean="0"/>
-              <a:t>Für kürzeren push-Befehl (nur noch </a:t>
+              <a:t>Für </a:t>
+            </a:r>
+            <a:r>
+              <a:rPr lang="de-DE" altLang="de-DE" dirty="0" smtClean="0"/>
+              <a:t>kürzeren push-Befehl (nur noch </a:t>
             </a:r>
             <a:r>
               <a:rPr lang="de-DE" altLang="de-DE" dirty="0" err="1" smtClean="0"/>
@@ -14927,8 +15232,80 @@
             </a:r>
             <a:r>
               <a:rPr lang="de-DE" altLang="de-DE" dirty="0" smtClean="0"/>
-              <a:t> push)</a:t>
-            </a:r>
+              <a:t> push</a:t>
+            </a:r>
+            <a:r>
+              <a:rPr lang="de-DE" altLang="de-DE" dirty="0" smtClean="0"/>
+              <a:t>)</a:t>
+            </a:r>
+          </a:p>
+          <a:p>
+            <a:pPr lvl="1"/>
+            <a:r>
+              <a:rPr lang="de-DE" altLang="de-DE" dirty="0" smtClean="0">
+                <a:latin typeface="Arial Unicode MS" panose="020B0604020202020204" pitchFamily="34" charset="-128"/>
+              </a:rPr>
+              <a:t>Benötigt </a:t>
+            </a:r>
+            <a:r>
+              <a:rPr lang="de-DE" altLang="de-DE" dirty="0" err="1" smtClean="0">
+                <a:latin typeface="Arial Unicode MS" panose="020B0604020202020204" pitchFamily="34" charset="-128"/>
+              </a:rPr>
+              <a:t>git</a:t>
+            </a:r>
+            <a:r>
+              <a:rPr lang="de-DE" altLang="de-DE" dirty="0" smtClean="0">
+                <a:latin typeface="Arial Unicode MS" panose="020B0604020202020204" pitchFamily="34" charset="-128"/>
+              </a:rPr>
+              <a:t> </a:t>
+            </a:r>
+            <a:r>
+              <a:rPr lang="de-DE" altLang="de-DE" dirty="0">
+                <a:latin typeface="Arial Unicode MS" panose="020B0604020202020204" pitchFamily="34" charset="-128"/>
+              </a:rPr>
+              <a:t>push --set-</a:t>
+            </a:r>
+            <a:r>
+              <a:rPr lang="de-DE" altLang="de-DE" dirty="0" err="1">
+                <a:latin typeface="Arial Unicode MS" panose="020B0604020202020204" pitchFamily="34" charset="-128"/>
+              </a:rPr>
+              <a:t>upstream</a:t>
+            </a:r>
+            <a:r>
+              <a:rPr lang="de-DE" altLang="de-DE" dirty="0">
+                <a:latin typeface="Arial Unicode MS" panose="020B0604020202020204" pitchFamily="34" charset="-128"/>
+              </a:rPr>
+              <a:t> </a:t>
+            </a:r>
+            <a:r>
+              <a:rPr lang="de-DE" altLang="de-DE" dirty="0" err="1" smtClean="0">
+                <a:latin typeface="Arial Unicode MS" panose="020B0604020202020204" pitchFamily="34" charset="-128"/>
+              </a:rPr>
+              <a:t>origin</a:t>
+            </a:r>
+            <a:r>
+              <a:rPr lang="de-DE" altLang="de-DE" dirty="0" smtClean="0">
+                <a:latin typeface="Arial Unicode MS" panose="020B0604020202020204" pitchFamily="34" charset="-128"/>
+              </a:rPr>
+              <a:t> &lt;</a:t>
+            </a:r>
+            <a:r>
+              <a:rPr lang="de-DE" altLang="de-DE" dirty="0" err="1" smtClean="0">
+                <a:latin typeface="Arial Unicode MS" panose="020B0604020202020204" pitchFamily="34" charset="-128"/>
+              </a:rPr>
+              <a:t>branchName</a:t>
+            </a:r>
+            <a:r>
+              <a:rPr lang="de-DE" altLang="de-DE" dirty="0">
+                <a:latin typeface="Arial Unicode MS" panose="020B0604020202020204" pitchFamily="34" charset="-128"/>
+              </a:rPr>
+              <a:t>&gt;</a:t>
+            </a:r>
+            <a:r>
+              <a:rPr lang="de-DE" altLang="de-DE" sz="800" dirty="0" smtClean="0"/>
+              <a:t> </a:t>
+            </a:r>
+            <a:endParaRPr lang="de-DE" altLang="de-DE" dirty="0" smtClean="0"/>
           </a:p>
           <a:p>
             <a:pPr lvl="1" indent="0">
@@ -15158,7 +15535,7 @@
               <a:buSzPct val="100000"/>
               <a:buFontTx/>
               <a:buBlip>
-                <a:blip r:embed="rId2"/>
+                <a:blip r:embed="rId3"/>
               </a:buBlip>
               <a:defRPr sz="1800" b="1" kern="0">
                 <a:solidFill>
@@ -15179,7 +15556,7 @@
               <a:buSzPct val="100000"/>
               <a:buFontTx/>
               <a:buBlip>
-                <a:blip r:embed="rId2"/>
+                <a:blip r:embed="rId3"/>
               </a:buBlip>
               <a:defRPr sz="1800" kern="0">
                 <a:solidFill>
@@ -15200,7 +15577,7 @@
               <a:buSzPct val="100000"/>
               <a:buFontTx/>
               <a:buBlip>
-                <a:blip r:embed="rId2"/>
+                <a:blip r:embed="rId3"/>
               </a:buBlip>
               <a:defRPr sz="1800" kern="0">
                 <a:solidFill>
@@ -15221,7 +15598,7 @@
               <a:buSzPct val="100000"/>
               <a:buFontTx/>
               <a:buBlip>
-                <a:blip r:embed="rId2"/>
+                <a:blip r:embed="rId3"/>
               </a:buBlip>
               <a:defRPr sz="1800" kern="0">
                 <a:solidFill>
@@ -15242,7 +15619,7 @@
               <a:buSzPct val="100000"/>
               <a:buFontTx/>
               <a:buBlip>
-                <a:blip r:embed="rId2"/>
+                <a:blip r:embed="rId3"/>
               </a:buBlip>
               <a:defRPr sz="1800" kern="0">
                 <a:solidFill>
@@ -15652,7 +16029,11 @@
             </a:r>
           </a:p>
           <a:p>
-            <a:pPr lvl="1"/>
+            <a:pPr lvl="1">
+              <a:tabLst>
+                <a:tab pos="715963" algn="l"/>
+              </a:tabLst>
+            </a:pPr>
             <a:r>
               <a:rPr lang="de-DE" dirty="0" smtClean="0"/>
               <a:t>Erstellt </a:t>
@@ -15663,15 +16044,15 @@
             </a:r>
             <a:r>
               <a:rPr lang="de-DE" dirty="0" smtClean="0"/>
-              <a:t>Arbeitskopie des </a:t>
-            </a:r>
-            <a:r>
-              <a:rPr lang="de-DE" dirty="0" err="1" smtClean="0"/>
-              <a:t>Git</a:t>
-            </a:r>
-            <a:r>
-              <a:rPr lang="de-DE" dirty="0" smtClean="0"/>
-              <a:t> Repository, gegebenenfalls in extra angegebenen Ordner</a:t>
+              <a:t>Arbeitskopie des Git Repository, gegebenenfalls in extra </a:t>
+            </a:r>
+            <a:r>
+              <a:rPr lang="de-DE" dirty="0" smtClean="0"/>
+              <a:t>	angegebenen </a:t>
+            </a:r>
+            <a:r>
+              <a:rPr lang="de-DE" dirty="0" smtClean="0"/>
+              <a:t>Ordner</a:t>
             </a:r>
             <a:endParaRPr lang="de-DE" altLang="de-DE" dirty="0"/>
           </a:p>

</xml_diff>